<commit_message>
Modify the Service Design Guide to match Guilin release
Issue-ID: DOC-674

Signed-off-by: andreasgeissler <andreas-geissler@telekom.de>
Change-Id: I50521ea0b93a507bb3888feae6a6ef7855a4d6e0
</commit_message>
<xml_diff>
--- a/docs/guides/onap-user/design/media/Design-Overview.pptx
+++ b/docs/guides/onap-user/design/media/Design-Overview.pptx
@@ -139,6 +139,690 @@
 <file path=ppt/changesInfos/changesInfo1.xml><?xml version="1.0" encoding="utf-8"?>
 <pc:chgInfo xmlns:a="http://schemas.openxmlformats.org/drawingml/2006/main" xmlns:r="http://schemas.openxmlformats.org/officeDocument/2006/relationships" xmlns:ac="http://schemas.microsoft.com/office/drawing/2013/main/command" xmlns:pc="http://schemas.microsoft.com/office/powerpoint/2013/main/command">
   <pc:docChgLst>
+    <pc:chgData name="Geissler, Andreas" userId="682b9f05-e557-4b4b-b06f-52958ca31345" providerId="ADAL" clId="{2354F76F-5315-48C1-911A-66BA45A26001}"/>
+    <pc:docChg chg="custSel addSld modSld sldOrd">
+      <pc:chgData name="Geissler, Andreas" userId="682b9f05-e557-4b4b-b06f-52958ca31345" providerId="ADAL" clId="{2354F76F-5315-48C1-911A-66BA45A26001}" dt="2020-03-26T15:22:27.406" v="437" actId="208"/>
+      <pc:docMkLst>
+        <pc:docMk/>
+      </pc:docMkLst>
+      <pc:sldChg chg="addSp delSp modSp">
+        <pc:chgData name="Geissler, Andreas" userId="682b9f05-e557-4b4b-b06f-52958ca31345" providerId="ADAL" clId="{2354F76F-5315-48C1-911A-66BA45A26001}" dt="2020-03-25T11:37:29.717" v="62" actId="1076"/>
+        <pc:sldMkLst>
+          <pc:docMk/>
+          <pc:sldMk cId="2997902877" sldId="703"/>
+        </pc:sldMkLst>
+        <pc:spChg chg="mod">
+          <ac:chgData name="Geissler, Andreas" userId="682b9f05-e557-4b4b-b06f-52958ca31345" providerId="ADAL" clId="{2354F76F-5315-48C1-911A-66BA45A26001}" dt="2020-03-25T11:37:06.606" v="56" actId="14100"/>
+          <ac:spMkLst>
+            <pc:docMk/>
+            <pc:sldMk cId="2997902877" sldId="703"/>
+            <ac:spMk id="14" creationId="{5A64CB0D-68AD-431E-BFFD-E111323E4527}"/>
+          </ac:spMkLst>
+        </pc:spChg>
+        <pc:spChg chg="mod">
+          <ac:chgData name="Geissler, Andreas" userId="682b9f05-e557-4b4b-b06f-52958ca31345" providerId="ADAL" clId="{2354F76F-5315-48C1-911A-66BA45A26001}" dt="2020-03-25T11:37:29.717" v="62" actId="1076"/>
+          <ac:spMkLst>
+            <pc:docMk/>
+            <pc:sldMk cId="2997902877" sldId="703"/>
+            <ac:spMk id="73" creationId="{3AB8C243-9AAA-4F4F-86B2-E046527592D2}"/>
+          </ac:spMkLst>
+        </pc:spChg>
+        <pc:picChg chg="add mod">
+          <ac:chgData name="Geissler, Andreas" userId="682b9f05-e557-4b4b-b06f-52958ca31345" providerId="ADAL" clId="{2354F76F-5315-48C1-911A-66BA45A26001}" dt="2020-03-25T09:40:09.158" v="3" actId="1076"/>
+          <ac:picMkLst>
+            <pc:docMk/>
+            <pc:sldMk cId="2997902877" sldId="703"/>
+            <ac:picMk id="15" creationId="{D62F9C15-0C82-49D2-A13A-81FD368E47A5}"/>
+          </ac:picMkLst>
+        </pc:picChg>
+        <pc:picChg chg="add mod">
+          <ac:chgData name="Geissler, Andreas" userId="682b9f05-e557-4b4b-b06f-52958ca31345" providerId="ADAL" clId="{2354F76F-5315-48C1-911A-66BA45A26001}" dt="2020-03-25T09:40:36.900" v="7" actId="1076"/>
+          <ac:picMkLst>
+            <pc:docMk/>
+            <pc:sldMk cId="2997902877" sldId="703"/>
+            <ac:picMk id="17" creationId="{8406327E-3B09-47BB-A642-8EB9EDE5D0FF}"/>
+          </ac:picMkLst>
+        </pc:picChg>
+        <pc:picChg chg="add mod">
+          <ac:chgData name="Geissler, Andreas" userId="682b9f05-e557-4b4b-b06f-52958ca31345" providerId="ADAL" clId="{2354F76F-5315-48C1-911A-66BA45A26001}" dt="2020-03-25T09:40:58.133" v="11" actId="1076"/>
+          <ac:picMkLst>
+            <pc:docMk/>
+            <pc:sldMk cId="2997902877" sldId="703"/>
+            <ac:picMk id="19" creationId="{8234EDAC-9DF8-42F1-8FDE-E6885E8683A1}"/>
+          </ac:picMkLst>
+        </pc:picChg>
+        <pc:picChg chg="add del mod">
+          <ac:chgData name="Geissler, Andreas" userId="682b9f05-e557-4b4b-b06f-52958ca31345" providerId="ADAL" clId="{2354F76F-5315-48C1-911A-66BA45A26001}" dt="2020-03-25T09:41:09.611" v="14" actId="478"/>
+          <ac:picMkLst>
+            <pc:docMk/>
+            <pc:sldMk cId="2997902877" sldId="703"/>
+            <ac:picMk id="21" creationId="{BB6F8D16-B44D-46AC-9ADF-2770D4E66244}"/>
+          </ac:picMkLst>
+        </pc:picChg>
+        <pc:picChg chg="add mod">
+          <ac:chgData name="Geissler, Andreas" userId="682b9f05-e557-4b4b-b06f-52958ca31345" providerId="ADAL" clId="{2354F76F-5315-48C1-911A-66BA45A26001}" dt="2020-03-25T09:41:23.141" v="18" actId="1076"/>
+          <ac:picMkLst>
+            <pc:docMk/>
+            <pc:sldMk cId="2997902877" sldId="703"/>
+            <ac:picMk id="23" creationId="{D35C6022-ABDF-48EB-A508-54BCBDAD1CA0}"/>
+          </ac:picMkLst>
+        </pc:picChg>
+        <pc:picChg chg="add mod">
+          <ac:chgData name="Geissler, Andreas" userId="682b9f05-e557-4b4b-b06f-52958ca31345" providerId="ADAL" clId="{2354F76F-5315-48C1-911A-66BA45A26001}" dt="2020-03-25T09:41:46.683" v="24" actId="1076"/>
+          <ac:picMkLst>
+            <pc:docMk/>
+            <pc:sldMk cId="2997902877" sldId="703"/>
+            <ac:picMk id="25" creationId="{5845F35A-B2DA-4C50-ADFD-11D6E26D9A71}"/>
+          </ac:picMkLst>
+        </pc:picChg>
+        <pc:picChg chg="add mod">
+          <ac:chgData name="Geissler, Andreas" userId="682b9f05-e557-4b4b-b06f-52958ca31345" providerId="ADAL" clId="{2354F76F-5315-48C1-911A-66BA45A26001}" dt="2020-03-25T09:42:09.460" v="28" actId="1076"/>
+          <ac:picMkLst>
+            <pc:docMk/>
+            <pc:sldMk cId="2997902877" sldId="703"/>
+            <ac:picMk id="27" creationId="{FE872FB0-816C-4D50-AE40-9ED80B144FBB}"/>
+          </ac:picMkLst>
+        </pc:picChg>
+        <pc:picChg chg="add mod">
+          <ac:chgData name="Geissler, Andreas" userId="682b9f05-e557-4b4b-b06f-52958ca31345" providerId="ADAL" clId="{2354F76F-5315-48C1-911A-66BA45A26001}" dt="2020-03-25T09:43:02.516" v="40" actId="1076"/>
+          <ac:picMkLst>
+            <pc:docMk/>
+            <pc:sldMk cId="2997902877" sldId="703"/>
+            <ac:picMk id="29" creationId="{D80DFBE9-AFF1-42C9-9D8A-8246E0D209DC}"/>
+          </ac:picMkLst>
+        </pc:picChg>
+        <pc:picChg chg="add mod">
+          <ac:chgData name="Geissler, Andreas" userId="682b9f05-e557-4b4b-b06f-52958ca31345" providerId="ADAL" clId="{2354F76F-5315-48C1-911A-66BA45A26001}" dt="2020-03-25T09:43:28.008" v="44" actId="1076"/>
+          <ac:picMkLst>
+            <pc:docMk/>
+            <pc:sldMk cId="2997902877" sldId="703"/>
+            <ac:picMk id="32" creationId="{19760A13-6610-42CB-BD3C-C6BABCD76DF8}"/>
+          </ac:picMkLst>
+        </pc:picChg>
+        <pc:picChg chg="add mod">
+          <ac:chgData name="Geissler, Andreas" userId="682b9f05-e557-4b4b-b06f-52958ca31345" providerId="ADAL" clId="{2354F76F-5315-48C1-911A-66BA45A26001}" dt="2020-03-25T09:46:59.459" v="50" actId="1076"/>
+          <ac:picMkLst>
+            <pc:docMk/>
+            <pc:sldMk cId="2997902877" sldId="703"/>
+            <ac:picMk id="35" creationId="{F4389802-A75D-467D-8A1D-6C32685875B3}"/>
+          </ac:picMkLst>
+        </pc:picChg>
+        <pc:picChg chg="del">
+          <ac:chgData name="Geissler, Andreas" userId="682b9f05-e557-4b4b-b06f-52958ca31345" providerId="ADAL" clId="{2354F76F-5315-48C1-911A-66BA45A26001}" dt="2020-03-25T09:40:32.267" v="6" actId="478"/>
+          <ac:picMkLst>
+            <pc:docMk/>
+            <pc:sldMk cId="2997902877" sldId="703"/>
+            <ac:picMk id="78" creationId="{00000000-0000-0000-0000-000000000000}"/>
+          </ac:picMkLst>
+        </pc:picChg>
+        <pc:picChg chg="del">
+          <ac:chgData name="Geissler, Andreas" userId="682b9f05-e557-4b4b-b06f-52958ca31345" providerId="ADAL" clId="{2354F76F-5315-48C1-911A-66BA45A26001}" dt="2020-03-25T09:43:14.540" v="42" actId="478"/>
+          <ac:picMkLst>
+            <pc:docMk/>
+            <pc:sldMk cId="2997902877" sldId="703"/>
+            <ac:picMk id="87" creationId="{1B7F91D5-F44D-45BA-82B8-3AB2B36C49A2}"/>
+          </ac:picMkLst>
+        </pc:picChg>
+        <pc:picChg chg="add mod">
+          <ac:chgData name="Geissler, Andreas" userId="682b9f05-e557-4b4b-b06f-52958ca31345" providerId="ADAL" clId="{2354F76F-5315-48C1-911A-66BA45A26001}" dt="2020-03-25T09:42:27.420" v="32" actId="1076"/>
+          <ac:picMkLst>
+            <pc:docMk/>
+            <pc:sldMk cId="2997902877" sldId="703"/>
+            <ac:picMk id="115" creationId="{532450B5-92C4-4235-A0A4-F8D5587AE73F}"/>
+          </ac:picMkLst>
+        </pc:picChg>
+        <pc:picChg chg="add mod">
+          <ac:chgData name="Geissler, Andreas" userId="682b9f05-e557-4b4b-b06f-52958ca31345" providerId="ADAL" clId="{2354F76F-5315-48C1-911A-66BA45A26001}" dt="2020-03-25T09:42:40.227" v="35" actId="1076"/>
+          <ac:picMkLst>
+            <pc:docMk/>
+            <pc:sldMk cId="2997902877" sldId="703"/>
+            <ac:picMk id="120" creationId="{579139BB-89F7-41B5-B8C7-D08F88692F64}"/>
+          </ac:picMkLst>
+        </pc:picChg>
+        <pc:picChg chg="add mod">
+          <ac:chgData name="Geissler, Andreas" userId="682b9f05-e557-4b4b-b06f-52958ca31345" providerId="ADAL" clId="{2354F76F-5315-48C1-911A-66BA45A26001}" dt="2020-03-25T09:43:35.346" v="46" actId="1076"/>
+          <ac:picMkLst>
+            <pc:docMk/>
+            <pc:sldMk cId="2997902877" sldId="703"/>
+            <ac:picMk id="121" creationId="{0F81061E-8FB6-41AB-AACC-E179CA0D1123}"/>
+          </ac:picMkLst>
+        </pc:picChg>
+        <pc:picChg chg="del">
+          <ac:chgData name="Geissler, Andreas" userId="682b9f05-e557-4b4b-b06f-52958ca31345" providerId="ADAL" clId="{2354F76F-5315-48C1-911A-66BA45A26001}" dt="2020-03-25T09:42:02.445" v="27" actId="478"/>
+          <ac:picMkLst>
+            <pc:docMk/>
+            <pc:sldMk cId="2997902877" sldId="703"/>
+            <ac:picMk id="126" creationId="{154CB8D8-ADEA-4D3E-99FB-36829D51B6AB}"/>
+          </ac:picMkLst>
+        </pc:picChg>
+        <pc:picChg chg="del">
+          <ac:chgData name="Geissler, Andreas" userId="682b9f05-e557-4b4b-b06f-52958ca31345" providerId="ADAL" clId="{2354F76F-5315-48C1-911A-66BA45A26001}" dt="2020-03-25T09:43:16.703" v="43" actId="478"/>
+          <ac:picMkLst>
+            <pc:docMk/>
+            <pc:sldMk cId="2997902877" sldId="703"/>
+            <ac:picMk id="129" creationId="{EEAA159A-CA54-4F20-81EF-A3F4F7690D51}"/>
+          </ac:picMkLst>
+        </pc:picChg>
+        <pc:picChg chg="del">
+          <ac:chgData name="Geissler, Andreas" userId="682b9f05-e557-4b4b-b06f-52958ca31345" providerId="ADAL" clId="{2354F76F-5315-48C1-911A-66BA45A26001}" dt="2020-03-25T09:46:53.213" v="49" actId="478"/>
+          <ac:picMkLst>
+            <pc:docMk/>
+            <pc:sldMk cId="2997902877" sldId="703"/>
+            <ac:picMk id="131" creationId="{D3BBFEE6-3A98-45AC-9089-7086390869B2}"/>
+          </ac:picMkLst>
+        </pc:picChg>
+        <pc:picChg chg="del">
+          <ac:chgData name="Geissler, Andreas" userId="682b9f05-e557-4b4b-b06f-52958ca31345" providerId="ADAL" clId="{2354F76F-5315-48C1-911A-66BA45A26001}" dt="2020-03-25T09:42:50.814" v="37" actId="478"/>
+          <ac:picMkLst>
+            <pc:docMk/>
+            <pc:sldMk cId="2997902877" sldId="703"/>
+            <ac:picMk id="139" creationId="{4CD7D1C3-2C36-4BE8-8C67-88530B75B14E}"/>
+          </ac:picMkLst>
+        </pc:picChg>
+        <pc:picChg chg="del">
+          <ac:chgData name="Geissler, Andreas" userId="682b9f05-e557-4b4b-b06f-52958ca31345" providerId="ADAL" clId="{2354F76F-5315-48C1-911A-66BA45A26001}" dt="2020-03-25T09:42:34.157" v="33" actId="478"/>
+          <ac:picMkLst>
+            <pc:docMk/>
+            <pc:sldMk cId="2997902877" sldId="703"/>
+            <ac:picMk id="143" creationId="{DB48DA22-BF9A-46E8-8C8E-C5262A9B97C0}"/>
+          </ac:picMkLst>
+        </pc:picChg>
+        <pc:picChg chg="del">
+          <ac:chgData name="Geissler, Andreas" userId="682b9f05-e557-4b4b-b06f-52958ca31345" providerId="ADAL" clId="{2354F76F-5315-48C1-911A-66BA45A26001}" dt="2020-03-25T09:42:17.180" v="30" actId="478"/>
+          <ac:picMkLst>
+            <pc:docMk/>
+            <pc:sldMk cId="2997902877" sldId="703"/>
+            <ac:picMk id="144" creationId="{1B39C302-6370-4044-BE3A-432B76EE3513}"/>
+          </ac:picMkLst>
+        </pc:picChg>
+        <pc:picChg chg="del">
+          <ac:chgData name="Geissler, Andreas" userId="682b9f05-e557-4b4b-b06f-52958ca31345" providerId="ADAL" clId="{2354F76F-5315-48C1-911A-66BA45A26001}" dt="2020-03-25T09:40:51.020" v="10" actId="478"/>
+          <ac:picMkLst>
+            <pc:docMk/>
+            <pc:sldMk cId="2997902877" sldId="703"/>
+            <ac:picMk id="146" creationId="{4C2B348C-41FA-4316-862F-2BEB70C7DC75}"/>
+          </ac:picMkLst>
+        </pc:picChg>
+        <pc:picChg chg="del">
+          <ac:chgData name="Geissler, Andreas" userId="682b9f05-e557-4b4b-b06f-52958ca31345" providerId="ADAL" clId="{2354F76F-5315-48C1-911A-66BA45A26001}" dt="2020-03-25T09:40:03.884" v="2" actId="478"/>
+          <ac:picMkLst>
+            <pc:docMk/>
+            <pc:sldMk cId="2997902877" sldId="703"/>
+            <ac:picMk id="148" creationId="{8A2C740A-4F13-4770-A568-574E58A492B3}"/>
+          </ac:picMkLst>
+        </pc:picChg>
+        <pc:picChg chg="del">
+          <ac:chgData name="Geissler, Andreas" userId="682b9f05-e557-4b4b-b06f-52958ca31345" providerId="ADAL" clId="{2354F76F-5315-48C1-911A-66BA45A26001}" dt="2020-03-25T09:41:33.550" v="21" actId="478"/>
+          <ac:picMkLst>
+            <pc:docMk/>
+            <pc:sldMk cId="2997902877" sldId="703"/>
+            <ac:picMk id="154" creationId="{DCF2E2F6-13F0-42EF-9506-356B5FBD4815}"/>
+          </ac:picMkLst>
+        </pc:picChg>
+        <pc:picChg chg="del">
+          <ac:chgData name="Geissler, Andreas" userId="682b9f05-e557-4b4b-b06f-52958ca31345" providerId="ADAL" clId="{2354F76F-5315-48C1-911A-66BA45A26001}" dt="2020-03-25T09:41:18.783" v="17" actId="478"/>
+          <ac:picMkLst>
+            <pc:docMk/>
+            <pc:sldMk cId="2997902877" sldId="703"/>
+            <ac:picMk id="165" creationId="{A9A92B44-FBDB-41EA-92A0-F5FE18D46BD9}"/>
+          </ac:picMkLst>
+        </pc:picChg>
+      </pc:sldChg>
+      <pc:sldChg chg="ord">
+        <pc:chgData name="Geissler, Andreas" userId="682b9f05-e557-4b4b-b06f-52958ca31345" providerId="ADAL" clId="{2354F76F-5315-48C1-911A-66BA45A26001}" dt="2020-03-26T15:19:36.937" v="360"/>
+        <pc:sldMkLst>
+          <pc:docMk/>
+          <pc:sldMk cId="1305615921" sldId="704"/>
+        </pc:sldMkLst>
+      </pc:sldChg>
+      <pc:sldChg chg="addSp delSp modSp add">
+        <pc:chgData name="Geissler, Andreas" userId="682b9f05-e557-4b4b-b06f-52958ca31345" providerId="ADAL" clId="{2354F76F-5315-48C1-911A-66BA45A26001}" dt="2020-03-26T10:32:50.623" v="187" actId="113"/>
+        <pc:sldMkLst>
+          <pc:docMk/>
+          <pc:sldMk cId="4180180259" sldId="705"/>
+        </pc:sldMkLst>
+        <pc:spChg chg="del">
+          <ac:chgData name="Geissler, Andreas" userId="682b9f05-e557-4b4b-b06f-52958ca31345" providerId="ADAL" clId="{2354F76F-5315-48C1-911A-66BA45A26001}" dt="2020-03-26T10:25:51.616" v="64" actId="478"/>
+          <ac:spMkLst>
+            <pc:docMk/>
+            <pc:sldMk cId="4180180259" sldId="705"/>
+            <ac:spMk id="2" creationId="{00000000-0000-0000-0000-000000000000}"/>
+          </ac:spMkLst>
+        </pc:spChg>
+        <pc:spChg chg="add mod">
+          <ac:chgData name="Geissler, Andreas" userId="682b9f05-e557-4b4b-b06f-52958ca31345" providerId="ADAL" clId="{2354F76F-5315-48C1-911A-66BA45A26001}" dt="2020-03-26T10:26:59.990" v="90" actId="404"/>
+          <ac:spMkLst>
+            <pc:docMk/>
+            <pc:sldMk cId="4180180259" sldId="705"/>
+            <ac:spMk id="3" creationId="{33AE3105-D96B-4360-8405-E2954042769F}"/>
+          </ac:spMkLst>
+        </pc:spChg>
+        <pc:spChg chg="del">
+          <ac:chgData name="Geissler, Andreas" userId="682b9f05-e557-4b4b-b06f-52958ca31345" providerId="ADAL" clId="{2354F76F-5315-48C1-911A-66BA45A26001}" dt="2020-03-26T10:25:56.878" v="65" actId="478"/>
+          <ac:spMkLst>
+            <pc:docMk/>
+            <pc:sldMk cId="4180180259" sldId="705"/>
+            <ac:spMk id="4" creationId="{5FF0F7E6-4299-4334-9285-A4BA3DB64DE7}"/>
+          </ac:spMkLst>
+        </pc:spChg>
+        <pc:spChg chg="del">
+          <ac:chgData name="Geissler, Andreas" userId="682b9f05-e557-4b4b-b06f-52958ca31345" providerId="ADAL" clId="{2354F76F-5315-48C1-911A-66BA45A26001}" dt="2020-03-26T10:25:56.878" v="65" actId="478"/>
+          <ac:spMkLst>
+            <pc:docMk/>
+            <pc:sldMk cId="4180180259" sldId="705"/>
+            <ac:spMk id="5" creationId="{5D8AE03F-F60F-41FF-8E3E-916B4E4BDAA8}"/>
+          </ac:spMkLst>
+        </pc:spChg>
+        <pc:spChg chg="del">
+          <ac:chgData name="Geissler, Andreas" userId="682b9f05-e557-4b4b-b06f-52958ca31345" providerId="ADAL" clId="{2354F76F-5315-48C1-911A-66BA45A26001}" dt="2020-03-26T10:25:56.878" v="65" actId="478"/>
+          <ac:spMkLst>
+            <pc:docMk/>
+            <pc:sldMk cId="4180180259" sldId="705"/>
+            <ac:spMk id="6" creationId="{858F9259-E169-4A2D-AF50-7E09A882D134}"/>
+          </ac:spMkLst>
+        </pc:spChg>
+        <pc:spChg chg="add mod">
+          <ac:chgData name="Geissler, Andreas" userId="682b9f05-e557-4b4b-b06f-52958ca31345" providerId="ADAL" clId="{2354F76F-5315-48C1-911A-66BA45A26001}" dt="2020-03-26T10:27:24.494" v="98" actId="20577"/>
+          <ac:spMkLst>
+            <pc:docMk/>
+            <pc:sldMk cId="4180180259" sldId="705"/>
+            <ac:spMk id="7" creationId="{402CFC1B-62A9-4EDA-A833-D80B34A16483}"/>
+          </ac:spMkLst>
+        </pc:spChg>
+        <pc:spChg chg="add mod">
+          <ac:chgData name="Geissler, Andreas" userId="682b9f05-e557-4b4b-b06f-52958ca31345" providerId="ADAL" clId="{2354F76F-5315-48C1-911A-66BA45A26001}" dt="2020-03-26T10:27:48.461" v="115" actId="20577"/>
+          <ac:spMkLst>
+            <pc:docMk/>
+            <pc:sldMk cId="4180180259" sldId="705"/>
+            <ac:spMk id="8" creationId="{86884906-D068-405E-9CE5-0777FA37AEAE}"/>
+          </ac:spMkLst>
+        </pc:spChg>
+        <pc:spChg chg="add mod">
+          <ac:chgData name="Geissler, Andreas" userId="682b9f05-e557-4b4b-b06f-52958ca31345" providerId="ADAL" clId="{2354F76F-5315-48C1-911A-66BA45A26001}" dt="2020-03-26T10:30:00.684" v="149" actId="1076"/>
+          <ac:spMkLst>
+            <pc:docMk/>
+            <pc:sldMk cId="4180180259" sldId="705"/>
+            <ac:spMk id="9" creationId="{6BC292BF-1EC3-45FC-A2A9-F54981036079}"/>
+          </ac:spMkLst>
+        </pc:spChg>
+        <pc:spChg chg="add mod">
+          <ac:chgData name="Geissler, Andreas" userId="682b9f05-e557-4b4b-b06f-52958ca31345" providerId="ADAL" clId="{2354F76F-5315-48C1-911A-66BA45A26001}" dt="2020-03-26T10:32:08.890" v="158" actId="207"/>
+          <ac:spMkLst>
+            <pc:docMk/>
+            <pc:sldMk cId="4180180259" sldId="705"/>
+            <ac:spMk id="27" creationId="{113AA591-17A2-42B5-878A-4F61DA7A7DE4}"/>
+          </ac:spMkLst>
+        </pc:spChg>
+        <pc:spChg chg="add mod">
+          <ac:chgData name="Geissler, Andreas" userId="682b9f05-e557-4b4b-b06f-52958ca31345" providerId="ADAL" clId="{2354F76F-5315-48C1-911A-66BA45A26001}" dt="2020-03-26T10:32:50.623" v="187" actId="113"/>
+          <ac:spMkLst>
+            <pc:docMk/>
+            <pc:sldMk cId="4180180259" sldId="705"/>
+            <ac:spMk id="28" creationId="{C2025D8E-62FB-4EB0-998B-2B15F881E249}"/>
+          </ac:spMkLst>
+        </pc:spChg>
+        <pc:cxnChg chg="add mod">
+          <ac:chgData name="Geissler, Andreas" userId="682b9f05-e557-4b4b-b06f-52958ca31345" providerId="ADAL" clId="{2354F76F-5315-48C1-911A-66BA45A26001}" dt="2020-03-26T10:28:46.766" v="134" actId="208"/>
+          <ac:cxnSpMkLst>
+            <pc:docMk/>
+            <pc:sldMk cId="4180180259" sldId="705"/>
+            <ac:cxnSpMk id="11" creationId="{7FB6985D-6845-48AF-AF17-38E213D9A7C6}"/>
+          </ac:cxnSpMkLst>
+        </pc:cxnChg>
+        <pc:cxnChg chg="add mod">
+          <ac:chgData name="Geissler, Andreas" userId="682b9f05-e557-4b4b-b06f-52958ca31345" providerId="ADAL" clId="{2354F76F-5315-48C1-911A-66BA45A26001}" dt="2020-03-26T10:29:06.588" v="138" actId="1076"/>
+          <ac:cxnSpMkLst>
+            <pc:docMk/>
+            <pc:sldMk cId="4180180259" sldId="705"/>
+            <ac:cxnSpMk id="12" creationId="{53814E33-C7CC-4428-9B1D-2C9EF7349B2D}"/>
+          </ac:cxnSpMkLst>
+        </pc:cxnChg>
+        <pc:cxnChg chg="add mod">
+          <ac:chgData name="Geissler, Andreas" userId="682b9f05-e557-4b4b-b06f-52958ca31345" providerId="ADAL" clId="{2354F76F-5315-48C1-911A-66BA45A26001}" dt="2020-03-26T10:30:00.684" v="149" actId="1076"/>
+          <ac:cxnSpMkLst>
+            <pc:docMk/>
+            <pc:sldMk cId="4180180259" sldId="705"/>
+            <ac:cxnSpMk id="15" creationId="{094F8B71-5104-41A3-BA19-8CD0CC49AC41}"/>
+          </ac:cxnSpMkLst>
+        </pc:cxnChg>
+        <pc:cxnChg chg="add mod">
+          <ac:chgData name="Geissler, Andreas" userId="682b9f05-e557-4b4b-b06f-52958ca31345" providerId="ADAL" clId="{2354F76F-5315-48C1-911A-66BA45A26001}" dt="2020-03-26T10:29:39.980" v="145" actId="14100"/>
+          <ac:cxnSpMkLst>
+            <pc:docMk/>
+            <pc:sldMk cId="4180180259" sldId="705"/>
+            <ac:cxnSpMk id="18" creationId="{A411D493-7599-4AB1-A7FD-2B09CEA97E14}"/>
+          </ac:cxnSpMkLst>
+        </pc:cxnChg>
+        <pc:cxnChg chg="add mod">
+          <ac:chgData name="Geissler, Andreas" userId="682b9f05-e557-4b4b-b06f-52958ca31345" providerId="ADAL" clId="{2354F76F-5315-48C1-911A-66BA45A26001}" dt="2020-03-26T10:29:52.228" v="148" actId="14100"/>
+          <ac:cxnSpMkLst>
+            <pc:docMk/>
+            <pc:sldMk cId="4180180259" sldId="705"/>
+            <ac:cxnSpMk id="21" creationId="{6015B575-0B26-4144-B087-5CAC06864EC4}"/>
+          </ac:cxnSpMkLst>
+        </pc:cxnChg>
+        <pc:cxnChg chg="add mod">
+          <ac:chgData name="Geissler, Andreas" userId="682b9f05-e557-4b4b-b06f-52958ca31345" providerId="ADAL" clId="{2354F76F-5315-48C1-911A-66BA45A26001}" dt="2020-03-26T10:30:36.034" v="154" actId="693"/>
+          <ac:cxnSpMkLst>
+            <pc:docMk/>
+            <pc:sldMk cId="4180180259" sldId="705"/>
+            <ac:cxnSpMk id="26" creationId="{5155B80F-6E4D-4CFF-BD48-AD581C3BF5DF}"/>
+          </ac:cxnSpMkLst>
+        </pc:cxnChg>
+      </pc:sldChg>
+      <pc:sldChg chg="addSp delSp modSp add">
+        <pc:chgData name="Geissler, Andreas" userId="682b9f05-e557-4b4b-b06f-52958ca31345" providerId="ADAL" clId="{2354F76F-5315-48C1-911A-66BA45A26001}" dt="2020-03-26T14:44:38.964" v="359" actId="14100"/>
+        <pc:sldMkLst>
+          <pc:docMk/>
+          <pc:sldMk cId="1542958727" sldId="706"/>
+        </pc:sldMkLst>
+        <pc:spChg chg="mod">
+          <ac:chgData name="Geissler, Andreas" userId="682b9f05-e557-4b4b-b06f-52958ca31345" providerId="ADAL" clId="{2354F76F-5315-48C1-911A-66BA45A26001}" dt="2020-03-26T14:35:52.172" v="293" actId="1076"/>
+          <ac:spMkLst>
+            <pc:docMk/>
+            <pc:sldMk cId="1542958727" sldId="706"/>
+            <ac:spMk id="3" creationId="{33AE3105-D96B-4360-8405-E2954042769F}"/>
+          </ac:spMkLst>
+        </pc:spChg>
+        <pc:spChg chg="mod">
+          <ac:chgData name="Geissler, Andreas" userId="682b9f05-e557-4b4b-b06f-52958ca31345" providerId="ADAL" clId="{2354F76F-5315-48C1-911A-66BA45A26001}" dt="2020-03-26T14:34:59.456" v="275" actId="1076"/>
+          <ac:spMkLst>
+            <pc:docMk/>
+            <pc:sldMk cId="1542958727" sldId="706"/>
+            <ac:spMk id="7" creationId="{402CFC1B-62A9-4EDA-A833-D80B34A16483}"/>
+          </ac:spMkLst>
+        </pc:spChg>
+        <pc:spChg chg="mod">
+          <ac:chgData name="Geissler, Andreas" userId="682b9f05-e557-4b4b-b06f-52958ca31345" providerId="ADAL" clId="{2354F76F-5315-48C1-911A-66BA45A26001}" dt="2020-03-26T14:36:22.447" v="311" actId="20577"/>
+          <ac:spMkLst>
+            <pc:docMk/>
+            <pc:sldMk cId="1542958727" sldId="706"/>
+            <ac:spMk id="8" creationId="{86884906-D068-405E-9CE5-0777FA37AEAE}"/>
+          </ac:spMkLst>
+        </pc:spChg>
+        <pc:spChg chg="mod">
+          <ac:chgData name="Geissler, Andreas" userId="682b9f05-e557-4b4b-b06f-52958ca31345" providerId="ADAL" clId="{2354F76F-5315-48C1-911A-66BA45A26001}" dt="2020-03-26T14:38:33.259" v="350" actId="20577"/>
+          <ac:spMkLst>
+            <pc:docMk/>
+            <pc:sldMk cId="1542958727" sldId="706"/>
+            <ac:spMk id="9" creationId="{6BC292BF-1EC3-45FC-A2A9-F54981036079}"/>
+          </ac:spMkLst>
+        </pc:spChg>
+        <pc:spChg chg="add mod">
+          <ac:chgData name="Geissler, Andreas" userId="682b9f05-e557-4b4b-b06f-52958ca31345" providerId="ADAL" clId="{2354F76F-5315-48C1-911A-66BA45A26001}" dt="2020-03-26T14:33:31.433" v="204" actId="208"/>
+          <ac:spMkLst>
+            <pc:docMk/>
+            <pc:sldMk cId="1542958727" sldId="706"/>
+            <ac:spMk id="14" creationId="{1294F250-EAA7-4E42-8C2E-4C38AFB295E4}"/>
+          </ac:spMkLst>
+        </pc:spChg>
+        <pc:spChg chg="add mod">
+          <ac:chgData name="Geissler, Andreas" userId="682b9f05-e557-4b4b-b06f-52958ca31345" providerId="ADAL" clId="{2354F76F-5315-48C1-911A-66BA45A26001}" dt="2020-03-26T14:34:10.937" v="241" actId="20577"/>
+          <ac:spMkLst>
+            <pc:docMk/>
+            <pc:sldMk cId="1542958727" sldId="706"/>
+            <ac:spMk id="16" creationId="{502D9E60-729E-4C8F-BEAB-5F61186B1DC6}"/>
+          </ac:spMkLst>
+        </pc:spChg>
+        <pc:spChg chg="add mod">
+          <ac:chgData name="Geissler, Andreas" userId="682b9f05-e557-4b4b-b06f-52958ca31345" providerId="ADAL" clId="{2354F76F-5315-48C1-911A-66BA45A26001}" dt="2020-03-26T14:34:55.395" v="274" actId="1076"/>
+          <ac:spMkLst>
+            <pc:docMk/>
+            <pc:sldMk cId="1542958727" sldId="706"/>
+            <ac:spMk id="19" creationId="{458AF630-9B8E-4352-9206-4E74D52E5F0B}"/>
+          </ac:spMkLst>
+        </pc:spChg>
+        <pc:spChg chg="mod">
+          <ac:chgData name="Geissler, Andreas" userId="682b9f05-e557-4b4b-b06f-52958ca31345" providerId="ADAL" clId="{2354F76F-5315-48C1-911A-66BA45A26001}" dt="2020-03-26T14:39:01.822" v="354" actId="14100"/>
+          <ac:spMkLst>
+            <pc:docMk/>
+            <pc:sldMk cId="1542958727" sldId="706"/>
+            <ac:spMk id="27" creationId="{113AA591-17A2-42B5-878A-4F61DA7A7DE4}"/>
+          </ac:spMkLst>
+        </pc:spChg>
+        <pc:spChg chg="mod">
+          <ac:chgData name="Geissler, Andreas" userId="682b9f05-e557-4b4b-b06f-52958ca31345" providerId="ADAL" clId="{2354F76F-5315-48C1-911A-66BA45A26001}" dt="2020-03-26T14:39:05.099" v="355" actId="1076"/>
+          <ac:spMkLst>
+            <pc:docMk/>
+            <pc:sldMk cId="1542958727" sldId="706"/>
+            <ac:spMk id="28" creationId="{C2025D8E-62FB-4EB0-998B-2B15F881E249}"/>
+          </ac:spMkLst>
+        </pc:spChg>
+        <pc:spChg chg="add mod">
+          <ac:chgData name="Geissler, Andreas" userId="682b9f05-e557-4b4b-b06f-52958ca31345" providerId="ADAL" clId="{2354F76F-5315-48C1-911A-66BA45A26001}" dt="2020-03-26T14:36:54.934" v="322" actId="20577"/>
+          <ac:spMkLst>
+            <pc:docMk/>
+            <pc:sldMk cId="1542958727" sldId="706"/>
+            <ac:spMk id="33" creationId="{432F2410-35E5-4B9C-98B4-086A7241C7F1}"/>
+          </ac:spMkLst>
+        </pc:spChg>
+        <pc:cxnChg chg="mod">
+          <ac:chgData name="Geissler, Andreas" userId="682b9f05-e557-4b4b-b06f-52958ca31345" providerId="ADAL" clId="{2354F76F-5315-48C1-911A-66BA45A26001}" dt="2020-03-26T14:36:30.406" v="312" actId="108"/>
+          <ac:cxnSpMkLst>
+            <pc:docMk/>
+            <pc:sldMk cId="1542958727" sldId="706"/>
+            <ac:cxnSpMk id="11" creationId="{7FB6985D-6845-48AF-AF17-38E213D9A7C6}"/>
+          </ac:cxnSpMkLst>
+        </pc:cxnChg>
+        <pc:cxnChg chg="del">
+          <ac:chgData name="Geissler, Andreas" userId="682b9f05-e557-4b4b-b06f-52958ca31345" providerId="ADAL" clId="{2354F76F-5315-48C1-911A-66BA45A26001}" dt="2020-03-26T14:36:03.890" v="296" actId="478"/>
+          <ac:cxnSpMkLst>
+            <pc:docMk/>
+            <pc:sldMk cId="1542958727" sldId="706"/>
+            <ac:cxnSpMk id="12" creationId="{53814E33-C7CC-4428-9B1D-2C9EF7349B2D}"/>
+          </ac:cxnSpMkLst>
+        </pc:cxnChg>
+        <pc:cxnChg chg="del mod">
+          <ac:chgData name="Geissler, Andreas" userId="682b9f05-e557-4b4b-b06f-52958ca31345" providerId="ADAL" clId="{2354F76F-5315-48C1-911A-66BA45A26001}" dt="2020-03-26T14:38:03.829" v="335" actId="478"/>
+          <ac:cxnSpMkLst>
+            <pc:docMk/>
+            <pc:sldMk cId="1542958727" sldId="706"/>
+            <ac:cxnSpMk id="15" creationId="{094F8B71-5104-41A3-BA19-8CD0CC49AC41}"/>
+          </ac:cxnSpMkLst>
+        </pc:cxnChg>
+        <pc:cxnChg chg="del mod">
+          <ac:chgData name="Geissler, Andreas" userId="682b9f05-e557-4b4b-b06f-52958ca31345" providerId="ADAL" clId="{2354F76F-5315-48C1-911A-66BA45A26001}" dt="2020-03-26T14:32:43.132" v="196" actId="478"/>
+          <ac:cxnSpMkLst>
+            <pc:docMk/>
+            <pc:sldMk cId="1542958727" sldId="706"/>
+            <ac:cxnSpMk id="18" creationId="{A411D493-7599-4AB1-A7FD-2B09CEA97E14}"/>
+          </ac:cxnSpMkLst>
+        </pc:cxnChg>
+        <pc:cxnChg chg="add mod">
+          <ac:chgData name="Geissler, Andreas" userId="682b9f05-e557-4b4b-b06f-52958ca31345" providerId="ADAL" clId="{2354F76F-5315-48C1-911A-66BA45A26001}" dt="2020-03-26T14:35:56.493" v="294" actId="14100"/>
+          <ac:cxnSpMkLst>
+            <pc:docMk/>
+            <pc:sldMk cId="1542958727" sldId="706"/>
+            <ac:cxnSpMk id="20" creationId="{46012996-2526-4746-9883-4028464FC101}"/>
+          </ac:cxnSpMkLst>
+        </pc:cxnChg>
+        <pc:cxnChg chg="del">
+          <ac:chgData name="Geissler, Andreas" userId="682b9f05-e557-4b4b-b06f-52958ca31345" providerId="ADAL" clId="{2354F76F-5315-48C1-911A-66BA45A26001}" dt="2020-03-26T14:36:02.158" v="295" actId="478"/>
+          <ac:cxnSpMkLst>
+            <pc:docMk/>
+            <pc:sldMk cId="1542958727" sldId="706"/>
+            <ac:cxnSpMk id="21" creationId="{6015B575-0B26-4144-B087-5CAC06864EC4}"/>
+          </ac:cxnSpMkLst>
+        </pc:cxnChg>
+        <pc:cxnChg chg="add del mod">
+          <ac:chgData name="Geissler, Andreas" userId="682b9f05-e557-4b4b-b06f-52958ca31345" providerId="ADAL" clId="{2354F76F-5315-48C1-911A-66BA45A26001}" dt="2020-03-26T14:35:36.689" v="290" actId="478"/>
+          <ac:cxnSpMkLst>
+            <pc:docMk/>
+            <pc:sldMk cId="1542958727" sldId="706"/>
+            <ac:cxnSpMk id="23" creationId="{6ADAB386-BFB3-43E2-95F8-A0A9BB532B4C}"/>
+          </ac:cxnSpMkLst>
+        </pc:cxnChg>
+        <pc:cxnChg chg="del">
+          <ac:chgData name="Geissler, Andreas" userId="682b9f05-e557-4b4b-b06f-52958ca31345" providerId="ADAL" clId="{2354F76F-5315-48C1-911A-66BA45A26001}" dt="2020-03-26T14:38:21.509" v="339" actId="478"/>
+          <ac:cxnSpMkLst>
+            <pc:docMk/>
+            <pc:sldMk cId="1542958727" sldId="706"/>
+            <ac:cxnSpMk id="26" creationId="{5155B80F-6E4D-4CFF-BD48-AD581C3BF5DF}"/>
+          </ac:cxnSpMkLst>
+        </pc:cxnChg>
+        <pc:cxnChg chg="add mod">
+          <ac:chgData name="Geissler, Andreas" userId="682b9f05-e557-4b4b-b06f-52958ca31345" providerId="ADAL" clId="{2354F76F-5315-48C1-911A-66BA45A26001}" dt="2020-03-26T14:37:23.498" v="326" actId="1076"/>
+          <ac:cxnSpMkLst>
+            <pc:docMk/>
+            <pc:sldMk cId="1542958727" sldId="706"/>
+            <ac:cxnSpMk id="34" creationId="{BCE14581-64EE-4575-85AE-25446E8ED5A2}"/>
+          </ac:cxnSpMkLst>
+        </pc:cxnChg>
+        <pc:cxnChg chg="add mod">
+          <ac:chgData name="Geissler, Andreas" userId="682b9f05-e557-4b4b-b06f-52958ca31345" providerId="ADAL" clId="{2354F76F-5315-48C1-911A-66BA45A26001}" dt="2020-03-26T14:37:42.270" v="330" actId="14100"/>
+          <ac:cxnSpMkLst>
+            <pc:docMk/>
+            <pc:sldMk cId="1542958727" sldId="706"/>
+            <ac:cxnSpMk id="37" creationId="{129F4A9E-7331-4E1D-A139-DF9F46D43165}"/>
+          </ac:cxnSpMkLst>
+        </pc:cxnChg>
+        <pc:cxnChg chg="add mod">
+          <ac:chgData name="Geissler, Andreas" userId="682b9f05-e557-4b4b-b06f-52958ca31345" providerId="ADAL" clId="{2354F76F-5315-48C1-911A-66BA45A26001}" dt="2020-03-26T14:37:52.536" v="333" actId="14100"/>
+          <ac:cxnSpMkLst>
+            <pc:docMk/>
+            <pc:sldMk cId="1542958727" sldId="706"/>
+            <ac:cxnSpMk id="40" creationId="{F9800206-C9EC-41F2-B50C-2BAE7DFAFA41}"/>
+          </ac:cxnSpMkLst>
+        </pc:cxnChg>
+        <pc:cxnChg chg="add mod">
+          <ac:chgData name="Geissler, Andreas" userId="682b9f05-e557-4b4b-b06f-52958ca31345" providerId="ADAL" clId="{2354F76F-5315-48C1-911A-66BA45A26001}" dt="2020-03-26T14:38:56.472" v="353" actId="108"/>
+          <ac:cxnSpMkLst>
+            <pc:docMk/>
+            <pc:sldMk cId="1542958727" sldId="706"/>
+            <ac:cxnSpMk id="43" creationId="{19C30FD8-7CB0-4BFC-AD54-BE8438C4DC0E}"/>
+          </ac:cxnSpMkLst>
+        </pc:cxnChg>
+        <pc:cxnChg chg="add mod">
+          <ac:chgData name="Geissler, Andreas" userId="682b9f05-e557-4b4b-b06f-52958ca31345" providerId="ADAL" clId="{2354F76F-5315-48C1-911A-66BA45A26001}" dt="2020-03-26T14:38:50.539" v="352" actId="1076"/>
+          <ac:cxnSpMkLst>
+            <pc:docMk/>
+            <pc:sldMk cId="1542958727" sldId="706"/>
+            <ac:cxnSpMk id="46" creationId="{BD5E90CA-7159-4B4D-A9AB-6C22C5BA6862}"/>
+          </ac:cxnSpMkLst>
+        </pc:cxnChg>
+        <pc:cxnChg chg="add mod">
+          <ac:chgData name="Geissler, Andreas" userId="682b9f05-e557-4b4b-b06f-52958ca31345" providerId="ADAL" clId="{2354F76F-5315-48C1-911A-66BA45A26001}" dt="2020-03-26T14:44:38.964" v="359" actId="14100"/>
+          <ac:cxnSpMkLst>
+            <pc:docMk/>
+            <pc:sldMk cId="1542958727" sldId="706"/>
+            <ac:cxnSpMk id="47" creationId="{D9A10303-4EB7-4D60-A186-EC9FF95F0EB4}"/>
+          </ac:cxnSpMkLst>
+        </pc:cxnChg>
+      </pc:sldChg>
+      <pc:sldChg chg="addSp delSp modSp add">
+        <pc:chgData name="Geissler, Andreas" userId="682b9f05-e557-4b4b-b06f-52958ca31345" providerId="ADAL" clId="{2354F76F-5315-48C1-911A-66BA45A26001}" dt="2020-03-26T15:22:27.406" v="437" actId="208"/>
+        <pc:sldMkLst>
+          <pc:docMk/>
+          <pc:sldMk cId="2432954421" sldId="707"/>
+        </pc:sldMkLst>
+        <pc:spChg chg="mod">
+          <ac:chgData name="Geissler, Andreas" userId="682b9f05-e557-4b4b-b06f-52958ca31345" providerId="ADAL" clId="{2354F76F-5315-48C1-911A-66BA45A26001}" dt="2020-03-26T15:21:05.250" v="387" actId="20577"/>
+          <ac:spMkLst>
+            <pc:docMk/>
+            <pc:sldMk cId="2432954421" sldId="707"/>
+            <ac:spMk id="3" creationId="{33AE3105-D96B-4360-8405-E2954042769F}"/>
+          </ac:spMkLst>
+        </pc:spChg>
+        <pc:spChg chg="del">
+          <ac:chgData name="Geissler, Andreas" userId="682b9f05-e557-4b4b-b06f-52958ca31345" providerId="ADAL" clId="{2354F76F-5315-48C1-911A-66BA45A26001}" dt="2020-03-26T15:19:50.917" v="362" actId="478"/>
+          <ac:spMkLst>
+            <pc:docMk/>
+            <pc:sldMk cId="2432954421" sldId="707"/>
+            <ac:spMk id="7" creationId="{402CFC1B-62A9-4EDA-A833-D80B34A16483}"/>
+          </ac:spMkLst>
+        </pc:spChg>
+        <pc:spChg chg="mod">
+          <ac:chgData name="Geissler, Andreas" userId="682b9f05-e557-4b4b-b06f-52958ca31345" providerId="ADAL" clId="{2354F76F-5315-48C1-911A-66BA45A26001}" dt="2020-03-26T15:21:16.157" v="407" actId="20577"/>
+          <ac:spMkLst>
+            <pc:docMk/>
+            <pc:sldMk cId="2432954421" sldId="707"/>
+            <ac:spMk id="8" creationId="{86884906-D068-405E-9CE5-0777FA37AEAE}"/>
+          </ac:spMkLst>
+        </pc:spChg>
+        <pc:spChg chg="mod">
+          <ac:chgData name="Geissler, Andreas" userId="682b9f05-e557-4b4b-b06f-52958ca31345" providerId="ADAL" clId="{2354F76F-5315-48C1-911A-66BA45A26001}" dt="2020-03-26T15:22:16.914" v="436" actId="20577"/>
+          <ac:spMkLst>
+            <pc:docMk/>
+            <pc:sldMk cId="2432954421" sldId="707"/>
+            <ac:spMk id="9" creationId="{6BC292BF-1EC3-45FC-A2A9-F54981036079}"/>
+          </ac:spMkLst>
+        </pc:spChg>
+        <pc:spChg chg="add mod">
+          <ac:chgData name="Geissler, Andreas" userId="682b9f05-e557-4b4b-b06f-52958ca31345" providerId="ADAL" clId="{2354F76F-5315-48C1-911A-66BA45A26001}" dt="2020-03-26T15:22:27.406" v="437" actId="208"/>
+          <ac:spMkLst>
+            <pc:docMk/>
+            <pc:sldMk cId="2432954421" sldId="707"/>
+            <ac:spMk id="14" creationId="{77B8C226-2441-42CB-8B2C-5628025DEA31}"/>
+          </ac:spMkLst>
+        </pc:spChg>
+        <pc:spChg chg="mod">
+          <ac:chgData name="Geissler, Andreas" userId="682b9f05-e557-4b4b-b06f-52958ca31345" providerId="ADAL" clId="{2354F76F-5315-48C1-911A-66BA45A26001}" dt="2020-03-26T15:20:42.289" v="366" actId="14100"/>
+          <ac:spMkLst>
+            <pc:docMk/>
+            <pc:sldMk cId="2432954421" sldId="707"/>
+            <ac:spMk id="27" creationId="{113AA591-17A2-42B5-878A-4F61DA7A7DE4}"/>
+          </ac:spMkLst>
+        </pc:spChg>
+        <pc:spChg chg="mod">
+          <ac:chgData name="Geissler, Andreas" userId="682b9f05-e557-4b4b-b06f-52958ca31345" providerId="ADAL" clId="{2354F76F-5315-48C1-911A-66BA45A26001}" dt="2020-03-26T15:20:48.336" v="367" actId="1076"/>
+          <ac:spMkLst>
+            <pc:docMk/>
+            <pc:sldMk cId="2432954421" sldId="707"/>
+            <ac:spMk id="28" creationId="{C2025D8E-62FB-4EB0-998B-2B15F881E249}"/>
+          </ac:spMkLst>
+        </pc:spChg>
+        <pc:cxnChg chg="del">
+          <ac:chgData name="Geissler, Andreas" userId="682b9f05-e557-4b4b-b06f-52958ca31345" providerId="ADAL" clId="{2354F76F-5315-48C1-911A-66BA45A26001}" dt="2020-03-26T15:19:58.209" v="365" actId="478"/>
+          <ac:cxnSpMkLst>
+            <pc:docMk/>
+            <pc:sldMk cId="2432954421" sldId="707"/>
+            <ac:cxnSpMk id="12" creationId="{53814E33-C7CC-4428-9B1D-2C9EF7349B2D}"/>
+          </ac:cxnSpMkLst>
+        </pc:cxnChg>
+        <pc:cxnChg chg="del mod">
+          <ac:chgData name="Geissler, Andreas" userId="682b9f05-e557-4b4b-b06f-52958ca31345" providerId="ADAL" clId="{2354F76F-5315-48C1-911A-66BA45A26001}" dt="2020-03-26T15:21:52.392" v="412" actId="478"/>
+          <ac:cxnSpMkLst>
+            <pc:docMk/>
+            <pc:sldMk cId="2432954421" sldId="707"/>
+            <ac:cxnSpMk id="15" creationId="{094F8B71-5104-41A3-BA19-8CD0CC49AC41}"/>
+          </ac:cxnSpMkLst>
+        </pc:cxnChg>
+        <pc:cxnChg chg="add mod">
+          <ac:chgData name="Geissler, Andreas" userId="682b9f05-e557-4b4b-b06f-52958ca31345" providerId="ADAL" clId="{2354F76F-5315-48C1-911A-66BA45A26001}" dt="2020-03-26T15:21:57.457" v="415" actId="14100"/>
+          <ac:cxnSpMkLst>
+            <pc:docMk/>
+            <pc:sldMk cId="2432954421" sldId="707"/>
+            <ac:cxnSpMk id="16" creationId="{261B4848-2DD1-4BED-A9BB-B8C38406CEF2}"/>
+          </ac:cxnSpMkLst>
+        </pc:cxnChg>
+        <pc:cxnChg chg="del mod">
+          <ac:chgData name="Geissler, Andreas" userId="682b9f05-e557-4b4b-b06f-52958ca31345" providerId="ADAL" clId="{2354F76F-5315-48C1-911A-66BA45A26001}" dt="2020-03-26T15:19:53.269" v="363" actId="478"/>
+          <ac:cxnSpMkLst>
+            <pc:docMk/>
+            <pc:sldMk cId="2432954421" sldId="707"/>
+            <ac:cxnSpMk id="18" creationId="{A411D493-7599-4AB1-A7FD-2B09CEA97E14}"/>
+          </ac:cxnSpMkLst>
+        </pc:cxnChg>
+        <pc:cxnChg chg="del">
+          <ac:chgData name="Geissler, Andreas" userId="682b9f05-e557-4b4b-b06f-52958ca31345" providerId="ADAL" clId="{2354F76F-5315-48C1-911A-66BA45A26001}" dt="2020-03-26T15:19:55.821" v="364" actId="478"/>
+          <ac:cxnSpMkLst>
+            <pc:docMk/>
+            <pc:sldMk cId="2432954421" sldId="707"/>
+            <ac:cxnSpMk id="21" creationId="{6015B575-0B26-4144-B087-5CAC06864EC4}"/>
+          </ac:cxnSpMkLst>
+        </pc:cxnChg>
+        <pc:cxnChg chg="del">
+          <ac:chgData name="Geissler, Andreas" userId="682b9f05-e557-4b4b-b06f-52958ca31345" providerId="ADAL" clId="{2354F76F-5315-48C1-911A-66BA45A26001}" dt="2020-03-26T15:21:47.537" v="411" actId="478"/>
+          <ac:cxnSpMkLst>
+            <pc:docMk/>
+            <pc:sldMk cId="2432954421" sldId="707"/>
+            <ac:cxnSpMk id="26" creationId="{5155B80F-6E4D-4CFF-BD48-AD581C3BF5DF}"/>
+          </ac:cxnSpMkLst>
+        </pc:cxnChg>
+      </pc:sldChg>
+    </pc:docChg>
+  </pc:docChgLst>
+  <pc:docChgLst>
     <pc:chgData name="Geissler, Andreas" userId="682b9f05-e557-4b4b-b06f-52958ca31345" providerId="ADAL" clId="{0C0D5402-C8C0-492D-BB71-4D6F487C57BF}"/>
     <pc:docChg chg="undo custSel modSld modMainMaster">
       <pc:chgData name="Geissler, Andreas" userId="682b9f05-e557-4b4b-b06f-52958ca31345" providerId="ADAL" clId="{0C0D5402-C8C0-492D-BB71-4D6F487C57BF}" dt="2020-03-31T08:43:22.233" v="150" actId="1076"/>
@@ -1933,690 +2617,6 @@
           </pc:spChg>
         </pc:sldLayoutChg>
       </pc:sldMasterChg>
-    </pc:docChg>
-  </pc:docChgLst>
-  <pc:docChgLst>
-    <pc:chgData name="Geissler, Andreas" userId="682b9f05-e557-4b4b-b06f-52958ca31345" providerId="ADAL" clId="{2354F76F-5315-48C1-911A-66BA45A26001}"/>
-    <pc:docChg chg="custSel addSld modSld sldOrd">
-      <pc:chgData name="Geissler, Andreas" userId="682b9f05-e557-4b4b-b06f-52958ca31345" providerId="ADAL" clId="{2354F76F-5315-48C1-911A-66BA45A26001}" dt="2020-03-26T15:22:27.406" v="437" actId="208"/>
-      <pc:docMkLst>
-        <pc:docMk/>
-      </pc:docMkLst>
-      <pc:sldChg chg="addSp delSp modSp">
-        <pc:chgData name="Geissler, Andreas" userId="682b9f05-e557-4b4b-b06f-52958ca31345" providerId="ADAL" clId="{2354F76F-5315-48C1-911A-66BA45A26001}" dt="2020-03-25T11:37:29.717" v="62" actId="1076"/>
-        <pc:sldMkLst>
-          <pc:docMk/>
-          <pc:sldMk cId="2997902877" sldId="703"/>
-        </pc:sldMkLst>
-        <pc:spChg chg="mod">
-          <ac:chgData name="Geissler, Andreas" userId="682b9f05-e557-4b4b-b06f-52958ca31345" providerId="ADAL" clId="{2354F76F-5315-48C1-911A-66BA45A26001}" dt="2020-03-25T11:37:06.606" v="56" actId="14100"/>
-          <ac:spMkLst>
-            <pc:docMk/>
-            <pc:sldMk cId="2997902877" sldId="703"/>
-            <ac:spMk id="14" creationId="{5A64CB0D-68AD-431E-BFFD-E111323E4527}"/>
-          </ac:spMkLst>
-        </pc:spChg>
-        <pc:spChg chg="mod">
-          <ac:chgData name="Geissler, Andreas" userId="682b9f05-e557-4b4b-b06f-52958ca31345" providerId="ADAL" clId="{2354F76F-5315-48C1-911A-66BA45A26001}" dt="2020-03-25T11:37:29.717" v="62" actId="1076"/>
-          <ac:spMkLst>
-            <pc:docMk/>
-            <pc:sldMk cId="2997902877" sldId="703"/>
-            <ac:spMk id="73" creationId="{3AB8C243-9AAA-4F4F-86B2-E046527592D2}"/>
-          </ac:spMkLst>
-        </pc:spChg>
-        <pc:picChg chg="add mod">
-          <ac:chgData name="Geissler, Andreas" userId="682b9f05-e557-4b4b-b06f-52958ca31345" providerId="ADAL" clId="{2354F76F-5315-48C1-911A-66BA45A26001}" dt="2020-03-25T09:40:09.158" v="3" actId="1076"/>
-          <ac:picMkLst>
-            <pc:docMk/>
-            <pc:sldMk cId="2997902877" sldId="703"/>
-            <ac:picMk id="15" creationId="{D62F9C15-0C82-49D2-A13A-81FD368E47A5}"/>
-          </ac:picMkLst>
-        </pc:picChg>
-        <pc:picChg chg="add mod">
-          <ac:chgData name="Geissler, Andreas" userId="682b9f05-e557-4b4b-b06f-52958ca31345" providerId="ADAL" clId="{2354F76F-5315-48C1-911A-66BA45A26001}" dt="2020-03-25T09:40:36.900" v="7" actId="1076"/>
-          <ac:picMkLst>
-            <pc:docMk/>
-            <pc:sldMk cId="2997902877" sldId="703"/>
-            <ac:picMk id="17" creationId="{8406327E-3B09-47BB-A642-8EB9EDE5D0FF}"/>
-          </ac:picMkLst>
-        </pc:picChg>
-        <pc:picChg chg="add mod">
-          <ac:chgData name="Geissler, Andreas" userId="682b9f05-e557-4b4b-b06f-52958ca31345" providerId="ADAL" clId="{2354F76F-5315-48C1-911A-66BA45A26001}" dt="2020-03-25T09:40:58.133" v="11" actId="1076"/>
-          <ac:picMkLst>
-            <pc:docMk/>
-            <pc:sldMk cId="2997902877" sldId="703"/>
-            <ac:picMk id="19" creationId="{8234EDAC-9DF8-42F1-8FDE-E6885E8683A1}"/>
-          </ac:picMkLst>
-        </pc:picChg>
-        <pc:picChg chg="add del mod">
-          <ac:chgData name="Geissler, Andreas" userId="682b9f05-e557-4b4b-b06f-52958ca31345" providerId="ADAL" clId="{2354F76F-5315-48C1-911A-66BA45A26001}" dt="2020-03-25T09:41:09.611" v="14" actId="478"/>
-          <ac:picMkLst>
-            <pc:docMk/>
-            <pc:sldMk cId="2997902877" sldId="703"/>
-            <ac:picMk id="21" creationId="{BB6F8D16-B44D-46AC-9ADF-2770D4E66244}"/>
-          </ac:picMkLst>
-        </pc:picChg>
-        <pc:picChg chg="add mod">
-          <ac:chgData name="Geissler, Andreas" userId="682b9f05-e557-4b4b-b06f-52958ca31345" providerId="ADAL" clId="{2354F76F-5315-48C1-911A-66BA45A26001}" dt="2020-03-25T09:41:23.141" v="18" actId="1076"/>
-          <ac:picMkLst>
-            <pc:docMk/>
-            <pc:sldMk cId="2997902877" sldId="703"/>
-            <ac:picMk id="23" creationId="{D35C6022-ABDF-48EB-A508-54BCBDAD1CA0}"/>
-          </ac:picMkLst>
-        </pc:picChg>
-        <pc:picChg chg="add mod">
-          <ac:chgData name="Geissler, Andreas" userId="682b9f05-e557-4b4b-b06f-52958ca31345" providerId="ADAL" clId="{2354F76F-5315-48C1-911A-66BA45A26001}" dt="2020-03-25T09:41:46.683" v="24" actId="1076"/>
-          <ac:picMkLst>
-            <pc:docMk/>
-            <pc:sldMk cId="2997902877" sldId="703"/>
-            <ac:picMk id="25" creationId="{5845F35A-B2DA-4C50-ADFD-11D6E26D9A71}"/>
-          </ac:picMkLst>
-        </pc:picChg>
-        <pc:picChg chg="add mod">
-          <ac:chgData name="Geissler, Andreas" userId="682b9f05-e557-4b4b-b06f-52958ca31345" providerId="ADAL" clId="{2354F76F-5315-48C1-911A-66BA45A26001}" dt="2020-03-25T09:42:09.460" v="28" actId="1076"/>
-          <ac:picMkLst>
-            <pc:docMk/>
-            <pc:sldMk cId="2997902877" sldId="703"/>
-            <ac:picMk id="27" creationId="{FE872FB0-816C-4D50-AE40-9ED80B144FBB}"/>
-          </ac:picMkLst>
-        </pc:picChg>
-        <pc:picChg chg="add mod">
-          <ac:chgData name="Geissler, Andreas" userId="682b9f05-e557-4b4b-b06f-52958ca31345" providerId="ADAL" clId="{2354F76F-5315-48C1-911A-66BA45A26001}" dt="2020-03-25T09:43:02.516" v="40" actId="1076"/>
-          <ac:picMkLst>
-            <pc:docMk/>
-            <pc:sldMk cId="2997902877" sldId="703"/>
-            <ac:picMk id="29" creationId="{D80DFBE9-AFF1-42C9-9D8A-8246E0D209DC}"/>
-          </ac:picMkLst>
-        </pc:picChg>
-        <pc:picChg chg="add mod">
-          <ac:chgData name="Geissler, Andreas" userId="682b9f05-e557-4b4b-b06f-52958ca31345" providerId="ADAL" clId="{2354F76F-5315-48C1-911A-66BA45A26001}" dt="2020-03-25T09:43:28.008" v="44" actId="1076"/>
-          <ac:picMkLst>
-            <pc:docMk/>
-            <pc:sldMk cId="2997902877" sldId="703"/>
-            <ac:picMk id="32" creationId="{19760A13-6610-42CB-BD3C-C6BABCD76DF8}"/>
-          </ac:picMkLst>
-        </pc:picChg>
-        <pc:picChg chg="add mod">
-          <ac:chgData name="Geissler, Andreas" userId="682b9f05-e557-4b4b-b06f-52958ca31345" providerId="ADAL" clId="{2354F76F-5315-48C1-911A-66BA45A26001}" dt="2020-03-25T09:46:59.459" v="50" actId="1076"/>
-          <ac:picMkLst>
-            <pc:docMk/>
-            <pc:sldMk cId="2997902877" sldId="703"/>
-            <ac:picMk id="35" creationId="{F4389802-A75D-467D-8A1D-6C32685875B3}"/>
-          </ac:picMkLst>
-        </pc:picChg>
-        <pc:picChg chg="del">
-          <ac:chgData name="Geissler, Andreas" userId="682b9f05-e557-4b4b-b06f-52958ca31345" providerId="ADAL" clId="{2354F76F-5315-48C1-911A-66BA45A26001}" dt="2020-03-25T09:40:32.267" v="6" actId="478"/>
-          <ac:picMkLst>
-            <pc:docMk/>
-            <pc:sldMk cId="2997902877" sldId="703"/>
-            <ac:picMk id="78" creationId="{00000000-0000-0000-0000-000000000000}"/>
-          </ac:picMkLst>
-        </pc:picChg>
-        <pc:picChg chg="del">
-          <ac:chgData name="Geissler, Andreas" userId="682b9f05-e557-4b4b-b06f-52958ca31345" providerId="ADAL" clId="{2354F76F-5315-48C1-911A-66BA45A26001}" dt="2020-03-25T09:43:14.540" v="42" actId="478"/>
-          <ac:picMkLst>
-            <pc:docMk/>
-            <pc:sldMk cId="2997902877" sldId="703"/>
-            <ac:picMk id="87" creationId="{1B7F91D5-F44D-45BA-82B8-3AB2B36C49A2}"/>
-          </ac:picMkLst>
-        </pc:picChg>
-        <pc:picChg chg="add mod">
-          <ac:chgData name="Geissler, Andreas" userId="682b9f05-e557-4b4b-b06f-52958ca31345" providerId="ADAL" clId="{2354F76F-5315-48C1-911A-66BA45A26001}" dt="2020-03-25T09:42:27.420" v="32" actId="1076"/>
-          <ac:picMkLst>
-            <pc:docMk/>
-            <pc:sldMk cId="2997902877" sldId="703"/>
-            <ac:picMk id="115" creationId="{532450B5-92C4-4235-A0A4-F8D5587AE73F}"/>
-          </ac:picMkLst>
-        </pc:picChg>
-        <pc:picChg chg="add mod">
-          <ac:chgData name="Geissler, Andreas" userId="682b9f05-e557-4b4b-b06f-52958ca31345" providerId="ADAL" clId="{2354F76F-5315-48C1-911A-66BA45A26001}" dt="2020-03-25T09:42:40.227" v="35" actId="1076"/>
-          <ac:picMkLst>
-            <pc:docMk/>
-            <pc:sldMk cId="2997902877" sldId="703"/>
-            <ac:picMk id="120" creationId="{579139BB-89F7-41B5-B8C7-D08F88692F64}"/>
-          </ac:picMkLst>
-        </pc:picChg>
-        <pc:picChg chg="add mod">
-          <ac:chgData name="Geissler, Andreas" userId="682b9f05-e557-4b4b-b06f-52958ca31345" providerId="ADAL" clId="{2354F76F-5315-48C1-911A-66BA45A26001}" dt="2020-03-25T09:43:35.346" v="46" actId="1076"/>
-          <ac:picMkLst>
-            <pc:docMk/>
-            <pc:sldMk cId="2997902877" sldId="703"/>
-            <ac:picMk id="121" creationId="{0F81061E-8FB6-41AB-AACC-E179CA0D1123}"/>
-          </ac:picMkLst>
-        </pc:picChg>
-        <pc:picChg chg="del">
-          <ac:chgData name="Geissler, Andreas" userId="682b9f05-e557-4b4b-b06f-52958ca31345" providerId="ADAL" clId="{2354F76F-5315-48C1-911A-66BA45A26001}" dt="2020-03-25T09:42:02.445" v="27" actId="478"/>
-          <ac:picMkLst>
-            <pc:docMk/>
-            <pc:sldMk cId="2997902877" sldId="703"/>
-            <ac:picMk id="126" creationId="{154CB8D8-ADEA-4D3E-99FB-36829D51B6AB}"/>
-          </ac:picMkLst>
-        </pc:picChg>
-        <pc:picChg chg="del">
-          <ac:chgData name="Geissler, Andreas" userId="682b9f05-e557-4b4b-b06f-52958ca31345" providerId="ADAL" clId="{2354F76F-5315-48C1-911A-66BA45A26001}" dt="2020-03-25T09:43:16.703" v="43" actId="478"/>
-          <ac:picMkLst>
-            <pc:docMk/>
-            <pc:sldMk cId="2997902877" sldId="703"/>
-            <ac:picMk id="129" creationId="{EEAA159A-CA54-4F20-81EF-A3F4F7690D51}"/>
-          </ac:picMkLst>
-        </pc:picChg>
-        <pc:picChg chg="del">
-          <ac:chgData name="Geissler, Andreas" userId="682b9f05-e557-4b4b-b06f-52958ca31345" providerId="ADAL" clId="{2354F76F-5315-48C1-911A-66BA45A26001}" dt="2020-03-25T09:46:53.213" v="49" actId="478"/>
-          <ac:picMkLst>
-            <pc:docMk/>
-            <pc:sldMk cId="2997902877" sldId="703"/>
-            <ac:picMk id="131" creationId="{D3BBFEE6-3A98-45AC-9089-7086390869B2}"/>
-          </ac:picMkLst>
-        </pc:picChg>
-        <pc:picChg chg="del">
-          <ac:chgData name="Geissler, Andreas" userId="682b9f05-e557-4b4b-b06f-52958ca31345" providerId="ADAL" clId="{2354F76F-5315-48C1-911A-66BA45A26001}" dt="2020-03-25T09:42:50.814" v="37" actId="478"/>
-          <ac:picMkLst>
-            <pc:docMk/>
-            <pc:sldMk cId="2997902877" sldId="703"/>
-            <ac:picMk id="139" creationId="{4CD7D1C3-2C36-4BE8-8C67-88530B75B14E}"/>
-          </ac:picMkLst>
-        </pc:picChg>
-        <pc:picChg chg="del">
-          <ac:chgData name="Geissler, Andreas" userId="682b9f05-e557-4b4b-b06f-52958ca31345" providerId="ADAL" clId="{2354F76F-5315-48C1-911A-66BA45A26001}" dt="2020-03-25T09:42:34.157" v="33" actId="478"/>
-          <ac:picMkLst>
-            <pc:docMk/>
-            <pc:sldMk cId="2997902877" sldId="703"/>
-            <ac:picMk id="143" creationId="{DB48DA22-BF9A-46E8-8C8E-C5262A9B97C0}"/>
-          </ac:picMkLst>
-        </pc:picChg>
-        <pc:picChg chg="del">
-          <ac:chgData name="Geissler, Andreas" userId="682b9f05-e557-4b4b-b06f-52958ca31345" providerId="ADAL" clId="{2354F76F-5315-48C1-911A-66BA45A26001}" dt="2020-03-25T09:42:17.180" v="30" actId="478"/>
-          <ac:picMkLst>
-            <pc:docMk/>
-            <pc:sldMk cId="2997902877" sldId="703"/>
-            <ac:picMk id="144" creationId="{1B39C302-6370-4044-BE3A-432B76EE3513}"/>
-          </ac:picMkLst>
-        </pc:picChg>
-        <pc:picChg chg="del">
-          <ac:chgData name="Geissler, Andreas" userId="682b9f05-e557-4b4b-b06f-52958ca31345" providerId="ADAL" clId="{2354F76F-5315-48C1-911A-66BA45A26001}" dt="2020-03-25T09:40:51.020" v="10" actId="478"/>
-          <ac:picMkLst>
-            <pc:docMk/>
-            <pc:sldMk cId="2997902877" sldId="703"/>
-            <ac:picMk id="146" creationId="{4C2B348C-41FA-4316-862F-2BEB70C7DC75}"/>
-          </ac:picMkLst>
-        </pc:picChg>
-        <pc:picChg chg="del">
-          <ac:chgData name="Geissler, Andreas" userId="682b9f05-e557-4b4b-b06f-52958ca31345" providerId="ADAL" clId="{2354F76F-5315-48C1-911A-66BA45A26001}" dt="2020-03-25T09:40:03.884" v="2" actId="478"/>
-          <ac:picMkLst>
-            <pc:docMk/>
-            <pc:sldMk cId="2997902877" sldId="703"/>
-            <ac:picMk id="148" creationId="{8A2C740A-4F13-4770-A568-574E58A492B3}"/>
-          </ac:picMkLst>
-        </pc:picChg>
-        <pc:picChg chg="del">
-          <ac:chgData name="Geissler, Andreas" userId="682b9f05-e557-4b4b-b06f-52958ca31345" providerId="ADAL" clId="{2354F76F-5315-48C1-911A-66BA45A26001}" dt="2020-03-25T09:41:33.550" v="21" actId="478"/>
-          <ac:picMkLst>
-            <pc:docMk/>
-            <pc:sldMk cId="2997902877" sldId="703"/>
-            <ac:picMk id="154" creationId="{DCF2E2F6-13F0-42EF-9506-356B5FBD4815}"/>
-          </ac:picMkLst>
-        </pc:picChg>
-        <pc:picChg chg="del">
-          <ac:chgData name="Geissler, Andreas" userId="682b9f05-e557-4b4b-b06f-52958ca31345" providerId="ADAL" clId="{2354F76F-5315-48C1-911A-66BA45A26001}" dt="2020-03-25T09:41:18.783" v="17" actId="478"/>
-          <ac:picMkLst>
-            <pc:docMk/>
-            <pc:sldMk cId="2997902877" sldId="703"/>
-            <ac:picMk id="165" creationId="{A9A92B44-FBDB-41EA-92A0-F5FE18D46BD9}"/>
-          </ac:picMkLst>
-        </pc:picChg>
-      </pc:sldChg>
-      <pc:sldChg chg="ord">
-        <pc:chgData name="Geissler, Andreas" userId="682b9f05-e557-4b4b-b06f-52958ca31345" providerId="ADAL" clId="{2354F76F-5315-48C1-911A-66BA45A26001}" dt="2020-03-26T15:19:36.937" v="360"/>
-        <pc:sldMkLst>
-          <pc:docMk/>
-          <pc:sldMk cId="1305615921" sldId="704"/>
-        </pc:sldMkLst>
-      </pc:sldChg>
-      <pc:sldChg chg="addSp delSp modSp add">
-        <pc:chgData name="Geissler, Andreas" userId="682b9f05-e557-4b4b-b06f-52958ca31345" providerId="ADAL" clId="{2354F76F-5315-48C1-911A-66BA45A26001}" dt="2020-03-26T10:32:50.623" v="187" actId="113"/>
-        <pc:sldMkLst>
-          <pc:docMk/>
-          <pc:sldMk cId="4180180259" sldId="705"/>
-        </pc:sldMkLst>
-        <pc:spChg chg="del">
-          <ac:chgData name="Geissler, Andreas" userId="682b9f05-e557-4b4b-b06f-52958ca31345" providerId="ADAL" clId="{2354F76F-5315-48C1-911A-66BA45A26001}" dt="2020-03-26T10:25:51.616" v="64" actId="478"/>
-          <ac:spMkLst>
-            <pc:docMk/>
-            <pc:sldMk cId="4180180259" sldId="705"/>
-            <ac:spMk id="2" creationId="{00000000-0000-0000-0000-000000000000}"/>
-          </ac:spMkLst>
-        </pc:spChg>
-        <pc:spChg chg="add mod">
-          <ac:chgData name="Geissler, Andreas" userId="682b9f05-e557-4b4b-b06f-52958ca31345" providerId="ADAL" clId="{2354F76F-5315-48C1-911A-66BA45A26001}" dt="2020-03-26T10:26:59.990" v="90" actId="404"/>
-          <ac:spMkLst>
-            <pc:docMk/>
-            <pc:sldMk cId="4180180259" sldId="705"/>
-            <ac:spMk id="3" creationId="{33AE3105-D96B-4360-8405-E2954042769F}"/>
-          </ac:spMkLst>
-        </pc:spChg>
-        <pc:spChg chg="del">
-          <ac:chgData name="Geissler, Andreas" userId="682b9f05-e557-4b4b-b06f-52958ca31345" providerId="ADAL" clId="{2354F76F-5315-48C1-911A-66BA45A26001}" dt="2020-03-26T10:25:56.878" v="65" actId="478"/>
-          <ac:spMkLst>
-            <pc:docMk/>
-            <pc:sldMk cId="4180180259" sldId="705"/>
-            <ac:spMk id="4" creationId="{5FF0F7E6-4299-4334-9285-A4BA3DB64DE7}"/>
-          </ac:spMkLst>
-        </pc:spChg>
-        <pc:spChg chg="del">
-          <ac:chgData name="Geissler, Andreas" userId="682b9f05-e557-4b4b-b06f-52958ca31345" providerId="ADAL" clId="{2354F76F-5315-48C1-911A-66BA45A26001}" dt="2020-03-26T10:25:56.878" v="65" actId="478"/>
-          <ac:spMkLst>
-            <pc:docMk/>
-            <pc:sldMk cId="4180180259" sldId="705"/>
-            <ac:spMk id="5" creationId="{5D8AE03F-F60F-41FF-8E3E-916B4E4BDAA8}"/>
-          </ac:spMkLst>
-        </pc:spChg>
-        <pc:spChg chg="del">
-          <ac:chgData name="Geissler, Andreas" userId="682b9f05-e557-4b4b-b06f-52958ca31345" providerId="ADAL" clId="{2354F76F-5315-48C1-911A-66BA45A26001}" dt="2020-03-26T10:25:56.878" v="65" actId="478"/>
-          <ac:spMkLst>
-            <pc:docMk/>
-            <pc:sldMk cId="4180180259" sldId="705"/>
-            <ac:spMk id="6" creationId="{858F9259-E169-4A2D-AF50-7E09A882D134}"/>
-          </ac:spMkLst>
-        </pc:spChg>
-        <pc:spChg chg="add mod">
-          <ac:chgData name="Geissler, Andreas" userId="682b9f05-e557-4b4b-b06f-52958ca31345" providerId="ADAL" clId="{2354F76F-5315-48C1-911A-66BA45A26001}" dt="2020-03-26T10:27:24.494" v="98" actId="20577"/>
-          <ac:spMkLst>
-            <pc:docMk/>
-            <pc:sldMk cId="4180180259" sldId="705"/>
-            <ac:spMk id="7" creationId="{402CFC1B-62A9-4EDA-A833-D80B34A16483}"/>
-          </ac:spMkLst>
-        </pc:spChg>
-        <pc:spChg chg="add mod">
-          <ac:chgData name="Geissler, Andreas" userId="682b9f05-e557-4b4b-b06f-52958ca31345" providerId="ADAL" clId="{2354F76F-5315-48C1-911A-66BA45A26001}" dt="2020-03-26T10:27:48.461" v="115" actId="20577"/>
-          <ac:spMkLst>
-            <pc:docMk/>
-            <pc:sldMk cId="4180180259" sldId="705"/>
-            <ac:spMk id="8" creationId="{86884906-D068-405E-9CE5-0777FA37AEAE}"/>
-          </ac:spMkLst>
-        </pc:spChg>
-        <pc:spChg chg="add mod">
-          <ac:chgData name="Geissler, Andreas" userId="682b9f05-e557-4b4b-b06f-52958ca31345" providerId="ADAL" clId="{2354F76F-5315-48C1-911A-66BA45A26001}" dt="2020-03-26T10:30:00.684" v="149" actId="1076"/>
-          <ac:spMkLst>
-            <pc:docMk/>
-            <pc:sldMk cId="4180180259" sldId="705"/>
-            <ac:spMk id="9" creationId="{6BC292BF-1EC3-45FC-A2A9-F54981036079}"/>
-          </ac:spMkLst>
-        </pc:spChg>
-        <pc:spChg chg="add mod">
-          <ac:chgData name="Geissler, Andreas" userId="682b9f05-e557-4b4b-b06f-52958ca31345" providerId="ADAL" clId="{2354F76F-5315-48C1-911A-66BA45A26001}" dt="2020-03-26T10:32:08.890" v="158" actId="207"/>
-          <ac:spMkLst>
-            <pc:docMk/>
-            <pc:sldMk cId="4180180259" sldId="705"/>
-            <ac:spMk id="27" creationId="{113AA591-17A2-42B5-878A-4F61DA7A7DE4}"/>
-          </ac:spMkLst>
-        </pc:spChg>
-        <pc:spChg chg="add mod">
-          <ac:chgData name="Geissler, Andreas" userId="682b9f05-e557-4b4b-b06f-52958ca31345" providerId="ADAL" clId="{2354F76F-5315-48C1-911A-66BA45A26001}" dt="2020-03-26T10:32:50.623" v="187" actId="113"/>
-          <ac:spMkLst>
-            <pc:docMk/>
-            <pc:sldMk cId="4180180259" sldId="705"/>
-            <ac:spMk id="28" creationId="{C2025D8E-62FB-4EB0-998B-2B15F881E249}"/>
-          </ac:spMkLst>
-        </pc:spChg>
-        <pc:cxnChg chg="add mod">
-          <ac:chgData name="Geissler, Andreas" userId="682b9f05-e557-4b4b-b06f-52958ca31345" providerId="ADAL" clId="{2354F76F-5315-48C1-911A-66BA45A26001}" dt="2020-03-26T10:28:46.766" v="134" actId="208"/>
-          <ac:cxnSpMkLst>
-            <pc:docMk/>
-            <pc:sldMk cId="4180180259" sldId="705"/>
-            <ac:cxnSpMk id="11" creationId="{7FB6985D-6845-48AF-AF17-38E213D9A7C6}"/>
-          </ac:cxnSpMkLst>
-        </pc:cxnChg>
-        <pc:cxnChg chg="add mod">
-          <ac:chgData name="Geissler, Andreas" userId="682b9f05-e557-4b4b-b06f-52958ca31345" providerId="ADAL" clId="{2354F76F-5315-48C1-911A-66BA45A26001}" dt="2020-03-26T10:29:06.588" v="138" actId="1076"/>
-          <ac:cxnSpMkLst>
-            <pc:docMk/>
-            <pc:sldMk cId="4180180259" sldId="705"/>
-            <ac:cxnSpMk id="12" creationId="{53814E33-C7CC-4428-9B1D-2C9EF7349B2D}"/>
-          </ac:cxnSpMkLst>
-        </pc:cxnChg>
-        <pc:cxnChg chg="add mod">
-          <ac:chgData name="Geissler, Andreas" userId="682b9f05-e557-4b4b-b06f-52958ca31345" providerId="ADAL" clId="{2354F76F-5315-48C1-911A-66BA45A26001}" dt="2020-03-26T10:30:00.684" v="149" actId="1076"/>
-          <ac:cxnSpMkLst>
-            <pc:docMk/>
-            <pc:sldMk cId="4180180259" sldId="705"/>
-            <ac:cxnSpMk id="15" creationId="{094F8B71-5104-41A3-BA19-8CD0CC49AC41}"/>
-          </ac:cxnSpMkLst>
-        </pc:cxnChg>
-        <pc:cxnChg chg="add mod">
-          <ac:chgData name="Geissler, Andreas" userId="682b9f05-e557-4b4b-b06f-52958ca31345" providerId="ADAL" clId="{2354F76F-5315-48C1-911A-66BA45A26001}" dt="2020-03-26T10:29:39.980" v="145" actId="14100"/>
-          <ac:cxnSpMkLst>
-            <pc:docMk/>
-            <pc:sldMk cId="4180180259" sldId="705"/>
-            <ac:cxnSpMk id="18" creationId="{A411D493-7599-4AB1-A7FD-2B09CEA97E14}"/>
-          </ac:cxnSpMkLst>
-        </pc:cxnChg>
-        <pc:cxnChg chg="add mod">
-          <ac:chgData name="Geissler, Andreas" userId="682b9f05-e557-4b4b-b06f-52958ca31345" providerId="ADAL" clId="{2354F76F-5315-48C1-911A-66BA45A26001}" dt="2020-03-26T10:29:52.228" v="148" actId="14100"/>
-          <ac:cxnSpMkLst>
-            <pc:docMk/>
-            <pc:sldMk cId="4180180259" sldId="705"/>
-            <ac:cxnSpMk id="21" creationId="{6015B575-0B26-4144-B087-5CAC06864EC4}"/>
-          </ac:cxnSpMkLst>
-        </pc:cxnChg>
-        <pc:cxnChg chg="add mod">
-          <ac:chgData name="Geissler, Andreas" userId="682b9f05-e557-4b4b-b06f-52958ca31345" providerId="ADAL" clId="{2354F76F-5315-48C1-911A-66BA45A26001}" dt="2020-03-26T10:30:36.034" v="154" actId="693"/>
-          <ac:cxnSpMkLst>
-            <pc:docMk/>
-            <pc:sldMk cId="4180180259" sldId="705"/>
-            <ac:cxnSpMk id="26" creationId="{5155B80F-6E4D-4CFF-BD48-AD581C3BF5DF}"/>
-          </ac:cxnSpMkLst>
-        </pc:cxnChg>
-      </pc:sldChg>
-      <pc:sldChg chg="addSp delSp modSp add">
-        <pc:chgData name="Geissler, Andreas" userId="682b9f05-e557-4b4b-b06f-52958ca31345" providerId="ADAL" clId="{2354F76F-5315-48C1-911A-66BA45A26001}" dt="2020-03-26T14:44:38.964" v="359" actId="14100"/>
-        <pc:sldMkLst>
-          <pc:docMk/>
-          <pc:sldMk cId="1542958727" sldId="706"/>
-        </pc:sldMkLst>
-        <pc:spChg chg="mod">
-          <ac:chgData name="Geissler, Andreas" userId="682b9f05-e557-4b4b-b06f-52958ca31345" providerId="ADAL" clId="{2354F76F-5315-48C1-911A-66BA45A26001}" dt="2020-03-26T14:35:52.172" v="293" actId="1076"/>
-          <ac:spMkLst>
-            <pc:docMk/>
-            <pc:sldMk cId="1542958727" sldId="706"/>
-            <ac:spMk id="3" creationId="{33AE3105-D96B-4360-8405-E2954042769F}"/>
-          </ac:spMkLst>
-        </pc:spChg>
-        <pc:spChg chg="mod">
-          <ac:chgData name="Geissler, Andreas" userId="682b9f05-e557-4b4b-b06f-52958ca31345" providerId="ADAL" clId="{2354F76F-5315-48C1-911A-66BA45A26001}" dt="2020-03-26T14:34:59.456" v="275" actId="1076"/>
-          <ac:spMkLst>
-            <pc:docMk/>
-            <pc:sldMk cId="1542958727" sldId="706"/>
-            <ac:spMk id="7" creationId="{402CFC1B-62A9-4EDA-A833-D80B34A16483}"/>
-          </ac:spMkLst>
-        </pc:spChg>
-        <pc:spChg chg="mod">
-          <ac:chgData name="Geissler, Andreas" userId="682b9f05-e557-4b4b-b06f-52958ca31345" providerId="ADAL" clId="{2354F76F-5315-48C1-911A-66BA45A26001}" dt="2020-03-26T14:36:22.447" v="311" actId="20577"/>
-          <ac:spMkLst>
-            <pc:docMk/>
-            <pc:sldMk cId="1542958727" sldId="706"/>
-            <ac:spMk id="8" creationId="{86884906-D068-405E-9CE5-0777FA37AEAE}"/>
-          </ac:spMkLst>
-        </pc:spChg>
-        <pc:spChg chg="mod">
-          <ac:chgData name="Geissler, Andreas" userId="682b9f05-e557-4b4b-b06f-52958ca31345" providerId="ADAL" clId="{2354F76F-5315-48C1-911A-66BA45A26001}" dt="2020-03-26T14:38:33.259" v="350" actId="20577"/>
-          <ac:spMkLst>
-            <pc:docMk/>
-            <pc:sldMk cId="1542958727" sldId="706"/>
-            <ac:spMk id="9" creationId="{6BC292BF-1EC3-45FC-A2A9-F54981036079}"/>
-          </ac:spMkLst>
-        </pc:spChg>
-        <pc:spChg chg="add mod">
-          <ac:chgData name="Geissler, Andreas" userId="682b9f05-e557-4b4b-b06f-52958ca31345" providerId="ADAL" clId="{2354F76F-5315-48C1-911A-66BA45A26001}" dt="2020-03-26T14:33:31.433" v="204" actId="208"/>
-          <ac:spMkLst>
-            <pc:docMk/>
-            <pc:sldMk cId="1542958727" sldId="706"/>
-            <ac:spMk id="14" creationId="{1294F250-EAA7-4E42-8C2E-4C38AFB295E4}"/>
-          </ac:spMkLst>
-        </pc:spChg>
-        <pc:spChg chg="add mod">
-          <ac:chgData name="Geissler, Andreas" userId="682b9f05-e557-4b4b-b06f-52958ca31345" providerId="ADAL" clId="{2354F76F-5315-48C1-911A-66BA45A26001}" dt="2020-03-26T14:34:10.937" v="241" actId="20577"/>
-          <ac:spMkLst>
-            <pc:docMk/>
-            <pc:sldMk cId="1542958727" sldId="706"/>
-            <ac:spMk id="16" creationId="{502D9E60-729E-4C8F-BEAB-5F61186B1DC6}"/>
-          </ac:spMkLst>
-        </pc:spChg>
-        <pc:spChg chg="add mod">
-          <ac:chgData name="Geissler, Andreas" userId="682b9f05-e557-4b4b-b06f-52958ca31345" providerId="ADAL" clId="{2354F76F-5315-48C1-911A-66BA45A26001}" dt="2020-03-26T14:34:55.395" v="274" actId="1076"/>
-          <ac:spMkLst>
-            <pc:docMk/>
-            <pc:sldMk cId="1542958727" sldId="706"/>
-            <ac:spMk id="19" creationId="{458AF630-9B8E-4352-9206-4E74D52E5F0B}"/>
-          </ac:spMkLst>
-        </pc:spChg>
-        <pc:spChg chg="mod">
-          <ac:chgData name="Geissler, Andreas" userId="682b9f05-e557-4b4b-b06f-52958ca31345" providerId="ADAL" clId="{2354F76F-5315-48C1-911A-66BA45A26001}" dt="2020-03-26T14:39:01.822" v="354" actId="14100"/>
-          <ac:spMkLst>
-            <pc:docMk/>
-            <pc:sldMk cId="1542958727" sldId="706"/>
-            <ac:spMk id="27" creationId="{113AA591-17A2-42B5-878A-4F61DA7A7DE4}"/>
-          </ac:spMkLst>
-        </pc:spChg>
-        <pc:spChg chg="mod">
-          <ac:chgData name="Geissler, Andreas" userId="682b9f05-e557-4b4b-b06f-52958ca31345" providerId="ADAL" clId="{2354F76F-5315-48C1-911A-66BA45A26001}" dt="2020-03-26T14:39:05.099" v="355" actId="1076"/>
-          <ac:spMkLst>
-            <pc:docMk/>
-            <pc:sldMk cId="1542958727" sldId="706"/>
-            <ac:spMk id="28" creationId="{C2025D8E-62FB-4EB0-998B-2B15F881E249}"/>
-          </ac:spMkLst>
-        </pc:spChg>
-        <pc:spChg chg="add mod">
-          <ac:chgData name="Geissler, Andreas" userId="682b9f05-e557-4b4b-b06f-52958ca31345" providerId="ADAL" clId="{2354F76F-5315-48C1-911A-66BA45A26001}" dt="2020-03-26T14:36:54.934" v="322" actId="20577"/>
-          <ac:spMkLst>
-            <pc:docMk/>
-            <pc:sldMk cId="1542958727" sldId="706"/>
-            <ac:spMk id="33" creationId="{432F2410-35E5-4B9C-98B4-086A7241C7F1}"/>
-          </ac:spMkLst>
-        </pc:spChg>
-        <pc:cxnChg chg="mod">
-          <ac:chgData name="Geissler, Andreas" userId="682b9f05-e557-4b4b-b06f-52958ca31345" providerId="ADAL" clId="{2354F76F-5315-48C1-911A-66BA45A26001}" dt="2020-03-26T14:36:30.406" v="312" actId="108"/>
-          <ac:cxnSpMkLst>
-            <pc:docMk/>
-            <pc:sldMk cId="1542958727" sldId="706"/>
-            <ac:cxnSpMk id="11" creationId="{7FB6985D-6845-48AF-AF17-38E213D9A7C6}"/>
-          </ac:cxnSpMkLst>
-        </pc:cxnChg>
-        <pc:cxnChg chg="del">
-          <ac:chgData name="Geissler, Andreas" userId="682b9f05-e557-4b4b-b06f-52958ca31345" providerId="ADAL" clId="{2354F76F-5315-48C1-911A-66BA45A26001}" dt="2020-03-26T14:36:03.890" v="296" actId="478"/>
-          <ac:cxnSpMkLst>
-            <pc:docMk/>
-            <pc:sldMk cId="1542958727" sldId="706"/>
-            <ac:cxnSpMk id="12" creationId="{53814E33-C7CC-4428-9B1D-2C9EF7349B2D}"/>
-          </ac:cxnSpMkLst>
-        </pc:cxnChg>
-        <pc:cxnChg chg="del mod">
-          <ac:chgData name="Geissler, Andreas" userId="682b9f05-e557-4b4b-b06f-52958ca31345" providerId="ADAL" clId="{2354F76F-5315-48C1-911A-66BA45A26001}" dt="2020-03-26T14:38:03.829" v="335" actId="478"/>
-          <ac:cxnSpMkLst>
-            <pc:docMk/>
-            <pc:sldMk cId="1542958727" sldId="706"/>
-            <ac:cxnSpMk id="15" creationId="{094F8B71-5104-41A3-BA19-8CD0CC49AC41}"/>
-          </ac:cxnSpMkLst>
-        </pc:cxnChg>
-        <pc:cxnChg chg="del mod">
-          <ac:chgData name="Geissler, Andreas" userId="682b9f05-e557-4b4b-b06f-52958ca31345" providerId="ADAL" clId="{2354F76F-5315-48C1-911A-66BA45A26001}" dt="2020-03-26T14:32:43.132" v="196" actId="478"/>
-          <ac:cxnSpMkLst>
-            <pc:docMk/>
-            <pc:sldMk cId="1542958727" sldId="706"/>
-            <ac:cxnSpMk id="18" creationId="{A411D493-7599-4AB1-A7FD-2B09CEA97E14}"/>
-          </ac:cxnSpMkLst>
-        </pc:cxnChg>
-        <pc:cxnChg chg="add mod">
-          <ac:chgData name="Geissler, Andreas" userId="682b9f05-e557-4b4b-b06f-52958ca31345" providerId="ADAL" clId="{2354F76F-5315-48C1-911A-66BA45A26001}" dt="2020-03-26T14:35:56.493" v="294" actId="14100"/>
-          <ac:cxnSpMkLst>
-            <pc:docMk/>
-            <pc:sldMk cId="1542958727" sldId="706"/>
-            <ac:cxnSpMk id="20" creationId="{46012996-2526-4746-9883-4028464FC101}"/>
-          </ac:cxnSpMkLst>
-        </pc:cxnChg>
-        <pc:cxnChg chg="del">
-          <ac:chgData name="Geissler, Andreas" userId="682b9f05-e557-4b4b-b06f-52958ca31345" providerId="ADAL" clId="{2354F76F-5315-48C1-911A-66BA45A26001}" dt="2020-03-26T14:36:02.158" v="295" actId="478"/>
-          <ac:cxnSpMkLst>
-            <pc:docMk/>
-            <pc:sldMk cId="1542958727" sldId="706"/>
-            <ac:cxnSpMk id="21" creationId="{6015B575-0B26-4144-B087-5CAC06864EC4}"/>
-          </ac:cxnSpMkLst>
-        </pc:cxnChg>
-        <pc:cxnChg chg="add del mod">
-          <ac:chgData name="Geissler, Andreas" userId="682b9f05-e557-4b4b-b06f-52958ca31345" providerId="ADAL" clId="{2354F76F-5315-48C1-911A-66BA45A26001}" dt="2020-03-26T14:35:36.689" v="290" actId="478"/>
-          <ac:cxnSpMkLst>
-            <pc:docMk/>
-            <pc:sldMk cId="1542958727" sldId="706"/>
-            <ac:cxnSpMk id="23" creationId="{6ADAB386-BFB3-43E2-95F8-A0A9BB532B4C}"/>
-          </ac:cxnSpMkLst>
-        </pc:cxnChg>
-        <pc:cxnChg chg="del">
-          <ac:chgData name="Geissler, Andreas" userId="682b9f05-e557-4b4b-b06f-52958ca31345" providerId="ADAL" clId="{2354F76F-5315-48C1-911A-66BA45A26001}" dt="2020-03-26T14:38:21.509" v="339" actId="478"/>
-          <ac:cxnSpMkLst>
-            <pc:docMk/>
-            <pc:sldMk cId="1542958727" sldId="706"/>
-            <ac:cxnSpMk id="26" creationId="{5155B80F-6E4D-4CFF-BD48-AD581C3BF5DF}"/>
-          </ac:cxnSpMkLst>
-        </pc:cxnChg>
-        <pc:cxnChg chg="add mod">
-          <ac:chgData name="Geissler, Andreas" userId="682b9f05-e557-4b4b-b06f-52958ca31345" providerId="ADAL" clId="{2354F76F-5315-48C1-911A-66BA45A26001}" dt="2020-03-26T14:37:23.498" v="326" actId="1076"/>
-          <ac:cxnSpMkLst>
-            <pc:docMk/>
-            <pc:sldMk cId="1542958727" sldId="706"/>
-            <ac:cxnSpMk id="34" creationId="{BCE14581-64EE-4575-85AE-25446E8ED5A2}"/>
-          </ac:cxnSpMkLst>
-        </pc:cxnChg>
-        <pc:cxnChg chg="add mod">
-          <ac:chgData name="Geissler, Andreas" userId="682b9f05-e557-4b4b-b06f-52958ca31345" providerId="ADAL" clId="{2354F76F-5315-48C1-911A-66BA45A26001}" dt="2020-03-26T14:37:42.270" v="330" actId="14100"/>
-          <ac:cxnSpMkLst>
-            <pc:docMk/>
-            <pc:sldMk cId="1542958727" sldId="706"/>
-            <ac:cxnSpMk id="37" creationId="{129F4A9E-7331-4E1D-A139-DF9F46D43165}"/>
-          </ac:cxnSpMkLst>
-        </pc:cxnChg>
-        <pc:cxnChg chg="add mod">
-          <ac:chgData name="Geissler, Andreas" userId="682b9f05-e557-4b4b-b06f-52958ca31345" providerId="ADAL" clId="{2354F76F-5315-48C1-911A-66BA45A26001}" dt="2020-03-26T14:37:52.536" v="333" actId="14100"/>
-          <ac:cxnSpMkLst>
-            <pc:docMk/>
-            <pc:sldMk cId="1542958727" sldId="706"/>
-            <ac:cxnSpMk id="40" creationId="{F9800206-C9EC-41F2-B50C-2BAE7DFAFA41}"/>
-          </ac:cxnSpMkLst>
-        </pc:cxnChg>
-        <pc:cxnChg chg="add mod">
-          <ac:chgData name="Geissler, Andreas" userId="682b9f05-e557-4b4b-b06f-52958ca31345" providerId="ADAL" clId="{2354F76F-5315-48C1-911A-66BA45A26001}" dt="2020-03-26T14:38:56.472" v="353" actId="108"/>
-          <ac:cxnSpMkLst>
-            <pc:docMk/>
-            <pc:sldMk cId="1542958727" sldId="706"/>
-            <ac:cxnSpMk id="43" creationId="{19C30FD8-7CB0-4BFC-AD54-BE8438C4DC0E}"/>
-          </ac:cxnSpMkLst>
-        </pc:cxnChg>
-        <pc:cxnChg chg="add mod">
-          <ac:chgData name="Geissler, Andreas" userId="682b9f05-e557-4b4b-b06f-52958ca31345" providerId="ADAL" clId="{2354F76F-5315-48C1-911A-66BA45A26001}" dt="2020-03-26T14:38:50.539" v="352" actId="1076"/>
-          <ac:cxnSpMkLst>
-            <pc:docMk/>
-            <pc:sldMk cId="1542958727" sldId="706"/>
-            <ac:cxnSpMk id="46" creationId="{BD5E90CA-7159-4B4D-A9AB-6C22C5BA6862}"/>
-          </ac:cxnSpMkLst>
-        </pc:cxnChg>
-        <pc:cxnChg chg="add mod">
-          <ac:chgData name="Geissler, Andreas" userId="682b9f05-e557-4b4b-b06f-52958ca31345" providerId="ADAL" clId="{2354F76F-5315-48C1-911A-66BA45A26001}" dt="2020-03-26T14:44:38.964" v="359" actId="14100"/>
-          <ac:cxnSpMkLst>
-            <pc:docMk/>
-            <pc:sldMk cId="1542958727" sldId="706"/>
-            <ac:cxnSpMk id="47" creationId="{D9A10303-4EB7-4D60-A186-EC9FF95F0EB4}"/>
-          </ac:cxnSpMkLst>
-        </pc:cxnChg>
-      </pc:sldChg>
-      <pc:sldChg chg="addSp delSp modSp add">
-        <pc:chgData name="Geissler, Andreas" userId="682b9f05-e557-4b4b-b06f-52958ca31345" providerId="ADAL" clId="{2354F76F-5315-48C1-911A-66BA45A26001}" dt="2020-03-26T15:22:27.406" v="437" actId="208"/>
-        <pc:sldMkLst>
-          <pc:docMk/>
-          <pc:sldMk cId="2432954421" sldId="707"/>
-        </pc:sldMkLst>
-        <pc:spChg chg="mod">
-          <ac:chgData name="Geissler, Andreas" userId="682b9f05-e557-4b4b-b06f-52958ca31345" providerId="ADAL" clId="{2354F76F-5315-48C1-911A-66BA45A26001}" dt="2020-03-26T15:21:05.250" v="387" actId="20577"/>
-          <ac:spMkLst>
-            <pc:docMk/>
-            <pc:sldMk cId="2432954421" sldId="707"/>
-            <ac:spMk id="3" creationId="{33AE3105-D96B-4360-8405-E2954042769F}"/>
-          </ac:spMkLst>
-        </pc:spChg>
-        <pc:spChg chg="del">
-          <ac:chgData name="Geissler, Andreas" userId="682b9f05-e557-4b4b-b06f-52958ca31345" providerId="ADAL" clId="{2354F76F-5315-48C1-911A-66BA45A26001}" dt="2020-03-26T15:19:50.917" v="362" actId="478"/>
-          <ac:spMkLst>
-            <pc:docMk/>
-            <pc:sldMk cId="2432954421" sldId="707"/>
-            <ac:spMk id="7" creationId="{402CFC1B-62A9-4EDA-A833-D80B34A16483}"/>
-          </ac:spMkLst>
-        </pc:spChg>
-        <pc:spChg chg="mod">
-          <ac:chgData name="Geissler, Andreas" userId="682b9f05-e557-4b4b-b06f-52958ca31345" providerId="ADAL" clId="{2354F76F-5315-48C1-911A-66BA45A26001}" dt="2020-03-26T15:21:16.157" v="407" actId="20577"/>
-          <ac:spMkLst>
-            <pc:docMk/>
-            <pc:sldMk cId="2432954421" sldId="707"/>
-            <ac:spMk id="8" creationId="{86884906-D068-405E-9CE5-0777FA37AEAE}"/>
-          </ac:spMkLst>
-        </pc:spChg>
-        <pc:spChg chg="mod">
-          <ac:chgData name="Geissler, Andreas" userId="682b9f05-e557-4b4b-b06f-52958ca31345" providerId="ADAL" clId="{2354F76F-5315-48C1-911A-66BA45A26001}" dt="2020-03-26T15:22:16.914" v="436" actId="20577"/>
-          <ac:spMkLst>
-            <pc:docMk/>
-            <pc:sldMk cId="2432954421" sldId="707"/>
-            <ac:spMk id="9" creationId="{6BC292BF-1EC3-45FC-A2A9-F54981036079}"/>
-          </ac:spMkLst>
-        </pc:spChg>
-        <pc:spChg chg="add mod">
-          <ac:chgData name="Geissler, Andreas" userId="682b9f05-e557-4b4b-b06f-52958ca31345" providerId="ADAL" clId="{2354F76F-5315-48C1-911A-66BA45A26001}" dt="2020-03-26T15:22:27.406" v="437" actId="208"/>
-          <ac:spMkLst>
-            <pc:docMk/>
-            <pc:sldMk cId="2432954421" sldId="707"/>
-            <ac:spMk id="14" creationId="{77B8C226-2441-42CB-8B2C-5628025DEA31}"/>
-          </ac:spMkLst>
-        </pc:spChg>
-        <pc:spChg chg="mod">
-          <ac:chgData name="Geissler, Andreas" userId="682b9f05-e557-4b4b-b06f-52958ca31345" providerId="ADAL" clId="{2354F76F-5315-48C1-911A-66BA45A26001}" dt="2020-03-26T15:20:42.289" v="366" actId="14100"/>
-          <ac:spMkLst>
-            <pc:docMk/>
-            <pc:sldMk cId="2432954421" sldId="707"/>
-            <ac:spMk id="27" creationId="{113AA591-17A2-42B5-878A-4F61DA7A7DE4}"/>
-          </ac:spMkLst>
-        </pc:spChg>
-        <pc:spChg chg="mod">
-          <ac:chgData name="Geissler, Andreas" userId="682b9f05-e557-4b4b-b06f-52958ca31345" providerId="ADAL" clId="{2354F76F-5315-48C1-911A-66BA45A26001}" dt="2020-03-26T15:20:48.336" v="367" actId="1076"/>
-          <ac:spMkLst>
-            <pc:docMk/>
-            <pc:sldMk cId="2432954421" sldId="707"/>
-            <ac:spMk id="28" creationId="{C2025D8E-62FB-4EB0-998B-2B15F881E249}"/>
-          </ac:spMkLst>
-        </pc:spChg>
-        <pc:cxnChg chg="del">
-          <ac:chgData name="Geissler, Andreas" userId="682b9f05-e557-4b4b-b06f-52958ca31345" providerId="ADAL" clId="{2354F76F-5315-48C1-911A-66BA45A26001}" dt="2020-03-26T15:19:58.209" v="365" actId="478"/>
-          <ac:cxnSpMkLst>
-            <pc:docMk/>
-            <pc:sldMk cId="2432954421" sldId="707"/>
-            <ac:cxnSpMk id="12" creationId="{53814E33-C7CC-4428-9B1D-2C9EF7349B2D}"/>
-          </ac:cxnSpMkLst>
-        </pc:cxnChg>
-        <pc:cxnChg chg="del mod">
-          <ac:chgData name="Geissler, Andreas" userId="682b9f05-e557-4b4b-b06f-52958ca31345" providerId="ADAL" clId="{2354F76F-5315-48C1-911A-66BA45A26001}" dt="2020-03-26T15:21:52.392" v="412" actId="478"/>
-          <ac:cxnSpMkLst>
-            <pc:docMk/>
-            <pc:sldMk cId="2432954421" sldId="707"/>
-            <ac:cxnSpMk id="15" creationId="{094F8B71-5104-41A3-BA19-8CD0CC49AC41}"/>
-          </ac:cxnSpMkLst>
-        </pc:cxnChg>
-        <pc:cxnChg chg="add mod">
-          <ac:chgData name="Geissler, Andreas" userId="682b9f05-e557-4b4b-b06f-52958ca31345" providerId="ADAL" clId="{2354F76F-5315-48C1-911A-66BA45A26001}" dt="2020-03-26T15:21:57.457" v="415" actId="14100"/>
-          <ac:cxnSpMkLst>
-            <pc:docMk/>
-            <pc:sldMk cId="2432954421" sldId="707"/>
-            <ac:cxnSpMk id="16" creationId="{261B4848-2DD1-4BED-A9BB-B8C38406CEF2}"/>
-          </ac:cxnSpMkLst>
-        </pc:cxnChg>
-        <pc:cxnChg chg="del mod">
-          <ac:chgData name="Geissler, Andreas" userId="682b9f05-e557-4b4b-b06f-52958ca31345" providerId="ADAL" clId="{2354F76F-5315-48C1-911A-66BA45A26001}" dt="2020-03-26T15:19:53.269" v="363" actId="478"/>
-          <ac:cxnSpMkLst>
-            <pc:docMk/>
-            <pc:sldMk cId="2432954421" sldId="707"/>
-            <ac:cxnSpMk id="18" creationId="{A411D493-7599-4AB1-A7FD-2B09CEA97E14}"/>
-          </ac:cxnSpMkLst>
-        </pc:cxnChg>
-        <pc:cxnChg chg="del">
-          <ac:chgData name="Geissler, Andreas" userId="682b9f05-e557-4b4b-b06f-52958ca31345" providerId="ADAL" clId="{2354F76F-5315-48C1-911A-66BA45A26001}" dt="2020-03-26T15:19:55.821" v="364" actId="478"/>
-          <ac:cxnSpMkLst>
-            <pc:docMk/>
-            <pc:sldMk cId="2432954421" sldId="707"/>
-            <ac:cxnSpMk id="21" creationId="{6015B575-0B26-4144-B087-5CAC06864EC4}"/>
-          </ac:cxnSpMkLst>
-        </pc:cxnChg>
-        <pc:cxnChg chg="del">
-          <ac:chgData name="Geissler, Andreas" userId="682b9f05-e557-4b4b-b06f-52958ca31345" providerId="ADAL" clId="{2354F76F-5315-48C1-911A-66BA45A26001}" dt="2020-03-26T15:21:47.537" v="411" actId="478"/>
-          <ac:cxnSpMkLst>
-            <pc:docMk/>
-            <pc:sldMk cId="2432954421" sldId="707"/>
-            <ac:cxnSpMk id="26" creationId="{5155B80F-6E4D-4CFF-BD48-AD581C3BF5DF}"/>
-          </ac:cxnSpMkLst>
-        </pc:cxnChg>
-      </pc:sldChg>
     </pc:docChg>
   </pc:docChgLst>
 </pc:chgInfo>
@@ -2753,7 +2753,7 @@
           <a:p>
             <a:fld id="{FB81F4CD-C055-4F6E-AA50-658A12F0DD28}" type="datetimeFigureOut">
               <a:rPr lang="en-US" smtClean="0"/>
-              <a:t>3/31/2020</a:t>
+              <a:t>11/5/2020</a:t>
             </a:fld>
             <a:endParaRPr lang="en-US"/>
           </a:p>
@@ -2923,7 +2923,7 @@
           <a:p>
             <a:fld id="{FB81F4CD-C055-4F6E-AA50-658A12F0DD28}" type="datetimeFigureOut">
               <a:rPr lang="en-US" smtClean="0"/>
-              <a:t>3/31/2020</a:t>
+              <a:t>11/5/2020</a:t>
             </a:fld>
             <a:endParaRPr lang="en-US"/>
           </a:p>
@@ -3103,7 +3103,7 @@
           <a:p>
             <a:fld id="{FB81F4CD-C055-4F6E-AA50-658A12F0DD28}" type="datetimeFigureOut">
               <a:rPr lang="en-US" smtClean="0"/>
-              <a:t>3/31/2020</a:t>
+              <a:t>11/5/2020</a:t>
             </a:fld>
             <a:endParaRPr lang="en-US"/>
           </a:p>
@@ -3273,7 +3273,7 @@
           <a:p>
             <a:fld id="{FB81F4CD-C055-4F6E-AA50-658A12F0DD28}" type="datetimeFigureOut">
               <a:rPr lang="en-US" smtClean="0"/>
-              <a:t>3/31/2020</a:t>
+              <a:t>11/5/2020</a:t>
             </a:fld>
             <a:endParaRPr lang="en-US"/>
           </a:p>
@@ -3517,7 +3517,7 @@
           <a:p>
             <a:fld id="{FB81F4CD-C055-4F6E-AA50-658A12F0DD28}" type="datetimeFigureOut">
               <a:rPr lang="en-US" smtClean="0"/>
-              <a:t>3/31/2020</a:t>
+              <a:t>11/5/2020</a:t>
             </a:fld>
             <a:endParaRPr lang="en-US"/>
           </a:p>
@@ -3749,7 +3749,7 @@
           <a:p>
             <a:fld id="{FB81F4CD-C055-4F6E-AA50-658A12F0DD28}" type="datetimeFigureOut">
               <a:rPr lang="en-US" smtClean="0"/>
-              <a:t>3/31/2020</a:t>
+              <a:t>11/5/2020</a:t>
             </a:fld>
             <a:endParaRPr lang="en-US"/>
           </a:p>
@@ -4116,7 +4116,7 @@
           <a:p>
             <a:fld id="{FB81F4CD-C055-4F6E-AA50-658A12F0DD28}" type="datetimeFigureOut">
               <a:rPr lang="en-US" smtClean="0"/>
-              <a:t>3/31/2020</a:t>
+              <a:t>11/5/2020</a:t>
             </a:fld>
             <a:endParaRPr lang="en-US"/>
           </a:p>
@@ -4234,7 +4234,7 @@
           <a:p>
             <a:fld id="{FB81F4CD-C055-4F6E-AA50-658A12F0DD28}" type="datetimeFigureOut">
               <a:rPr lang="en-US" smtClean="0"/>
-              <a:t>3/31/2020</a:t>
+              <a:t>11/5/2020</a:t>
             </a:fld>
             <a:endParaRPr lang="en-US"/>
           </a:p>
@@ -4329,7 +4329,7 @@
           <a:p>
             <a:fld id="{FB81F4CD-C055-4F6E-AA50-658A12F0DD28}" type="datetimeFigureOut">
               <a:rPr lang="en-US" smtClean="0"/>
-              <a:t>3/31/2020</a:t>
+              <a:t>11/5/2020</a:t>
             </a:fld>
             <a:endParaRPr lang="en-US"/>
           </a:p>
@@ -4606,7 +4606,7 @@
           <a:p>
             <a:fld id="{FB81F4CD-C055-4F6E-AA50-658A12F0DD28}" type="datetimeFigureOut">
               <a:rPr lang="en-US" smtClean="0"/>
-              <a:t>3/31/2020</a:t>
+              <a:t>11/5/2020</a:t>
             </a:fld>
             <a:endParaRPr lang="en-US"/>
           </a:p>
@@ -4863,7 +4863,7 @@
           <a:p>
             <a:fld id="{FB81F4CD-C055-4F6E-AA50-658A12F0DD28}" type="datetimeFigureOut">
               <a:rPr lang="en-US" smtClean="0"/>
-              <a:t>3/31/2020</a:t>
+              <a:t>11/5/2020</a:t>
             </a:fld>
             <a:endParaRPr lang="en-US"/>
           </a:p>
@@ -5076,7 +5076,7 @@
           <a:p>
             <a:fld id="{FB81F4CD-C055-4F6E-AA50-658A12F0DD28}" type="datetimeFigureOut">
               <a:rPr lang="en-US" smtClean="0"/>
-              <a:t>3/31/2020</a:t>
+              <a:t>11/5/2020</a:t>
             </a:fld>
             <a:endParaRPr lang="en-US"/>
           </a:p>
@@ -8525,10 +8525,10 @@
         </p:nvGrpSpPr>
         <p:grpSpPr>
           <a:xfrm>
-            <a:off x="99119" y="684068"/>
-            <a:ext cx="8759318" cy="5012673"/>
-            <a:chOff x="99119" y="684068"/>
-            <a:chExt cx="8759318" cy="5012673"/>
+            <a:off x="398160" y="681616"/>
+            <a:ext cx="8578032" cy="4958043"/>
+            <a:chOff x="398160" y="681616"/>
+            <a:chExt cx="8578032" cy="4958043"/>
           </a:xfrm>
         </p:grpSpPr>
         <p:sp>
@@ -8546,7 +8546,7 @@
           <p:spPr>
             <a:xfrm>
               <a:off x="2471168" y="1883994"/>
-              <a:ext cx="6362699" cy="2950574"/>
+              <a:ext cx="4149356" cy="2950574"/>
             </a:xfrm>
             <a:prstGeom prst="roundRect">
               <a:avLst>
@@ -8610,7 +8610,7 @@
           </p:nvSpPr>
           <p:spPr>
             <a:xfrm>
-              <a:off x="705947" y="3558424"/>
+              <a:off x="1015911" y="3860638"/>
               <a:ext cx="726641" cy="755651"/>
             </a:xfrm>
             <a:prstGeom prst="flowChartMultidocument">
@@ -8659,7 +8659,7 @@
           </p:nvSpPr>
           <p:spPr>
             <a:xfrm>
-              <a:off x="189058" y="5304952"/>
+              <a:off x="499022" y="5304952"/>
               <a:ext cx="1895857" cy="300082"/>
             </a:xfrm>
             <a:prstGeom prst="rect">
@@ -8695,7 +8695,7 @@
           </p:nvSpPr>
           <p:spPr>
             <a:xfrm>
-              <a:off x="623336" y="3627327"/>
+              <a:off x="933300" y="3929541"/>
               <a:ext cx="704914" cy="646331"/>
             </a:xfrm>
             <a:prstGeom prst="rect">
@@ -8799,7 +8799,7 @@
           </p:nvSpPr>
           <p:spPr>
             <a:xfrm>
-              <a:off x="99119" y="2005715"/>
+              <a:off x="398160" y="2473099"/>
               <a:ext cx="1895858" cy="1104896"/>
             </a:xfrm>
             <a:prstGeom prst="roundRect">
@@ -8871,7 +8871,7 @@
           </p:nvSpPr>
           <p:spPr>
             <a:xfrm>
-              <a:off x="244146" y="2770837"/>
+              <a:off x="554110" y="3208663"/>
               <a:ext cx="669093" cy="369332"/>
             </a:xfrm>
             <a:prstGeom prst="rect">
@@ -8931,7 +8931,7 @@
           </p:nvSpPr>
           <p:spPr>
             <a:xfrm>
-              <a:off x="1156415" y="2785687"/>
+              <a:off x="1156415" y="3223513"/>
               <a:ext cx="669093" cy="230832"/>
             </a:xfrm>
             <a:prstGeom prst="rect">
@@ -8976,8 +8976,8 @@
           </p:nvSpPr>
           <p:spPr>
             <a:xfrm>
-              <a:off x="2631436" y="2085261"/>
-              <a:ext cx="1211232" cy="1879597"/>
+              <a:off x="2631436" y="2948653"/>
+              <a:ext cx="1211232" cy="1628398"/>
             </a:xfrm>
             <a:prstGeom prst="roundRect">
               <a:avLst/>
@@ -9040,8 +9040,8 @@
           </p:nvSpPr>
           <p:spPr>
             <a:xfrm>
-              <a:off x="3931125" y="2096368"/>
-              <a:ext cx="1260110" cy="1879598"/>
+              <a:off x="2630740" y="1935623"/>
+              <a:ext cx="1211928" cy="948689"/>
             </a:xfrm>
             <a:prstGeom prst="roundRect">
               <a:avLst/>
@@ -9112,8 +9112,8 @@
           </p:nvSpPr>
           <p:spPr>
             <a:xfrm>
-              <a:off x="5306823" y="3050267"/>
-              <a:ext cx="1547798" cy="1459403"/>
+              <a:off x="4072427" y="1964665"/>
+              <a:ext cx="2417240" cy="1161796"/>
             </a:xfrm>
             <a:prstGeom prst="roundRect">
               <a:avLst/>
@@ -9176,8 +9176,8 @@
           </p:nvSpPr>
           <p:spPr>
             <a:xfrm>
-              <a:off x="7150900" y="3050267"/>
-              <a:ext cx="1377951" cy="1459403"/>
+              <a:off x="4072427" y="3231103"/>
+              <a:ext cx="1277745" cy="1344770"/>
             </a:xfrm>
             <a:prstGeom prst="roundRect">
               <a:avLst/>
@@ -9240,8 +9240,8 @@
           </p:nvSpPr>
           <p:spPr>
             <a:xfrm>
-              <a:off x="6956314" y="2096368"/>
-              <a:ext cx="1733182" cy="792545"/>
+              <a:off x="6780096" y="2427299"/>
+              <a:ext cx="2155180" cy="3093971"/>
             </a:xfrm>
             <a:prstGeom prst="roundRect">
               <a:avLst/>
@@ -9281,7 +9281,23 @@
                     <a:schemeClr val="bg1"/>
                   </a:solidFill>
                 </a:rPr>
-                <a:t>Control Loop Design</a:t>
+                <a:t>DCAE </a:t>
+              </a:r>
+              <a:r>
+                <a:rPr lang="de-DE" sz="1350" dirty="0" err="1">
+                  <a:solidFill>
+                    <a:schemeClr val="bg1"/>
+                  </a:solidFill>
+                </a:rPr>
+                <a:t>Onboard</a:t>
+              </a:r>
+              <a:r>
+                <a:rPr lang="de-DE" sz="1350" dirty="0">
+                  <a:solidFill>
+                    <a:schemeClr val="bg1"/>
+                  </a:solidFill>
+                </a:rPr>
+                <a:t>/Design</a:t>
               </a:r>
               <a:endParaRPr lang="en-US" sz="1350" dirty="0">
                 <a:solidFill>
@@ -9394,8 +9410,8 @@
           </p:nvSpPr>
           <p:spPr>
             <a:xfrm>
-              <a:off x="5293033" y="2096369"/>
-              <a:ext cx="1561483" cy="792545"/>
+              <a:off x="5470936" y="3231102"/>
+              <a:ext cx="1018731" cy="1344770"/>
             </a:xfrm>
             <a:prstGeom prst="roundRect">
               <a:avLst/>
@@ -9459,7 +9475,7 @@
           </p:nvSpPr>
           <p:spPr>
             <a:xfrm>
-              <a:off x="3020899" y="3640217"/>
+              <a:off x="2957646" y="4366373"/>
               <a:ext cx="544077" cy="230832"/>
             </a:xfrm>
             <a:prstGeom prst="rect">
@@ -9504,7 +9520,7 @@
           </p:nvSpPr>
           <p:spPr>
             <a:xfrm>
-              <a:off x="2749490" y="2813274"/>
+              <a:off x="2706867" y="3638574"/>
               <a:ext cx="1010566" cy="369332"/>
             </a:xfrm>
             <a:prstGeom prst="rect">
@@ -9703,7 +9719,7 @@
           </p:nvSpPr>
           <p:spPr>
             <a:xfrm>
-              <a:off x="4050265" y="3334183"/>
+              <a:off x="2703232" y="2623604"/>
               <a:ext cx="1056373" cy="230832"/>
             </a:xfrm>
             <a:prstGeom prst="rect">
@@ -9748,7 +9764,7 @@
           </p:nvSpPr>
           <p:spPr>
             <a:xfrm>
-              <a:off x="7128422" y="2685092"/>
+              <a:off x="7156623" y="4136246"/>
               <a:ext cx="1501292" cy="230832"/>
             </a:xfrm>
             <a:prstGeom prst="rect">
@@ -9769,23 +9785,7 @@
                     <a:schemeClr val="bg1"/>
                   </a:solidFill>
                 </a:rPr>
-                <a:t>DCAE </a:t>
-              </a:r>
-              <a:r>
-                <a:rPr lang="de-DE" sz="900" dirty="0" err="1">
-                  <a:solidFill>
-                    <a:schemeClr val="bg1"/>
-                  </a:solidFill>
-                </a:rPr>
-                <a:t>Blueprint</a:t>
-              </a:r>
-              <a:r>
-                <a:rPr lang="de-DE" sz="900" dirty="0">
-                  <a:solidFill>
-                    <a:schemeClr val="bg1"/>
-                  </a:solidFill>
-                </a:rPr>
-                <a:t> (DCAE-DS)</a:t>
+                <a:t>Service Assurance Design</a:t>
               </a:r>
               <a:endParaRPr lang="en-US" sz="900" dirty="0">
                 <a:solidFill>
@@ -9809,7 +9809,7 @@
           </p:nvSpPr>
           <p:spPr>
             <a:xfrm>
-              <a:off x="5633952" y="2718762"/>
+              <a:off x="5574791" y="4214336"/>
               <a:ext cx="876237" cy="230832"/>
             </a:xfrm>
             <a:prstGeom prst="rect">
@@ -9854,7 +9854,7 @@
           </p:nvSpPr>
           <p:spPr>
             <a:xfrm>
-              <a:off x="4619341" y="5327409"/>
+              <a:off x="2804942" y="5296054"/>
               <a:ext cx="815707" cy="300082"/>
             </a:xfrm>
             <a:prstGeom prst="rect">
@@ -9890,8 +9890,8 @@
           </p:nvSpPr>
           <p:spPr>
             <a:xfrm rot="10800000">
-              <a:off x="995525" y="3109717"/>
-              <a:ext cx="103048" cy="424367"/>
+              <a:off x="1305488" y="3578632"/>
+              <a:ext cx="103048" cy="258802"/>
             </a:xfrm>
             <a:prstGeom prst="downArrow">
               <a:avLst/>
@@ -9936,8 +9936,8 @@
           </p:nvSpPr>
           <p:spPr>
             <a:xfrm rot="10800000">
-              <a:off x="986717" y="4412156"/>
-              <a:ext cx="73644" cy="422412"/>
+              <a:off x="1285757" y="4617988"/>
+              <a:ext cx="111856" cy="196482"/>
             </a:xfrm>
             <a:prstGeom prst="downArrow">
               <a:avLst/>
@@ -9982,8 +9982,8 @@
           </p:nvSpPr>
           <p:spPr>
             <a:xfrm rot="16200000">
-              <a:off x="2251057" y="2304711"/>
-              <a:ext cx="107525" cy="653236"/>
+              <a:off x="2387532" y="3077629"/>
+              <a:ext cx="133675" cy="497725"/>
             </a:xfrm>
             <a:prstGeom prst="downArrow">
               <a:avLst/>
@@ -10027,9 +10027,9 @@
             <p:nvPr/>
           </p:nvSpPr>
           <p:spPr>
-            <a:xfrm rot="16200000">
-              <a:off x="3841461" y="2901921"/>
-              <a:ext cx="103048" cy="306691"/>
+            <a:xfrm rot="10800000">
+              <a:off x="3167050" y="2803031"/>
+              <a:ext cx="114158" cy="266397"/>
             </a:xfrm>
             <a:prstGeom prst="downArrow">
               <a:avLst/>
@@ -10074,7 +10074,7 @@
           </p:nvSpPr>
           <p:spPr>
             <a:xfrm>
-              <a:off x="4375150" y="1750552"/>
+              <a:off x="3186672" y="1737652"/>
               <a:ext cx="93238" cy="334709"/>
             </a:xfrm>
             <a:prstGeom prst="downArrow">
@@ -10127,9 +10127,9 @@
             <p:nvPr/>
           </p:nvSpPr>
           <p:spPr>
-            <a:xfrm>
-              <a:off x="5973833" y="2898758"/>
-              <a:ext cx="96767" cy="151510"/>
+            <a:xfrm rot="10800000">
+              <a:off x="5941396" y="3005570"/>
+              <a:ext cx="93240" cy="308374"/>
             </a:xfrm>
             <a:prstGeom prst="downArrow">
               <a:avLst/>
@@ -10187,7 +10187,7 @@
           </p:nvSpPr>
           <p:spPr>
             <a:xfrm rot="16200000">
-              <a:off x="5221074" y="3457898"/>
+              <a:off x="3911391" y="2356476"/>
               <a:ext cx="93238" cy="334709"/>
             </a:xfrm>
             <a:prstGeom prst="downArrow">
@@ -10221,65 +10221,6 @@
         </p:sp>
         <p:sp>
           <p:nvSpPr>
-            <p:cNvPr id="112" name="Pfeil: nach unten 111">
-              <a:extLst>
-                <a:ext uri="{FF2B5EF4-FFF2-40B4-BE49-F238E27FC236}">
-                  <a16:creationId xmlns:a16="http://schemas.microsoft.com/office/drawing/2014/main" id="{481EBA1C-0DF8-4477-8F75-36CE52276613}"/>
-                </a:ext>
-              </a:extLst>
-            </p:cNvPr>
-            <p:cNvSpPr/>
-            <p:nvPr/>
-          </p:nvSpPr>
-          <p:spPr>
-            <a:xfrm rot="2053907">
-              <a:off x="6875803" y="2818835"/>
-              <a:ext cx="96576" cy="384613"/>
-            </a:xfrm>
-            <a:prstGeom prst="downArrow">
-              <a:avLst/>
-            </a:prstGeom>
-            <a:pattFill prst="dkHorz">
-              <a:fgClr>
-                <a:schemeClr val="accent1"/>
-              </a:fgClr>
-              <a:bgClr>
-                <a:schemeClr val="bg1"/>
-              </a:bgClr>
-            </a:pattFill>
-          </p:spPr>
-          <p:style>
-            <a:lnRef idx="2">
-              <a:schemeClr val="accent1">
-                <a:shade val="50000"/>
-              </a:schemeClr>
-            </a:lnRef>
-            <a:fillRef idx="1">
-              <a:schemeClr val="accent1"/>
-            </a:fillRef>
-            <a:effectRef idx="0">
-              <a:schemeClr val="accent1"/>
-            </a:effectRef>
-            <a:fontRef idx="minor">
-              <a:schemeClr val="lt1"/>
-            </a:fontRef>
-          </p:style>
-          <p:txBody>
-            <a:bodyPr rot="0" spcFirstLastPara="0" vertOverflow="overflow" horzOverflow="overflow" vert="horz" wrap="square" lIns="68580" tIns="34290" rIns="68580" bIns="34290" numCol="1" spcCol="0" rtlCol="0" fromWordArt="0" anchor="ctr" anchorCtr="0" forceAA="0" compatLnSpc="1">
-              <a:prstTxWarp prst="textNoShape">
-                <a:avLst/>
-              </a:prstTxWarp>
-              <a:noAutofit/>
-            </a:bodyPr>
-            <a:lstStyle/>
-            <a:p>
-              <a:pPr algn="ctr"/>
-              <a:endParaRPr lang="en-US" sz="1350"/>
-            </a:p>
-          </p:txBody>
-        </p:sp>
-        <p:sp>
-          <p:nvSpPr>
             <p:cNvPr id="113" name="Pfeil: nach unten 112">
               <a:extLst>
                 <a:ext uri="{FF2B5EF4-FFF2-40B4-BE49-F238E27FC236}">
@@ -10291,8 +10232,8 @@
             <p:nvPr/>
           </p:nvSpPr>
           <p:spPr>
-            <a:xfrm rot="16200000">
-              <a:off x="6956001" y="4005009"/>
+            <a:xfrm>
+              <a:off x="4648178" y="3038096"/>
               <a:ext cx="93238" cy="296209"/>
             </a:xfrm>
             <a:prstGeom prst="downArrow">
@@ -10338,7 +10279,7 @@
           </p:nvSpPr>
           <p:spPr>
             <a:xfrm>
-              <a:off x="7793255" y="4525197"/>
+              <a:off x="4713203" y="4486204"/>
               <a:ext cx="122333" cy="381697"/>
             </a:xfrm>
             <a:prstGeom prst="downArrow">
@@ -10384,7 +10325,7 @@
           </p:nvSpPr>
           <p:spPr>
             <a:xfrm>
-              <a:off x="5779942" y="4106385"/>
+              <a:off x="4975585" y="2864674"/>
               <a:ext cx="525317" cy="230832"/>
             </a:xfrm>
             <a:prstGeom prst="rect">
@@ -10429,7 +10370,7 @@
           </p:nvSpPr>
           <p:spPr>
             <a:xfrm>
-              <a:off x="7542562" y="4050158"/>
+              <a:off x="4441395" y="4230993"/>
               <a:ext cx="653195" cy="230832"/>
             </a:xfrm>
             <a:prstGeom prst="rect">
@@ -10474,7 +10415,7 @@
           </p:nvSpPr>
           <p:spPr>
             <a:xfrm>
-              <a:off x="7397418" y="5327409"/>
+              <a:off x="4285074" y="5270327"/>
               <a:ext cx="911645" cy="369332"/>
             </a:xfrm>
             <a:prstGeom prst="rect">
@@ -10515,7 +10456,7 @@
           </p:nvSpPr>
           <p:spPr>
             <a:xfrm>
-              <a:off x="5141844" y="684068"/>
+              <a:off x="5217063" y="681616"/>
               <a:ext cx="1403461" cy="1085019"/>
             </a:xfrm>
             <a:prstGeom prst="roundRect">
@@ -10580,8 +10521,8 @@
           </p:nvSpPr>
           <p:spPr>
             <a:xfrm>
-              <a:off x="6679869" y="695289"/>
-              <a:ext cx="2155180" cy="1085018"/>
+              <a:off x="6797624" y="1129912"/>
+              <a:ext cx="2155180" cy="1240993"/>
             </a:xfrm>
             <a:prstGeom prst="roundRect">
               <a:avLst/>
@@ -10667,7 +10608,7 @@
           </p:blipFill>
           <p:spPr>
             <a:xfrm>
-              <a:off x="705946" y="4756646"/>
+              <a:off x="1015910" y="4756646"/>
               <a:ext cx="704914" cy="704914"/>
             </a:xfrm>
             <a:prstGeom prst="rect">
@@ -10703,7 +10644,7 @@
           </p:blipFill>
           <p:spPr>
             <a:xfrm>
-              <a:off x="4647795" y="4794062"/>
+              <a:off x="2833396" y="4762707"/>
               <a:ext cx="704914" cy="704914"/>
             </a:xfrm>
             <a:prstGeom prst="rect">
@@ -10726,7 +10667,7 @@
           <p:spPr>
             <a:xfrm>
               <a:off x="5799669" y="1757629"/>
-              <a:ext cx="87551" cy="205176"/>
+              <a:ext cx="93238" cy="270718"/>
             </a:xfrm>
             <a:prstGeom prst="downArrow">
               <a:avLst/>
@@ -10778,9 +10719,9 @@
             <p:nvPr/>
           </p:nvSpPr>
           <p:spPr>
-            <a:xfrm rot="5218442">
-              <a:off x="5062846" y="1313902"/>
-              <a:ext cx="87551" cy="205176"/>
+            <a:xfrm rot="5400000">
+              <a:off x="5073486" y="1255655"/>
+              <a:ext cx="123130" cy="262035"/>
             </a:xfrm>
             <a:prstGeom prst="downArrow">
               <a:avLst/>
@@ -10832,9 +10773,9 @@
             <p:nvPr/>
           </p:nvSpPr>
           <p:spPr>
-            <a:xfrm>
-              <a:off x="7926595" y="1739098"/>
-              <a:ext cx="87551" cy="205176"/>
+            <a:xfrm rot="5400000">
+              <a:off x="6594684" y="1976349"/>
+              <a:ext cx="100518" cy="409450"/>
             </a:xfrm>
             <a:prstGeom prst="downArrow">
               <a:avLst/>
@@ -10901,7 +10842,7 @@
           </p:blipFill>
           <p:spPr>
             <a:xfrm>
-              <a:off x="7561147" y="4906894"/>
+              <a:off x="4481095" y="4867901"/>
               <a:ext cx="519605" cy="519605"/>
             </a:xfrm>
             <a:prstGeom prst="rect">
@@ -10923,7 +10864,7 @@
           </p:nvSpPr>
           <p:spPr>
             <a:xfrm>
-              <a:off x="5549900" y="1536546"/>
+              <a:off x="5625119" y="1534094"/>
               <a:ext cx="508244" cy="230832"/>
             </a:xfrm>
             <a:prstGeom prst="rect">
@@ -10968,7 +10909,7 @@
           </p:nvSpPr>
           <p:spPr>
             <a:xfrm>
-              <a:off x="7432985" y="1567962"/>
+              <a:off x="7550740" y="2108188"/>
               <a:ext cx="666169" cy="230832"/>
             </a:xfrm>
             <a:prstGeom prst="rect">
@@ -11013,7 +10954,7 @@
           </p:nvSpPr>
           <p:spPr>
             <a:xfrm>
-              <a:off x="7970370" y="1562981"/>
+              <a:off x="8088125" y="2103207"/>
               <a:ext cx="888067" cy="230832"/>
             </a:xfrm>
             <a:prstGeom prst="rect">
@@ -11066,7 +11007,7 @@
           </p:nvSpPr>
           <p:spPr>
             <a:xfrm>
-              <a:off x="6829028" y="1576763"/>
+              <a:off x="6908072" y="2115915"/>
               <a:ext cx="683363" cy="230832"/>
             </a:xfrm>
             <a:prstGeom prst="rect">
@@ -11197,7 +11138,7 @@
           </p:blipFill>
           <p:spPr>
             <a:xfrm>
-              <a:off x="5765042" y="2309987"/>
+              <a:off x="5705881" y="3805561"/>
               <a:ext cx="514350" cy="514350"/>
             </a:xfrm>
             <a:prstGeom prst="rect">
@@ -11233,7 +11174,7 @@
           </p:blipFill>
           <p:spPr>
             <a:xfrm>
-              <a:off x="7464815" y="2300987"/>
+              <a:off x="7627588" y="3723566"/>
               <a:ext cx="514350" cy="514350"/>
             </a:xfrm>
             <a:prstGeom prst="rect">
@@ -11269,7 +11210,7 @@
           </p:blipFill>
           <p:spPr>
             <a:xfrm>
-              <a:off x="7456020" y="1148385"/>
+              <a:off x="7573775" y="1688611"/>
               <a:ext cx="514350" cy="514350"/>
             </a:xfrm>
             <a:prstGeom prst="rect">
@@ -11305,7 +11246,7 @@
           </p:blipFill>
           <p:spPr>
             <a:xfrm>
-              <a:off x="8115364" y="1121414"/>
+              <a:off x="8233119" y="1661640"/>
               <a:ext cx="514350" cy="514350"/>
             </a:xfrm>
             <a:prstGeom prst="rect">
@@ -11341,7 +11282,7 @@
           </p:blipFill>
           <p:spPr>
             <a:xfrm>
-              <a:off x="3007676" y="3184128"/>
+              <a:off x="2961178" y="3943557"/>
               <a:ext cx="514350" cy="514350"/>
             </a:xfrm>
             <a:prstGeom prst="rect">
@@ -11377,7 +11318,7 @@
           </p:blipFill>
           <p:spPr>
             <a:xfrm>
-              <a:off x="1188545" y="2329692"/>
+              <a:off x="1498509" y="2767518"/>
               <a:ext cx="514350" cy="514350"/>
             </a:xfrm>
             <a:prstGeom prst="rect">
@@ -11413,8 +11354,8 @@
           </p:blipFill>
           <p:spPr>
             <a:xfrm>
-              <a:off x="3018037" y="2367668"/>
-              <a:ext cx="514350" cy="514350"/>
+              <a:off x="3000731" y="3263546"/>
+              <a:ext cx="460020" cy="460020"/>
             </a:xfrm>
             <a:prstGeom prst="rect">
               <a:avLst/>
@@ -11449,7 +11390,7 @@
           </p:blipFill>
           <p:spPr>
             <a:xfrm>
-              <a:off x="7561147" y="3634567"/>
+              <a:off x="4459980" y="3815402"/>
               <a:ext cx="514350" cy="514350"/>
             </a:xfrm>
             <a:prstGeom prst="rect">
@@ -11485,7 +11426,7 @@
           </p:blipFill>
           <p:spPr>
             <a:xfrm>
-              <a:off x="5526504" y="1066521"/>
+              <a:off x="5601723" y="1064069"/>
               <a:ext cx="579373" cy="579373"/>
             </a:xfrm>
             <a:prstGeom prst="rect">
@@ -11521,8 +11462,8 @@
           </p:blipFill>
           <p:spPr>
             <a:xfrm>
-              <a:off x="4257101" y="2880037"/>
-              <a:ext cx="514350" cy="514350"/>
+              <a:off x="2989320" y="2215406"/>
+              <a:ext cx="471431" cy="471431"/>
             </a:xfrm>
             <a:prstGeom prst="rect">
               <a:avLst/>
@@ -11557,7 +11498,7 @@
           </p:blipFill>
           <p:spPr>
             <a:xfrm>
-              <a:off x="5877217" y="3435175"/>
+              <a:off x="5130763" y="2231331"/>
               <a:ext cx="380316" cy="380316"/>
             </a:xfrm>
             <a:prstGeom prst="rect">
@@ -11593,7 +11534,7 @@
           </p:blipFill>
           <p:spPr>
             <a:xfrm>
-              <a:off x="5783675" y="3720049"/>
+              <a:off x="5037221" y="2516205"/>
               <a:ext cx="380316" cy="380316"/>
             </a:xfrm>
             <a:prstGeom prst="rect">
@@ -11665,7 +11606,7 @@
           </p:blipFill>
           <p:spPr>
             <a:xfrm>
-              <a:off x="6862838" y="1140635"/>
+              <a:off x="7001022" y="1688611"/>
               <a:ext cx="514350" cy="514350"/>
             </a:xfrm>
             <a:prstGeom prst="rect">
@@ -11701,7 +11642,7 @@
           </p:blipFill>
           <p:spPr>
             <a:xfrm>
-              <a:off x="336886" y="2352932"/>
+              <a:off x="646850" y="2790758"/>
               <a:ext cx="514350" cy="514350"/>
             </a:xfrm>
             <a:prstGeom prst="rect">
@@ -11710,6 +11651,254 @@
           </p:spPr>
         </p:pic>
       </p:grpSp>
+      <p:sp>
+        <p:nvSpPr>
+          <p:cNvPr id="70" name="Textfeld 69">
+            <a:extLst>
+              <a:ext uri="{FF2B5EF4-FFF2-40B4-BE49-F238E27FC236}">
+                <a16:creationId xmlns:a16="http://schemas.microsoft.com/office/drawing/2014/main" id="{21055504-2CD2-4127-85D4-08FA359FF4DC}"/>
+              </a:ext>
+            </a:extLst>
+          </p:cNvPr>
+          <p:cNvSpPr txBox="1"/>
+          <p:nvPr/>
+        </p:nvSpPr>
+        <p:spPr>
+          <a:xfrm>
+            <a:off x="7107638" y="3419479"/>
+            <a:ext cx="1655622" cy="230832"/>
+          </a:xfrm>
+          <a:prstGeom prst="rect">
+            <a:avLst/>
+          </a:prstGeom>
+          <a:noFill/>
+        </p:spPr>
+        <p:txBody>
+          <a:bodyPr wrap="square" rtlCol="0">
+            <a:spAutoFit/>
+          </a:bodyPr>
+          <a:lstStyle/>
+          <a:p>
+            <a:pPr algn="ctr"/>
+            <a:r>
+              <a:rPr lang="de-DE" sz="900" dirty="0">
+                <a:solidFill>
+                  <a:schemeClr val="bg1"/>
+                </a:solidFill>
+              </a:rPr>
+              <a:t>DCAE </a:t>
+            </a:r>
+            <a:r>
+              <a:rPr lang="de-DE" sz="900" dirty="0" err="1">
+                <a:solidFill>
+                  <a:schemeClr val="bg1"/>
+                </a:solidFill>
+              </a:rPr>
+              <a:t>mS</a:t>
+            </a:r>
+            <a:r>
+              <a:rPr lang="de-DE" sz="900" dirty="0">
+                <a:solidFill>
+                  <a:schemeClr val="bg1"/>
+                </a:solidFill>
+              </a:rPr>
+              <a:t> Onboarding + Design</a:t>
+            </a:r>
+            <a:endParaRPr lang="en-US" sz="900" dirty="0">
+              <a:solidFill>
+                <a:schemeClr val="bg1"/>
+              </a:solidFill>
+            </a:endParaRPr>
+          </a:p>
+        </p:txBody>
+      </p:sp>
+      <p:pic>
+        <p:nvPicPr>
+          <p:cNvPr id="71" name="Grafik 70">
+            <a:extLst>
+              <a:ext uri="{FF2B5EF4-FFF2-40B4-BE49-F238E27FC236}">
+                <a16:creationId xmlns:a16="http://schemas.microsoft.com/office/drawing/2014/main" id="{812D8CA5-E381-4B6A-B8E9-DA141CAA5561}"/>
+              </a:ext>
+            </a:extLst>
+          </p:cNvPr>
+          <p:cNvPicPr>
+            <a:picLocks noChangeAspect="1"/>
+          </p:cNvPicPr>
+          <p:nvPr/>
+        </p:nvPicPr>
+        <p:blipFill>
+          <a:blip r:embed="rId7">
+            <a:extLst>
+              <a:ext uri="{28A0092B-C50C-407E-A947-70E740481C1C}">
+                <a14:useLocalDpi xmlns:a14="http://schemas.microsoft.com/office/drawing/2010/main" val="0"/>
+              </a:ext>
+            </a:extLst>
+          </a:blip>
+          <a:stretch>
+            <a:fillRect/>
+          </a:stretch>
+        </p:blipFill>
+        <p:spPr>
+          <a:xfrm>
+            <a:off x="7591435" y="2970532"/>
+            <a:ext cx="514350" cy="514350"/>
+          </a:xfrm>
+          <a:prstGeom prst="rect">
+            <a:avLst/>
+          </a:prstGeom>
+        </p:spPr>
+      </p:pic>
+      <p:sp>
+        <p:nvSpPr>
+          <p:cNvPr id="76" name="Textfeld 75">
+            <a:extLst>
+              <a:ext uri="{FF2B5EF4-FFF2-40B4-BE49-F238E27FC236}">
+                <a16:creationId xmlns:a16="http://schemas.microsoft.com/office/drawing/2014/main" id="{2A1EFD31-6CD6-424F-95D2-A7F4A0409108}"/>
+              </a:ext>
+            </a:extLst>
+          </p:cNvPr>
+          <p:cNvSpPr txBox="1"/>
+          <p:nvPr/>
+        </p:nvSpPr>
+        <p:spPr>
+          <a:xfrm>
+            <a:off x="7235045" y="5127983"/>
+            <a:ext cx="1422870" cy="230832"/>
+          </a:xfrm>
+          <a:prstGeom prst="rect">
+            <a:avLst/>
+          </a:prstGeom>
+          <a:noFill/>
+        </p:spPr>
+        <p:txBody>
+          <a:bodyPr wrap="square" rtlCol="0">
+            <a:spAutoFit/>
+          </a:bodyPr>
+          <a:lstStyle/>
+          <a:p>
+            <a:pPr algn="ctr"/>
+            <a:r>
+              <a:rPr lang="de-DE" sz="900" dirty="0">
+                <a:solidFill>
+                  <a:schemeClr val="bg1"/>
+                </a:solidFill>
+              </a:rPr>
+              <a:t>DCAE </a:t>
+            </a:r>
+            <a:r>
+              <a:rPr lang="de-DE" sz="900" dirty="0" err="1">
+                <a:solidFill>
+                  <a:schemeClr val="bg1"/>
+                </a:solidFill>
+              </a:rPr>
+              <a:t>mS</a:t>
+            </a:r>
+            <a:r>
+              <a:rPr lang="de-DE" sz="900" dirty="0">
+                <a:solidFill>
+                  <a:schemeClr val="bg1"/>
+                </a:solidFill>
+              </a:rPr>
+              <a:t>  </a:t>
+            </a:r>
+            <a:r>
+              <a:rPr lang="de-DE" sz="900" dirty="0" err="1">
+                <a:solidFill>
+                  <a:schemeClr val="bg1"/>
+                </a:solidFill>
+              </a:rPr>
+              <a:t>Deployment</a:t>
+            </a:r>
+            <a:endParaRPr lang="en-US" sz="900" dirty="0">
+              <a:solidFill>
+                <a:schemeClr val="bg1"/>
+              </a:solidFill>
+            </a:endParaRPr>
+          </a:p>
+        </p:txBody>
+      </p:sp>
+      <p:pic>
+        <p:nvPicPr>
+          <p:cNvPr id="78" name="Grafik 77">
+            <a:extLst>
+              <a:ext uri="{FF2B5EF4-FFF2-40B4-BE49-F238E27FC236}">
+                <a16:creationId xmlns:a16="http://schemas.microsoft.com/office/drawing/2014/main" id="{32E1AA8B-1AD0-4185-96C2-6FFF0BEE94CD}"/>
+              </a:ext>
+            </a:extLst>
+          </p:cNvPr>
+          <p:cNvPicPr>
+            <a:picLocks noChangeAspect="1"/>
+          </p:cNvPicPr>
+          <p:nvPr/>
+        </p:nvPicPr>
+        <p:blipFill>
+          <a:blip r:embed="rId9">
+            <a:extLst>
+              <a:ext uri="{28A0092B-C50C-407E-A947-70E740481C1C}">
+                <a14:useLocalDpi xmlns:a14="http://schemas.microsoft.com/office/drawing/2010/main" val="0"/>
+              </a:ext>
+            </a:extLst>
+          </a:blip>
+          <a:stretch>
+            <a:fillRect/>
+          </a:stretch>
+        </p:blipFill>
+        <p:spPr>
+          <a:xfrm>
+            <a:off x="7634126" y="4682010"/>
+            <a:ext cx="514350" cy="514350"/>
+          </a:xfrm>
+          <a:prstGeom prst="rect">
+            <a:avLst/>
+          </a:prstGeom>
+        </p:spPr>
+      </p:pic>
+      <p:sp>
+        <p:nvSpPr>
+          <p:cNvPr id="81" name="Pfeil: nach unten 80">
+            <a:extLst>
+              <a:ext uri="{FF2B5EF4-FFF2-40B4-BE49-F238E27FC236}">
+                <a16:creationId xmlns:a16="http://schemas.microsoft.com/office/drawing/2014/main" id="{441F571F-CCB1-4C14-83C1-FFB8914424E0}"/>
+              </a:ext>
+            </a:extLst>
+          </p:cNvPr>
+          <p:cNvSpPr/>
+          <p:nvPr/>
+        </p:nvSpPr>
+        <p:spPr>
+          <a:xfrm rot="5400000">
+            <a:off x="5923782" y="4212071"/>
+            <a:ext cx="97728" cy="1870851"/>
+          </a:xfrm>
+          <a:prstGeom prst="downArrow">
+            <a:avLst/>
+          </a:prstGeom>
+        </p:spPr>
+        <p:style>
+          <a:lnRef idx="2">
+            <a:schemeClr val="accent1">
+              <a:shade val="50000"/>
+            </a:schemeClr>
+          </a:lnRef>
+          <a:fillRef idx="1">
+            <a:schemeClr val="accent1"/>
+          </a:fillRef>
+          <a:effectRef idx="0">
+            <a:schemeClr val="accent1"/>
+          </a:effectRef>
+          <a:fontRef idx="minor">
+            <a:schemeClr val="lt1"/>
+          </a:fontRef>
+        </p:style>
+        <p:txBody>
+          <a:bodyPr rtlCol="0" anchor="ctr"/>
+          <a:lstStyle/>
+          <a:p>
+            <a:pPr algn="ctr"/>
+            <a:endParaRPr lang="en-US" sz="1350"/>
+          </a:p>
+        </p:txBody>
+      </p:sp>
     </p:spTree>
     <p:extLst>
       <p:ext uri="{BB962C8B-B14F-4D97-AF65-F5344CB8AC3E}">
@@ -12568,7 +12757,7 @@
                   <a:schemeClr val="tx1"/>
                 </a:solidFill>
               </a:rPr>
-              <a:t>Add Service Inputs</a:t>
+              <a:t>Manage Service Properties</a:t>
             </a:r>
             <a:endParaRPr lang="en-US" sz="900" dirty="0">
               <a:solidFill>
@@ -13661,94 +13850,6 @@
           </a:p>
         </p:txBody>
       </p:sp>
-      <p:sp>
-        <p:nvSpPr>
-          <p:cNvPr id="9" name="Rechteck: abgerundete Ecken 8">
-            <a:extLst>
-              <a:ext uri="{FF2B5EF4-FFF2-40B4-BE49-F238E27FC236}">
-                <a16:creationId xmlns:a16="http://schemas.microsoft.com/office/drawing/2014/main" id="{6BC292BF-1EC3-45FC-A2A9-F54981036079}"/>
-              </a:ext>
-            </a:extLst>
-          </p:cNvPr>
-          <p:cNvSpPr/>
-          <p:nvPr/>
-        </p:nvSpPr>
-        <p:spPr>
-          <a:xfrm>
-            <a:off x="4254432" y="3151900"/>
-            <a:ext cx="982363" cy="637609"/>
-          </a:xfrm>
-          <a:prstGeom prst="roundRect">
-            <a:avLst/>
-          </a:prstGeom>
-          <a:solidFill>
-            <a:schemeClr val="accent3">
-              <a:lumMod val="20000"/>
-              <a:lumOff val="80000"/>
-            </a:schemeClr>
-          </a:solidFill>
-          <a:ln>
-            <a:solidFill>
-              <a:schemeClr val="accent1">
-                <a:lumMod val="60000"/>
-                <a:lumOff val="40000"/>
-              </a:schemeClr>
-            </a:solidFill>
-          </a:ln>
-        </p:spPr>
-        <p:style>
-          <a:lnRef idx="2">
-            <a:schemeClr val="accent1">
-              <a:shade val="50000"/>
-            </a:schemeClr>
-          </a:lnRef>
-          <a:fillRef idx="1">
-            <a:schemeClr val="accent1"/>
-          </a:fillRef>
-          <a:effectRef idx="0">
-            <a:schemeClr val="accent1"/>
-          </a:effectRef>
-          <a:fontRef idx="minor">
-            <a:schemeClr val="lt1"/>
-          </a:fontRef>
-        </p:style>
-        <p:txBody>
-          <a:bodyPr rtlCol="0" anchor="ctr"/>
-          <a:lstStyle/>
-          <a:p>
-            <a:pPr algn="ctr"/>
-            <a:r>
-              <a:rPr lang="de-DE" sz="900" dirty="0" err="1">
-                <a:solidFill>
-                  <a:schemeClr val="tx1"/>
-                </a:solidFill>
-              </a:rPr>
-              <a:t>Verify</a:t>
-            </a:r>
-            <a:r>
-              <a:rPr lang="de-DE" sz="900" dirty="0">
-                <a:solidFill>
-                  <a:schemeClr val="tx1"/>
-                </a:solidFill>
-              </a:rPr>
-              <a:t> DCAE </a:t>
-            </a:r>
-            <a:r>
-              <a:rPr lang="de-DE" sz="900" dirty="0" err="1">
-                <a:solidFill>
-                  <a:schemeClr val="tx1"/>
-                </a:solidFill>
-              </a:rPr>
-              <a:t>Blueprint</a:t>
-            </a:r>
-            <a:endParaRPr lang="en-US" sz="900" dirty="0">
-              <a:solidFill>
-                <a:schemeClr val="tx1"/>
-              </a:solidFill>
-            </a:endParaRPr>
-          </a:p>
-        </p:txBody>
-      </p:sp>
       <p:cxnSp>
         <p:nvCxnSpPr>
           <p:cNvPr id="11" name="Gerade Verbindung mit Pfeil 10">
@@ -13892,108 +13993,6 @@
           </a:p>
         </p:txBody>
       </p:sp>
-      <p:sp>
-        <p:nvSpPr>
-          <p:cNvPr id="14" name="Rechteck: abgerundete Ecken 13">
-            <a:extLst>
-              <a:ext uri="{FF2B5EF4-FFF2-40B4-BE49-F238E27FC236}">
-                <a16:creationId xmlns:a16="http://schemas.microsoft.com/office/drawing/2014/main" id="{77B8C226-2441-42CB-8B2C-5628025DEA31}"/>
-              </a:ext>
-            </a:extLst>
-          </p:cNvPr>
-          <p:cNvSpPr/>
-          <p:nvPr/>
-        </p:nvSpPr>
-        <p:spPr>
-          <a:xfrm>
-            <a:off x="4104064" y="2776277"/>
-            <a:ext cx="1317332" cy="1360742"/>
-          </a:xfrm>
-          <a:prstGeom prst="roundRect">
-            <a:avLst>
-              <a:gd name="adj" fmla="val 6214"/>
-            </a:avLst>
-          </a:prstGeom>
-          <a:noFill/>
-          <a:ln>
-            <a:solidFill>
-              <a:schemeClr val="accent5">
-                <a:lumMod val="75000"/>
-              </a:schemeClr>
-            </a:solidFill>
-          </a:ln>
-        </p:spPr>
-        <p:style>
-          <a:lnRef idx="2">
-            <a:schemeClr val="accent1">
-              <a:shade val="50000"/>
-            </a:schemeClr>
-          </a:lnRef>
-          <a:fillRef idx="1">
-            <a:schemeClr val="accent1"/>
-          </a:fillRef>
-          <a:effectRef idx="0">
-            <a:schemeClr val="accent1"/>
-          </a:effectRef>
-          <a:fontRef idx="minor">
-            <a:schemeClr val="lt1"/>
-          </a:fontRef>
-        </p:style>
-        <p:txBody>
-          <a:bodyPr rtlCol="0" anchor="ctr"/>
-          <a:lstStyle/>
-          <a:p>
-            <a:pPr algn="ctr"/>
-            <a:endParaRPr lang="en-US" sz="1350"/>
-          </a:p>
-        </p:txBody>
-      </p:sp>
-      <p:cxnSp>
-        <p:nvCxnSpPr>
-          <p:cNvPr id="16" name="Gerade Verbindung mit Pfeil 15">
-            <a:extLst>
-              <a:ext uri="{FF2B5EF4-FFF2-40B4-BE49-F238E27FC236}">
-                <a16:creationId xmlns:a16="http://schemas.microsoft.com/office/drawing/2014/main" id="{261B4848-2DD1-4BED-A9BB-B8C38406CEF2}"/>
-              </a:ext>
-            </a:extLst>
-          </p:cNvPr>
-          <p:cNvCxnSpPr>
-            <a:cxnSpLocks/>
-            <a:stCxn id="8" idx="3"/>
-            <a:endCxn id="9" idx="1"/>
-          </p:cNvCxnSpPr>
-          <p:nvPr/>
-        </p:nvCxnSpPr>
-        <p:spPr>
-          <a:xfrm>
-            <a:off x="3784258" y="3470705"/>
-            <a:ext cx="470174" cy="0"/>
-          </a:xfrm>
-          <a:prstGeom prst="straightConnector1">
-            <a:avLst/>
-          </a:prstGeom>
-          <a:ln w="19050">
-            <a:solidFill>
-              <a:srgbClr val="00B050"/>
-            </a:solidFill>
-            <a:tailEnd type="triangle"/>
-          </a:ln>
-        </p:spPr>
-        <p:style>
-          <a:lnRef idx="1">
-            <a:schemeClr val="accent1"/>
-          </a:lnRef>
-          <a:fillRef idx="0">
-            <a:schemeClr val="accent1"/>
-          </a:fillRef>
-          <a:effectRef idx="0">
-            <a:schemeClr val="accent1"/>
-          </a:effectRef>
-          <a:fontRef idx="minor">
-            <a:schemeClr val="tx1"/>
-          </a:fontRef>
-        </p:style>
-      </p:cxnSp>
     </p:spTree>
     <p:extLst>
       <p:ext uri="{BB962C8B-B14F-4D97-AF65-F5344CB8AC3E}">
@@ -14887,9 +14886,12 @@
 </file>
 
 <file path=customXml/item1.xml><?xml version="1.0" encoding="utf-8"?>
-<p:properties xmlns:p="http://schemas.microsoft.com/office/2006/metadata/properties" xmlns:xsi="http://www.w3.org/2001/XMLSchema-instance" xmlns:pc="http://schemas.microsoft.com/office/infopath/2007/PartnerControls">
-  <documentManagement/>
-</p:properties>
+<?mso-contentType ?>
+<FormTemplates xmlns="http://schemas.microsoft.com/sharepoint/v3/contenttype/forms">
+  <Display>DocumentLibraryForm</Display>
+  <Edit>DocumentLibraryForm</Edit>
+  <New>DocumentLibraryForm</New>
+</FormTemplates>
 </file>
 
 <file path=customXml/item2.xml><?xml version="1.0" encoding="utf-8"?>
@@ -15096,27 +15098,15 @@
 </file>
 
 <file path=customXml/item3.xml><?xml version="1.0" encoding="utf-8"?>
-<?mso-contentType ?>
-<FormTemplates xmlns="http://schemas.microsoft.com/sharepoint/v3/contenttype/forms">
-  <Display>DocumentLibraryForm</Display>
-  <Edit>DocumentLibraryForm</Edit>
-  <New>DocumentLibraryForm</New>
-</FormTemplates>
+<p:properties xmlns:p="http://schemas.microsoft.com/office/2006/metadata/properties" xmlns:xsi="http://www.w3.org/2001/XMLSchema-instance" xmlns:pc="http://schemas.microsoft.com/office/infopath/2007/PartnerControls">
+  <documentManagement/>
+</p:properties>
 </file>
 
 <file path=customXml/itemProps1.xml><?xml version="1.0" encoding="utf-8"?>
-<ds:datastoreItem xmlns:ds="http://schemas.openxmlformats.org/officeDocument/2006/customXml" ds:itemID="{95E6422D-CDE5-4E40-8B32-6E4DD424FDB1}">
+<ds:datastoreItem xmlns:ds="http://schemas.openxmlformats.org/officeDocument/2006/customXml" ds:itemID="{D5576060-35D7-4F36-83E3-6A8D02E5E420}">
   <ds:schemaRefs>
-    <ds:schemaRef ds:uri="http://purl.org/dc/terms/"/>
-    <ds:schemaRef ds:uri="http://schemas.microsoft.com/office/2006/metadata/properties"/>
-    <ds:schemaRef ds:uri="http://schemas.microsoft.com/office/2006/documentManagement/types"/>
-    <ds:schemaRef ds:uri="4d828b48-b1c4-4622-aff4-c41f2642b6e4"/>
-    <ds:schemaRef ds:uri="http://purl.org/dc/elements/1.1/"/>
-    <ds:schemaRef ds:uri="http://schemas.openxmlformats.org/package/2006/metadata/core-properties"/>
-    <ds:schemaRef ds:uri="12a1d171-42c9-4543-9ae0-1eb64d0b6128"/>
-    <ds:schemaRef ds:uri="http://schemas.microsoft.com/office/infopath/2007/PartnerControls"/>
-    <ds:schemaRef ds:uri="http://www.w3.org/XML/1998/namespace"/>
-    <ds:schemaRef ds:uri="http://purl.org/dc/dcmitype/"/>
+    <ds:schemaRef ds:uri="http://schemas.microsoft.com/sharepoint/v3/contenttype/forms"/>
   </ds:schemaRefs>
 </ds:datastoreItem>
 </file>
@@ -15141,9 +15131,18 @@
 </file>
 
 <file path=customXml/itemProps3.xml><?xml version="1.0" encoding="utf-8"?>
-<ds:datastoreItem xmlns:ds="http://schemas.openxmlformats.org/officeDocument/2006/customXml" ds:itemID="{D5576060-35D7-4F36-83E3-6A8D02E5E420}">
+<ds:datastoreItem xmlns:ds="http://schemas.openxmlformats.org/officeDocument/2006/customXml" ds:itemID="{95E6422D-CDE5-4E40-8B32-6E4DD424FDB1}">
   <ds:schemaRefs>
-    <ds:schemaRef ds:uri="http://schemas.microsoft.com/sharepoint/v3/contenttype/forms"/>
+    <ds:schemaRef ds:uri="http://purl.org/dc/elements/1.1/"/>
+    <ds:schemaRef ds:uri="http://schemas.microsoft.com/office/2006/metadata/properties"/>
+    <ds:schemaRef ds:uri="http://schemas.microsoft.com/office/2006/documentManagement/types"/>
+    <ds:schemaRef ds:uri="4d828b48-b1c4-4622-aff4-c41f2642b6e4"/>
+    <ds:schemaRef ds:uri="http://purl.org/dc/terms/"/>
+    <ds:schemaRef ds:uri="http://schemas.openxmlformats.org/package/2006/metadata/core-properties"/>
+    <ds:schemaRef ds:uri="http://purl.org/dc/dcmitype/"/>
+    <ds:schemaRef ds:uri="12a1d171-42c9-4543-9ae0-1eb64d0b6128"/>
+    <ds:schemaRef ds:uri="http://schemas.microsoft.com/office/infopath/2007/PartnerControls"/>
+    <ds:schemaRef ds:uri="http://www.w3.org/XML/1998/namespace"/>
   </ds:schemaRefs>
 </ds:datastoreItem>
 </file>
</xml_diff>

<commit_message>
Spellchecking visible in Design-Overview.png
Issue-ID: DOC-707

Signed-off-by: thmsdt <thomas.kulik@telekom.de>
Change-Id: I006a1678f74ec513b92f711e97c5f6b6df7d03e6
</commit_message>
<xml_diff>
--- a/docs/guides/onap-user/design/media/Design-Overview.pptx
+++ b/docs/guides/onap-user/design/media/Design-Overview.pptx
@@ -6,7 +6,7 @@
   </p:sldMasterIdLst>
   <p:sldIdLst>
     <p:sldId id="702" r:id="rId5"/>
-    <p:sldId id="703" r:id="rId6"/>
+    <p:sldId id="708" r:id="rId6"/>
     <p:sldId id="705" r:id="rId7"/>
     <p:sldId id="706" r:id="rId8"/>
     <p:sldId id="707" r:id="rId9"/>
@@ -2753,7 +2753,7 @@
           <a:p>
             <a:fld id="{FB81F4CD-C055-4F6E-AA50-658A12F0DD28}" type="datetimeFigureOut">
               <a:rPr lang="en-US" smtClean="0"/>
-              <a:t>11/5/2020</a:t>
+              <a:t>8/3/2021</a:t>
             </a:fld>
             <a:endParaRPr lang="en-US"/>
           </a:p>
@@ -2923,7 +2923,7 @@
           <a:p>
             <a:fld id="{FB81F4CD-C055-4F6E-AA50-658A12F0DD28}" type="datetimeFigureOut">
               <a:rPr lang="en-US" smtClean="0"/>
-              <a:t>11/5/2020</a:t>
+              <a:t>8/3/2021</a:t>
             </a:fld>
             <a:endParaRPr lang="en-US"/>
           </a:p>
@@ -3103,7 +3103,7 @@
           <a:p>
             <a:fld id="{FB81F4CD-C055-4F6E-AA50-658A12F0DD28}" type="datetimeFigureOut">
               <a:rPr lang="en-US" smtClean="0"/>
-              <a:t>11/5/2020</a:t>
+              <a:t>8/3/2021</a:t>
             </a:fld>
             <a:endParaRPr lang="en-US"/>
           </a:p>
@@ -3273,7 +3273,7 @@
           <a:p>
             <a:fld id="{FB81F4CD-C055-4F6E-AA50-658A12F0DD28}" type="datetimeFigureOut">
               <a:rPr lang="en-US" smtClean="0"/>
-              <a:t>11/5/2020</a:t>
+              <a:t>8/3/2021</a:t>
             </a:fld>
             <a:endParaRPr lang="en-US"/>
           </a:p>
@@ -3517,7 +3517,7 @@
           <a:p>
             <a:fld id="{FB81F4CD-C055-4F6E-AA50-658A12F0DD28}" type="datetimeFigureOut">
               <a:rPr lang="en-US" smtClean="0"/>
-              <a:t>11/5/2020</a:t>
+              <a:t>8/3/2021</a:t>
             </a:fld>
             <a:endParaRPr lang="en-US"/>
           </a:p>
@@ -3749,7 +3749,7 @@
           <a:p>
             <a:fld id="{FB81F4CD-C055-4F6E-AA50-658A12F0DD28}" type="datetimeFigureOut">
               <a:rPr lang="en-US" smtClean="0"/>
-              <a:t>11/5/2020</a:t>
+              <a:t>8/3/2021</a:t>
             </a:fld>
             <a:endParaRPr lang="en-US"/>
           </a:p>
@@ -4116,7 +4116,7 @@
           <a:p>
             <a:fld id="{FB81F4CD-C055-4F6E-AA50-658A12F0DD28}" type="datetimeFigureOut">
               <a:rPr lang="en-US" smtClean="0"/>
-              <a:t>11/5/2020</a:t>
+              <a:t>8/3/2021</a:t>
             </a:fld>
             <a:endParaRPr lang="en-US"/>
           </a:p>
@@ -4234,7 +4234,7 @@
           <a:p>
             <a:fld id="{FB81F4CD-C055-4F6E-AA50-658A12F0DD28}" type="datetimeFigureOut">
               <a:rPr lang="en-US" smtClean="0"/>
-              <a:t>11/5/2020</a:t>
+              <a:t>8/3/2021</a:t>
             </a:fld>
             <a:endParaRPr lang="en-US"/>
           </a:p>
@@ -4329,7 +4329,7 @@
           <a:p>
             <a:fld id="{FB81F4CD-C055-4F6E-AA50-658A12F0DD28}" type="datetimeFigureOut">
               <a:rPr lang="en-US" smtClean="0"/>
-              <a:t>11/5/2020</a:t>
+              <a:t>8/3/2021</a:t>
             </a:fld>
             <a:endParaRPr lang="en-US"/>
           </a:p>
@@ -4606,7 +4606,7 @@
           <a:p>
             <a:fld id="{FB81F4CD-C055-4F6E-AA50-658A12F0DD28}" type="datetimeFigureOut">
               <a:rPr lang="en-US" smtClean="0"/>
-              <a:t>11/5/2020</a:t>
+              <a:t>8/3/2021</a:t>
             </a:fld>
             <a:endParaRPr lang="en-US"/>
           </a:p>
@@ -4777,7 +4777,7 @@
               <a:rPr lang="de-DE"/>
               <a:t>Bild durch Klicken auf Symbol hinzufügen</a:t>
             </a:r>
-            <a:endParaRPr lang="en-US" dirty="0"/>
+            <a:endParaRPr lang="en-US"/>
           </a:p>
         </p:txBody>
       </p:sp>
@@ -4863,7 +4863,7 @@
           <a:p>
             <a:fld id="{FB81F4CD-C055-4F6E-AA50-658A12F0DD28}" type="datetimeFigureOut">
               <a:rPr lang="en-US" smtClean="0"/>
-              <a:t>11/5/2020</a:t>
+              <a:t>8/3/2021</a:t>
             </a:fld>
             <a:endParaRPr lang="en-US"/>
           </a:p>
@@ -5076,7 +5076,7 @@
           <a:p>
             <a:fld id="{FB81F4CD-C055-4F6E-AA50-658A12F0DD28}" type="datetimeFigureOut">
               <a:rPr lang="en-US" smtClean="0"/>
-              <a:t>11/5/2020</a:t>
+              <a:t>8/3/2021</a:t>
             </a:fld>
             <a:endParaRPr lang="en-US"/>
           </a:p>
@@ -5530,10 +5530,10 @@
           <a:lstStyle/>
           <a:p>
             <a:r>
-              <a:rPr lang="de-DE" sz="1350" b="1" dirty="0"/>
+              <a:rPr lang="de-DE" sz="1350" b="1"/>
               <a:t>SDC</a:t>
             </a:r>
-            <a:endParaRPr lang="en-US" sz="1350" b="1" dirty="0"/>
+            <a:endParaRPr lang="en-US" sz="1350" b="1"/>
           </a:p>
         </p:txBody>
       </p:sp>
@@ -5585,7 +5585,7 @@
           <a:lstStyle/>
           <a:p>
             <a:pPr algn="ctr"/>
-            <a:endParaRPr lang="en-US" sz="1350" dirty="0"/>
+            <a:endParaRPr lang="en-US" sz="1350"/>
           </a:p>
         </p:txBody>
       </p:sp>
@@ -5618,10 +5618,10 @@
           <a:lstStyle/>
           <a:p>
             <a:r>
-              <a:rPr lang="de-DE" sz="1350" dirty="0"/>
+              <a:rPr lang="de-DE" sz="1350"/>
               <a:t>VNF/PNF Provider</a:t>
             </a:r>
-            <a:endParaRPr lang="en-US" sz="1350" dirty="0"/>
+            <a:endParaRPr lang="en-US" sz="1350"/>
           </a:p>
         </p:txBody>
       </p:sp>
@@ -5655,39 +5655,39 @@
           <a:p>
             <a:pPr algn="ctr"/>
             <a:r>
-              <a:rPr lang="de-DE" sz="900" dirty="0"/>
+              <a:rPr lang="de-DE" sz="900"/>
               <a:t>xNF</a:t>
             </a:r>
             <a:br>
-              <a:rPr lang="de-DE" sz="900" dirty="0"/>
+              <a:rPr lang="de-DE" sz="900"/>
             </a:br>
             <a:r>
-              <a:rPr lang="de-DE" sz="900" dirty="0" err="1"/>
+              <a:rPr lang="de-DE" sz="900" err="1"/>
               <a:t>Descriptor</a:t>
             </a:r>
             <a:r>
-              <a:rPr lang="de-DE" sz="900" dirty="0"/>
+              <a:rPr lang="de-DE" sz="900"/>
               <a:t>,</a:t>
             </a:r>
             <a:br>
-              <a:rPr lang="de-DE" sz="900" dirty="0"/>
+              <a:rPr lang="de-DE" sz="900"/>
             </a:br>
             <a:r>
-              <a:rPr lang="de-DE" sz="900" dirty="0" err="1"/>
+              <a:rPr lang="de-DE" sz="900" err="1"/>
               <a:t>Artifacts</a:t>
             </a:r>
             <a:r>
-              <a:rPr lang="de-DE" sz="900" dirty="0"/>
+              <a:rPr lang="de-DE" sz="900"/>
               <a:t>, </a:t>
             </a:r>
           </a:p>
           <a:p>
             <a:pPr algn="ctr"/>
             <a:r>
-              <a:rPr lang="de-DE" sz="900" dirty="0"/>
+              <a:rPr lang="de-DE" sz="900"/>
               <a:t>Model</a:t>
             </a:r>
-            <a:endParaRPr lang="en-US" sz="900" dirty="0"/>
+            <a:endParaRPr lang="en-US" sz="900"/>
           </a:p>
         </p:txBody>
       </p:sp>
@@ -5732,14 +5732,14 @@
           <a:p>
             <a:pPr algn="ctr"/>
             <a:r>
-              <a:rPr lang="de-DE" sz="1350" dirty="0" err="1"/>
+              <a:rPr lang="de-DE" sz="1350" err="1"/>
               <a:t>Pre</a:t>
             </a:r>
             <a:r>
-              <a:rPr lang="de-DE" sz="1350" dirty="0"/>
+              <a:rPr lang="de-DE" sz="1350"/>
               <a:t>-Onboarding</a:t>
             </a:r>
-            <a:endParaRPr lang="en-US" sz="1350" dirty="0"/>
+            <a:endParaRPr lang="en-US" sz="1350"/>
           </a:p>
         </p:txBody>
       </p:sp>
@@ -5773,17 +5773,17 @@
           <a:p>
             <a:pPr algn="ctr"/>
             <a:r>
-              <a:rPr lang="de-DE" sz="900" dirty="0"/>
+              <a:rPr lang="de-DE" sz="900"/>
               <a:t>Validation</a:t>
             </a:r>
             <a:br>
-              <a:rPr lang="de-DE" sz="900" dirty="0"/>
+              <a:rPr lang="de-DE" sz="900"/>
             </a:br>
             <a:r>
-              <a:rPr lang="de-DE" sz="900" dirty="0"/>
+              <a:rPr lang="de-DE" sz="900"/>
               <a:t>(VNF-SDK)</a:t>
             </a:r>
-            <a:endParaRPr lang="en-US" sz="900" dirty="0"/>
+            <a:endParaRPr lang="en-US" sz="900"/>
           </a:p>
         </p:txBody>
       </p:sp>
@@ -5817,10 +5817,10 @@
           <a:p>
             <a:pPr algn="ctr"/>
             <a:r>
-              <a:rPr lang="de-DE" sz="900" dirty="0" err="1"/>
+              <a:rPr lang="de-DE" sz="900" err="1"/>
               <a:t>Packaging</a:t>
             </a:r>
-            <a:endParaRPr lang="en-US" sz="900" dirty="0"/>
+            <a:endParaRPr lang="en-US" sz="900"/>
           </a:p>
         </p:txBody>
       </p:sp>
@@ -5865,10 +5865,10 @@
           <a:p>
             <a:pPr algn="ctr"/>
             <a:r>
-              <a:rPr lang="de-DE" sz="1350" dirty="0"/>
+              <a:rPr lang="de-DE" sz="1350"/>
               <a:t>Onboarding</a:t>
             </a:r>
-            <a:endParaRPr lang="en-US" sz="1350" dirty="0"/>
+            <a:endParaRPr lang="en-US" sz="1350"/>
           </a:p>
         </p:txBody>
       </p:sp>
@@ -5913,22 +5913,22 @@
           <a:p>
             <a:pPr algn="ctr"/>
             <a:r>
-              <a:rPr lang="de-DE" sz="1350" dirty="0"/>
+              <a:rPr lang="de-DE" sz="1350"/>
               <a:t>VF </a:t>
             </a:r>
             <a:r>
-              <a:rPr lang="de-DE" sz="1350" dirty="0" err="1"/>
+              <a:rPr lang="de-DE" sz="1350" err="1"/>
               <a:t>Creation</a:t>
             </a:r>
             <a:r>
-              <a:rPr lang="de-DE" sz="1350" dirty="0"/>
+              <a:rPr lang="de-DE" sz="1350"/>
               <a:t> and </a:t>
             </a:r>
             <a:r>
-              <a:rPr lang="de-DE" sz="1350" dirty="0" err="1"/>
+              <a:rPr lang="de-DE" sz="1350" err="1"/>
               <a:t>Testing</a:t>
             </a:r>
-            <a:endParaRPr lang="en-US" sz="1350" dirty="0"/>
+            <a:endParaRPr lang="en-US" sz="1350"/>
           </a:p>
         </p:txBody>
       </p:sp>
@@ -5973,10 +5973,10 @@
           <a:p>
             <a:pPr algn="ctr"/>
             <a:r>
-              <a:rPr lang="de-DE" sz="1350" dirty="0"/>
+              <a:rPr lang="de-DE" sz="1350"/>
               <a:t>Service Design</a:t>
             </a:r>
-            <a:endParaRPr lang="en-US" sz="1350" dirty="0"/>
+            <a:endParaRPr lang="en-US" sz="1350"/>
           </a:p>
         </p:txBody>
       </p:sp>
@@ -6021,22 +6021,22 @@
           <a:p>
             <a:pPr algn="ctr"/>
             <a:r>
-              <a:rPr lang="de-DE" sz="1350" dirty="0" err="1"/>
+              <a:rPr lang="de-DE" sz="1350" err="1"/>
               <a:t>Governance</a:t>
             </a:r>
             <a:r>
-              <a:rPr lang="de-DE" sz="1350" dirty="0"/>
+              <a:rPr lang="de-DE" sz="1350"/>
               <a:t> </a:t>
             </a:r>
             <a:r>
-              <a:rPr lang="de-DE" sz="1350" dirty="0" err="1"/>
+              <a:rPr lang="de-DE" sz="1350" err="1"/>
               <a:t>Approval</a:t>
             </a:r>
             <a:r>
-              <a:rPr lang="de-DE" sz="1350" dirty="0"/>
+              <a:rPr lang="de-DE" sz="1350"/>
               <a:t> and Service Distribution</a:t>
             </a:r>
-            <a:endParaRPr lang="en-US" sz="1350" dirty="0"/>
+            <a:endParaRPr lang="en-US" sz="1350"/>
           </a:p>
         </p:txBody>
       </p:sp>
@@ -6081,10 +6081,10 @@
           <a:p>
             <a:pPr algn="ctr"/>
             <a:r>
-              <a:rPr lang="de-DE" sz="1350" dirty="0"/>
+              <a:rPr lang="de-DE" sz="1350"/>
               <a:t>Control Loop Design</a:t>
             </a:r>
-            <a:endParaRPr lang="en-US" sz="1350" dirty="0"/>
+            <a:endParaRPr lang="en-US" sz="1350"/>
           </a:p>
         </p:txBody>
       </p:sp>
@@ -6129,10 +6129,10 @@
           <a:p>
             <a:pPr algn="ctr"/>
             <a:r>
-              <a:rPr lang="de-DE" sz="1350" dirty="0"/>
+              <a:rPr lang="de-DE" sz="1350"/>
               <a:t>Controller Design Studio</a:t>
             </a:r>
-            <a:endParaRPr lang="en-US" sz="1350" dirty="0"/>
+            <a:endParaRPr lang="en-US" sz="1350"/>
           </a:p>
         </p:txBody>
       </p:sp>
@@ -6177,10 +6177,10 @@
           <a:p>
             <a:pPr algn="ctr"/>
             <a:r>
-              <a:rPr lang="de-DE" sz="1350" dirty="0"/>
+              <a:rPr lang="de-DE" sz="1350"/>
               <a:t>Workflow Design</a:t>
             </a:r>
-            <a:endParaRPr lang="en-US" sz="1350" dirty="0"/>
+            <a:endParaRPr lang="en-US" sz="1350"/>
           </a:p>
         </p:txBody>
       </p:sp>
@@ -6214,10 +6214,10 @@
           <a:p>
             <a:pPr algn="ctr"/>
             <a:r>
-              <a:rPr lang="de-DE" sz="900" dirty="0"/>
+              <a:rPr lang="de-DE" sz="900"/>
               <a:t>License</a:t>
             </a:r>
-            <a:endParaRPr lang="en-US" sz="900" dirty="0"/>
+            <a:endParaRPr lang="en-US" sz="900"/>
           </a:p>
         </p:txBody>
       </p:sp>
@@ -6251,17 +6251,17 @@
           <a:p>
             <a:pPr algn="ctr"/>
             <a:r>
-              <a:rPr lang="de-DE" sz="900" dirty="0"/>
+              <a:rPr lang="de-DE" sz="900"/>
               <a:t>Vendor Software</a:t>
             </a:r>
           </a:p>
           <a:p>
             <a:pPr algn="ctr"/>
             <a:r>
-              <a:rPr lang="de-DE" sz="900" dirty="0" err="1"/>
+              <a:rPr lang="de-DE" sz="900" err="1"/>
               <a:t>Product</a:t>
             </a:r>
-            <a:endParaRPr lang="en-US" sz="900" dirty="0"/>
+            <a:endParaRPr lang="en-US" sz="900"/>
           </a:p>
         </p:txBody>
       </p:sp>
@@ -6295,10 +6295,10 @@
           <a:p>
             <a:pPr algn="ctr"/>
             <a:r>
-              <a:rPr lang="de-DE" sz="900" dirty="0" err="1"/>
+              <a:rPr lang="de-DE" sz="900" err="1"/>
               <a:t>Blueprint</a:t>
             </a:r>
-            <a:endParaRPr lang="en-US" sz="900" dirty="0"/>
+            <a:endParaRPr lang="en-US" sz="900"/>
           </a:p>
         </p:txBody>
       </p:sp>
@@ -6332,10 +6332,10 @@
           <a:p>
             <a:pPr algn="ctr"/>
             <a:r>
-              <a:rPr lang="de-DE" sz="900" dirty="0" err="1"/>
+              <a:rPr lang="de-DE" sz="900" err="1"/>
               <a:t>Packaging</a:t>
             </a:r>
-            <a:endParaRPr lang="en-US" sz="900" dirty="0"/>
+            <a:endParaRPr lang="en-US" sz="900"/>
           </a:p>
         </p:txBody>
       </p:sp>
@@ -6369,10 +6369,10 @@
           <a:p>
             <a:pPr algn="ctr"/>
             <a:r>
-              <a:rPr lang="de-DE" sz="900" dirty="0"/>
+              <a:rPr lang="de-DE" sz="900"/>
               <a:t>Data Dictionary</a:t>
             </a:r>
-            <a:endParaRPr lang="en-US" sz="900" dirty="0"/>
+            <a:endParaRPr lang="en-US" sz="900"/>
           </a:p>
         </p:txBody>
       </p:sp>
@@ -6406,10 +6406,10 @@
           <a:p>
             <a:pPr algn="ctr"/>
             <a:r>
-              <a:rPr lang="de-DE" sz="900" dirty="0"/>
+              <a:rPr lang="de-DE" sz="900"/>
               <a:t>VF/VNF/PNF</a:t>
             </a:r>
-            <a:endParaRPr lang="en-US" sz="900" dirty="0"/>
+            <a:endParaRPr lang="en-US" sz="900"/>
           </a:p>
         </p:txBody>
       </p:sp>
@@ -6442,10 +6442,10 @@
           <a:lstStyle/>
           <a:p>
             <a:r>
-              <a:rPr lang="de-DE" sz="1350" dirty="0"/>
+              <a:rPr lang="de-DE" sz="1350"/>
               <a:t>Tester</a:t>
             </a:r>
-            <a:endParaRPr lang="en-US" sz="1350" dirty="0"/>
+            <a:endParaRPr lang="en-US" sz="1350"/>
           </a:p>
         </p:txBody>
       </p:sp>
@@ -6479,10 +6479,10 @@
           <a:p>
             <a:pPr algn="ctr"/>
             <a:r>
-              <a:rPr lang="de-DE" sz="900" dirty="0" err="1"/>
+              <a:rPr lang="de-DE" sz="900" err="1"/>
               <a:t>Testing</a:t>
             </a:r>
-            <a:endParaRPr lang="en-US" sz="900" dirty="0"/>
+            <a:endParaRPr lang="en-US" sz="900"/>
           </a:p>
         </p:txBody>
       </p:sp>
@@ -6516,18 +6516,18 @@
           <a:p>
             <a:pPr algn="ctr"/>
             <a:r>
-              <a:rPr lang="de-DE" sz="900" dirty="0"/>
+              <a:rPr lang="de-DE" sz="900"/>
               <a:t>DCAE </a:t>
             </a:r>
             <a:r>
-              <a:rPr lang="de-DE" sz="900" dirty="0" err="1"/>
+              <a:rPr lang="de-DE" sz="900" err="1"/>
               <a:t>Blueprint</a:t>
             </a:r>
             <a:r>
-              <a:rPr lang="de-DE" sz="900" dirty="0"/>
+              <a:rPr lang="de-DE" sz="900"/>
               <a:t> (DCAE-DS)</a:t>
             </a:r>
-            <a:endParaRPr lang="en-US" sz="900" dirty="0"/>
+            <a:endParaRPr lang="en-US" sz="900"/>
           </a:p>
         </p:txBody>
       </p:sp>
@@ -6561,10 +6561,10 @@
           <a:p>
             <a:pPr algn="ctr"/>
             <a:r>
-              <a:rPr lang="de-DE" sz="900" dirty="0"/>
+              <a:rPr lang="de-DE" sz="900"/>
               <a:t>SO-Workflow</a:t>
             </a:r>
-            <a:endParaRPr lang="en-US" sz="900" dirty="0"/>
+            <a:endParaRPr lang="en-US" sz="900"/>
           </a:p>
         </p:txBody>
       </p:sp>
@@ -6597,10 +6597,10 @@
           <a:lstStyle/>
           <a:p>
             <a:r>
-              <a:rPr lang="de-DE" sz="1350" dirty="0"/>
+              <a:rPr lang="de-DE" sz="1350"/>
               <a:t>Designer</a:t>
             </a:r>
-            <a:endParaRPr lang="en-US" sz="1350" dirty="0"/>
+            <a:endParaRPr lang="en-US" sz="1350"/>
           </a:p>
         </p:txBody>
       </p:sp>
@@ -6633,10 +6633,10 @@
           <a:lstStyle/>
           <a:p>
             <a:r>
-              <a:rPr lang="de-DE" sz="1350" dirty="0" err="1"/>
+              <a:rPr lang="de-DE" sz="1350" err="1"/>
               <a:t>Gouvernour</a:t>
             </a:r>
-            <a:endParaRPr lang="en-US" sz="1350" dirty="0"/>
+            <a:endParaRPr lang="en-US" sz="1350"/>
           </a:p>
         </p:txBody>
       </p:sp>
@@ -6669,10 +6669,10 @@
           <a:lstStyle/>
           <a:p>
             <a:r>
-              <a:rPr lang="de-DE" sz="1350" dirty="0"/>
+              <a:rPr lang="de-DE" sz="1350"/>
               <a:t>Operator</a:t>
             </a:r>
-            <a:endParaRPr lang="en-US" sz="1350" dirty="0"/>
+            <a:endParaRPr lang="en-US" sz="1350"/>
           </a:p>
         </p:txBody>
       </p:sp>
@@ -7200,10 +7200,10 @@
           <a:p>
             <a:pPr algn="ctr"/>
             <a:r>
-              <a:rPr lang="de-DE" sz="900" dirty="0" err="1"/>
+              <a:rPr lang="de-DE" sz="900" err="1"/>
               <a:t>Testing</a:t>
             </a:r>
-            <a:endParaRPr lang="en-US" sz="900" dirty="0"/>
+            <a:endParaRPr lang="en-US" sz="900"/>
           </a:p>
         </p:txBody>
       </p:sp>
@@ -7237,10 +7237,10 @@
           <a:p>
             <a:pPr algn="ctr"/>
             <a:r>
-              <a:rPr lang="de-DE" sz="900" dirty="0"/>
+              <a:rPr lang="de-DE" sz="900"/>
               <a:t>Design</a:t>
             </a:r>
-            <a:endParaRPr lang="en-US" sz="900" dirty="0"/>
+            <a:endParaRPr lang="en-US" sz="900"/>
           </a:p>
         </p:txBody>
       </p:sp>
@@ -7274,10 +7274,10 @@
           <a:p>
             <a:pPr algn="ctr"/>
             <a:r>
-              <a:rPr lang="de-DE" sz="900" dirty="0" err="1"/>
+              <a:rPr lang="de-DE" sz="900" err="1"/>
               <a:t>Approve</a:t>
             </a:r>
-            <a:endParaRPr lang="en-US" sz="900" dirty="0"/>
+            <a:endParaRPr lang="en-US" sz="900"/>
           </a:p>
         </p:txBody>
       </p:sp>
@@ -7311,10 +7311,10 @@
           <a:p>
             <a:pPr algn="ctr"/>
             <a:r>
-              <a:rPr lang="de-DE" sz="900" dirty="0" err="1"/>
+              <a:rPr lang="de-DE" sz="900" err="1"/>
               <a:t>Distribute</a:t>
             </a:r>
-            <a:endParaRPr lang="en-US" sz="900" dirty="0"/>
+            <a:endParaRPr lang="en-US" sz="900"/>
           </a:p>
         </p:txBody>
       </p:sp>
@@ -7348,14 +7348,14 @@
           <a:p>
             <a:pPr algn="ctr"/>
             <a:r>
-              <a:rPr lang="de-DE" sz="900" dirty="0" err="1"/>
+              <a:rPr lang="de-DE" sz="900" err="1"/>
               <a:t>Runtime</a:t>
             </a:r>
             <a:r>
-              <a:rPr lang="de-DE" sz="900" dirty="0"/>
+              <a:rPr lang="de-DE" sz="900"/>
               <a:t> Catalog</a:t>
             </a:r>
-            <a:endParaRPr lang="en-US" sz="900" dirty="0"/>
+            <a:endParaRPr lang="en-US" sz="900"/>
           </a:p>
         </p:txBody>
       </p:sp>
@@ -7400,10 +7400,10 @@
           <a:p>
             <a:pPr algn="ctr"/>
             <a:r>
-              <a:rPr lang="de-DE" sz="1350" dirty="0"/>
+              <a:rPr lang="de-DE" sz="1350"/>
               <a:t>Policy Design</a:t>
             </a:r>
-            <a:endParaRPr lang="en-US" sz="1350" dirty="0"/>
+            <a:endParaRPr lang="en-US" sz="1350"/>
           </a:p>
         </p:txBody>
       </p:sp>
@@ -7448,10 +7448,10 @@
           <a:p>
             <a:pPr algn="ctr"/>
             <a:r>
-              <a:rPr lang="de-DE" sz="1350" dirty="0"/>
+              <a:rPr lang="de-DE" sz="1350"/>
               <a:t>APPC CDT</a:t>
             </a:r>
-            <a:endParaRPr lang="en-US" sz="1350" dirty="0"/>
+            <a:endParaRPr lang="en-US" sz="1350"/>
           </a:p>
         </p:txBody>
       </p:sp>
@@ -8516,7 +8516,7 @@
           <p:cNvPr id="2" name="Gruppieren 1">
             <a:extLst>
               <a:ext uri="{FF2B5EF4-FFF2-40B4-BE49-F238E27FC236}">
-                <a16:creationId xmlns:a16="http://schemas.microsoft.com/office/drawing/2014/main" id="{A4920DB5-D3B3-4E95-BCFC-F9DA88DAE263}"/>
+                <a16:creationId xmlns:a16="http://schemas.microsoft.com/office/drawing/2014/main" id="{E708BAD7-669F-4DF9-AE44-AA30D77170BD}"/>
               </a:ext>
             </a:extLst>
           </p:cNvPr>
@@ -8526,9 +8526,9 @@
         <p:grpSpPr>
           <a:xfrm>
             <a:off x="398160" y="681616"/>
-            <a:ext cx="8578032" cy="4958043"/>
+            <a:ext cx="8578032" cy="4923418"/>
             <a:chOff x="398160" y="681616"/>
-            <a:chExt cx="8578032" cy="4958043"/>
+            <a:chExt cx="8578032" cy="4923418"/>
           </a:xfrm>
         </p:grpSpPr>
         <p:sp>
@@ -8577,18 +8577,18 @@
             </a:fontRef>
           </p:style>
           <p:txBody>
-            <a:bodyPr rtlCol="0" anchor="b"/>
+            <a:bodyPr wrap="none" rtlCol="0" anchor="b"/>
             <a:lstStyle/>
             <a:p>
               <a:r>
-                <a:rPr lang="de-DE" sz="1350" b="1" dirty="0">
+                <a:rPr lang="de-DE" sz="1350" b="1">
                   <a:solidFill>
                     <a:schemeClr val="bg1"/>
                   </a:solidFill>
                 </a:rPr>
                 <a:t>SDC</a:t>
               </a:r>
-              <a:endParaRPr lang="en-US" sz="1350" b="1" dirty="0">
+              <a:endParaRPr lang="en-US" sz="1350" b="1">
                 <a:solidFill>
                   <a:schemeClr val="bg1"/>
                 </a:solidFill>
@@ -8637,11 +8637,11 @@
             </a:fontRef>
           </p:style>
           <p:txBody>
-            <a:bodyPr rtlCol="0" anchor="ctr"/>
+            <a:bodyPr wrap="none" rtlCol="0" anchor="ctr"/>
             <a:lstStyle/>
             <a:p>
               <a:pPr algn="ctr"/>
-              <a:endParaRPr lang="en-US" sz="1350" dirty="0"/>
+              <a:endParaRPr lang="en-US" sz="1350"/>
             </a:p>
           </p:txBody>
         </p:sp>
@@ -8660,7 +8660,7 @@
           <p:spPr>
             <a:xfrm>
               <a:off x="499022" y="5304952"/>
-              <a:ext cx="1895857" cy="300082"/>
+              <a:ext cx="1800301" cy="300082"/>
             </a:xfrm>
             <a:prstGeom prst="rect">
               <a:avLst/>
@@ -8668,16 +8668,16 @@
             <a:noFill/>
           </p:spPr>
           <p:txBody>
-            <a:bodyPr wrap="square" rtlCol="0">
+            <a:bodyPr wrap="none" rtlCol="0">
               <a:spAutoFit/>
             </a:bodyPr>
             <a:lstStyle/>
             <a:p>
               <a:r>
-                <a:rPr lang="de-DE" sz="1350" dirty="0"/>
+                <a:rPr lang="de-DE" sz="1350"/>
                 <a:t>VNF/PNF/CNF Provider</a:t>
               </a:r>
-              <a:endParaRPr lang="en-US" sz="1350" dirty="0"/>
+              <a:endParaRPr lang="en-US" sz="1350"/>
             </a:p>
           </p:txBody>
         </p:sp>
@@ -8706,14 +8706,14 @@
             </a:solidFill>
           </p:spPr>
           <p:txBody>
-            <a:bodyPr wrap="square" rtlCol="0">
+            <a:bodyPr wrap="none" rtlCol="0">
               <a:spAutoFit/>
             </a:bodyPr>
             <a:lstStyle/>
             <a:p>
               <a:pPr algn="ctr"/>
               <a:r>
-                <a:rPr lang="de-DE" sz="900" dirty="0">
+                <a:rPr lang="de-DE" sz="900">
                   <a:solidFill>
                     <a:schemeClr val="bg1"/>
                   </a:solidFill>
@@ -8721,14 +8721,14 @@
                 <a:t>xNF</a:t>
               </a:r>
               <a:br>
-                <a:rPr lang="de-DE" sz="900" dirty="0">
+                <a:rPr lang="de-DE" sz="900">
                   <a:solidFill>
                     <a:schemeClr val="bg1"/>
                   </a:solidFill>
                 </a:rPr>
               </a:br>
               <a:r>
-                <a:rPr lang="de-DE" sz="900" dirty="0" err="1">
+                <a:rPr lang="de-DE" sz="900" err="1">
                   <a:solidFill>
                     <a:schemeClr val="bg1"/>
                   </a:solidFill>
@@ -8736,7 +8736,7 @@
                 <a:t>Descriptor</a:t>
               </a:r>
               <a:r>
-                <a:rPr lang="de-DE" sz="900" dirty="0">
+                <a:rPr lang="de-DE" sz="900">
                   <a:solidFill>
                     <a:schemeClr val="bg1"/>
                   </a:solidFill>
@@ -8744,14 +8744,14 @@
                 <a:t>,</a:t>
               </a:r>
               <a:br>
-                <a:rPr lang="de-DE" sz="900" dirty="0">
+                <a:rPr lang="de-DE" sz="900">
                   <a:solidFill>
                     <a:schemeClr val="bg1"/>
                   </a:solidFill>
                 </a:rPr>
               </a:br>
               <a:r>
-                <a:rPr lang="de-DE" sz="900" dirty="0" err="1">
+                <a:rPr lang="de-DE" sz="900" err="1">
                   <a:solidFill>
                     <a:schemeClr val="bg1"/>
                   </a:solidFill>
@@ -8759,7 +8759,7 @@
                 <a:t>Artifacts</a:t>
               </a:r>
               <a:r>
-                <a:rPr lang="de-DE" sz="900" dirty="0">
+                <a:rPr lang="de-DE" sz="900">
                   <a:solidFill>
                     <a:schemeClr val="bg1"/>
                   </a:solidFill>
@@ -8770,14 +8770,14 @@
             <a:p>
               <a:pPr algn="ctr"/>
               <a:r>
-                <a:rPr lang="de-DE" sz="900" dirty="0">
+                <a:rPr lang="de-DE" sz="900">
                   <a:solidFill>
                     <a:schemeClr val="bg1"/>
                   </a:solidFill>
                 </a:rPr>
                 <a:t>Model</a:t>
               </a:r>
-              <a:endParaRPr lang="en-US" sz="900" dirty="0">
+              <a:endParaRPr lang="en-US" sz="900">
                 <a:solidFill>
                   <a:schemeClr val="bg1"/>
                 </a:solidFill>
@@ -8829,12 +8829,12 @@
             </a:fontRef>
           </p:style>
           <p:txBody>
-            <a:bodyPr rtlCol="0" anchor="t"/>
+            <a:bodyPr wrap="none" rtlCol="0" anchor="t"/>
             <a:lstStyle/>
             <a:p>
               <a:pPr algn="ctr"/>
               <a:r>
-                <a:rPr lang="de-DE" sz="1350" dirty="0" err="1">
+                <a:rPr lang="de-DE" sz="1350" err="1">
                   <a:solidFill>
                     <a:schemeClr val="bg1"/>
                   </a:solidFill>
@@ -8842,14 +8842,14 @@
                 <a:t>Pre</a:t>
               </a:r>
               <a:r>
-                <a:rPr lang="de-DE" sz="1350" dirty="0">
+                <a:rPr lang="de-DE" sz="1350">
                   <a:solidFill>
                     <a:schemeClr val="bg1"/>
                   </a:solidFill>
                 </a:rPr>
                 <a:t>-Onboarding</a:t>
               </a:r>
-              <a:endParaRPr lang="en-US" sz="1350" dirty="0">
+              <a:endParaRPr lang="en-US" sz="1350">
                 <a:solidFill>
                   <a:schemeClr val="bg1"/>
                 </a:solidFill>
@@ -8880,14 +8880,14 @@
             <a:noFill/>
           </p:spPr>
           <p:txBody>
-            <a:bodyPr wrap="square" rtlCol="0">
+            <a:bodyPr wrap="none" rtlCol="0">
               <a:spAutoFit/>
             </a:bodyPr>
             <a:lstStyle/>
             <a:p>
               <a:pPr algn="ctr"/>
               <a:r>
-                <a:rPr lang="de-DE" sz="900" dirty="0">
+                <a:rPr lang="de-DE" sz="900">
                   <a:solidFill>
                     <a:schemeClr val="bg1"/>
                   </a:solidFill>
@@ -8895,21 +8895,21 @@
                 <a:t>Validation</a:t>
               </a:r>
               <a:br>
-                <a:rPr lang="de-DE" sz="900" dirty="0">
+                <a:rPr lang="de-DE" sz="900">
                   <a:solidFill>
                     <a:schemeClr val="bg1"/>
                   </a:solidFill>
                 </a:rPr>
               </a:br>
               <a:r>
-                <a:rPr lang="de-DE" sz="900" dirty="0">
+                <a:rPr lang="de-DE" sz="900">
                   <a:solidFill>
                     <a:schemeClr val="bg1"/>
                   </a:solidFill>
                 </a:rPr>
                 <a:t>(VNF-SDK)</a:t>
               </a:r>
-              <a:endParaRPr lang="en-US" sz="900" dirty="0">
+              <a:endParaRPr lang="en-US" sz="900">
                 <a:solidFill>
                   <a:schemeClr val="bg1"/>
                 </a:solidFill>
@@ -8931,7 +8931,7 @@
           </p:nvSpPr>
           <p:spPr>
             <a:xfrm>
-              <a:off x="1156415" y="3223513"/>
+              <a:off x="1405794" y="3223513"/>
               <a:ext cx="669093" cy="230832"/>
             </a:xfrm>
             <a:prstGeom prst="rect">
@@ -8940,21 +8940,21 @@
             <a:noFill/>
           </p:spPr>
           <p:txBody>
-            <a:bodyPr wrap="square" rtlCol="0">
+            <a:bodyPr wrap="none" rtlCol="0">
               <a:spAutoFit/>
             </a:bodyPr>
             <a:lstStyle/>
             <a:p>
               <a:pPr algn="ctr"/>
               <a:r>
-                <a:rPr lang="de-DE" sz="900" dirty="0" err="1">
+                <a:rPr lang="de-DE" sz="900" err="1">
                   <a:solidFill>
                     <a:schemeClr val="bg1"/>
                   </a:solidFill>
                 </a:rPr>
                 <a:t>Packaging</a:t>
               </a:r>
-              <a:endParaRPr lang="en-US" sz="900" dirty="0">
+              <a:endParaRPr lang="en-US" sz="900">
                 <a:solidFill>
                   <a:schemeClr val="bg1"/>
                 </a:solidFill>
@@ -9006,19 +9006,19 @@
             </a:fontRef>
           </p:style>
           <p:txBody>
-            <a:bodyPr rtlCol="0" anchor="t"/>
+            <a:bodyPr wrap="none" rtlCol="0" anchor="t"/>
             <a:lstStyle/>
             <a:p>
               <a:pPr algn="ctr"/>
               <a:r>
-                <a:rPr lang="de-DE" sz="1350" dirty="0">
+                <a:rPr lang="de-DE" sz="1350">
                   <a:solidFill>
                     <a:schemeClr val="bg1"/>
                   </a:solidFill>
                 </a:rPr>
                 <a:t>Onboarding</a:t>
               </a:r>
-              <a:endParaRPr lang="en-US" sz="1350" dirty="0">
+              <a:endParaRPr lang="en-US" sz="1350">
                 <a:solidFill>
                   <a:schemeClr val="bg1"/>
                 </a:solidFill>
@@ -9070,12 +9070,12 @@
             </a:fontRef>
           </p:style>
           <p:txBody>
-            <a:bodyPr rtlCol="0" anchor="t"/>
+            <a:bodyPr wrap="none" rtlCol="0" anchor="t"/>
             <a:lstStyle/>
             <a:p>
               <a:pPr algn="ctr"/>
               <a:r>
-                <a:rPr lang="de-DE" sz="1350" dirty="0">
+                <a:rPr lang="de-DE" sz="1350">
                   <a:solidFill>
                     <a:schemeClr val="bg1"/>
                   </a:solidFill>
@@ -9083,14 +9083,14 @@
                 <a:t>VF </a:t>
               </a:r>
               <a:r>
-                <a:rPr lang="de-DE" sz="1350" dirty="0" err="1">
+                <a:rPr lang="de-DE" sz="1350" err="1">
                   <a:solidFill>
                     <a:schemeClr val="bg1"/>
                   </a:solidFill>
                 </a:rPr>
                 <a:t>Creation</a:t>
               </a:r>
-              <a:endParaRPr lang="en-US" sz="1350" dirty="0">
+              <a:endParaRPr lang="en-US" sz="1350">
                 <a:solidFill>
                   <a:schemeClr val="bg1"/>
                 </a:solidFill>
@@ -9142,19 +9142,19 @@
             </a:fontRef>
           </p:style>
           <p:txBody>
-            <a:bodyPr rtlCol="0" anchor="t"/>
+            <a:bodyPr wrap="none" rtlCol="0" anchor="t"/>
             <a:lstStyle/>
             <a:p>
               <a:pPr algn="ctr"/>
               <a:r>
-                <a:rPr lang="de-DE" sz="1350" dirty="0">
+                <a:rPr lang="de-DE" sz="1350">
                   <a:solidFill>
                     <a:schemeClr val="bg1"/>
                   </a:solidFill>
                 </a:rPr>
                 <a:t>Service Design</a:t>
               </a:r>
-              <a:endParaRPr lang="en-US" sz="1350" dirty="0">
+              <a:endParaRPr lang="en-US" sz="1350">
                 <a:solidFill>
                   <a:schemeClr val="bg1"/>
                 </a:solidFill>
@@ -9206,19 +9206,34 @@
             </a:fontRef>
           </p:style>
           <p:txBody>
-            <a:bodyPr rtlCol="0" anchor="t"/>
+            <a:bodyPr wrap="none" rtlCol="0" anchor="t"/>
             <a:lstStyle/>
             <a:p>
               <a:pPr algn="ctr"/>
               <a:r>
-                <a:rPr lang="de-DE" sz="1350" dirty="0">
+                <a:rPr lang="de-DE" sz="1350">
                   <a:solidFill>
                     <a:schemeClr val="bg1"/>
                   </a:solidFill>
                 </a:rPr>
-                <a:t>Service Distribution</a:t>
+                <a:t>Service</a:t>
               </a:r>
-              <a:endParaRPr lang="en-US" sz="1350" dirty="0">
+              <a:br>
+                <a:rPr lang="de-DE" sz="1350">
+                  <a:solidFill>
+                    <a:schemeClr val="bg1"/>
+                  </a:solidFill>
+                </a:rPr>
+              </a:br>
+              <a:r>
+                <a:rPr lang="de-DE" sz="1350">
+                  <a:solidFill>
+                    <a:schemeClr val="bg1"/>
+                  </a:solidFill>
+                </a:rPr>
+                <a:t>Distribution</a:t>
+              </a:r>
+              <a:endParaRPr lang="en-US" sz="1350">
                 <a:solidFill>
                   <a:schemeClr val="bg1"/>
                 </a:solidFill>
@@ -9271,12 +9286,12 @@
             </a:fontRef>
           </p:style>
           <p:txBody>
-            <a:bodyPr rtlCol="0" anchor="t"/>
+            <a:bodyPr wrap="none" rtlCol="0" anchor="t"/>
             <a:lstStyle/>
             <a:p>
               <a:pPr algn="ctr"/>
               <a:r>
-                <a:rPr lang="de-DE" sz="1350" dirty="0">
+                <a:rPr lang="de-DE" sz="1350">
                   <a:solidFill>
                     <a:schemeClr val="bg1"/>
                   </a:solidFill>
@@ -9284,7 +9299,7 @@
                 <a:t>DCAE </a:t>
               </a:r>
               <a:r>
-                <a:rPr lang="de-DE" sz="1350" dirty="0" err="1">
+                <a:rPr lang="de-DE" sz="1350" err="1">
                   <a:solidFill>
                     <a:schemeClr val="bg1"/>
                   </a:solidFill>
@@ -9292,14 +9307,14 @@
                 <a:t>Onboard</a:t>
               </a:r>
               <a:r>
-                <a:rPr lang="de-DE" sz="1350" dirty="0">
+                <a:rPr lang="de-DE" sz="1350">
                   <a:solidFill>
                     <a:schemeClr val="bg1"/>
                   </a:solidFill>
                 </a:rPr>
                 <a:t>/Design</a:t>
               </a:r>
-              <a:endParaRPr lang="en-US" sz="1350" dirty="0">
+              <a:endParaRPr lang="en-US" sz="1350">
                 <a:solidFill>
                   <a:schemeClr val="bg1"/>
                 </a:solidFill>
@@ -9352,43 +9367,34 @@
             </a:fontRef>
           </p:style>
           <p:txBody>
-            <a:bodyPr rtlCol="0" anchor="t"/>
+            <a:bodyPr wrap="none" rtlCol="0" anchor="t"/>
             <a:lstStyle/>
             <a:p>
               <a:pPr algn="ctr"/>
               <a:r>
-                <a:rPr lang="de-DE" sz="1350" dirty="0">
+                <a:rPr lang="de-DE" sz="1350">
                   <a:solidFill>
                     <a:schemeClr val="bg1"/>
                   </a:solidFill>
                 </a:rPr>
-                <a:t>VNF Parameter </a:t>
+                <a:t>VNF Parameter Assignment</a:t>
               </a:r>
-              <a:r>
-                <a:rPr lang="de-DE" sz="1350" dirty="0" err="1">
+              <a:br>
+                <a:rPr lang="de-DE" sz="1350">
                   <a:solidFill>
                     <a:schemeClr val="bg1"/>
                   </a:solidFill>
                 </a:rPr>
-                <a:t>Assignment</a:t>
-              </a:r>
+              </a:br>
               <a:r>
-                <a:rPr lang="de-DE" sz="1350" dirty="0">
-                  <a:solidFill>
-                    <a:schemeClr val="bg1"/>
-                  </a:solidFill>
-                </a:rPr>
-                <a:t> </a:t>
-              </a:r>
-              <a:r>
-                <a:rPr lang="de-DE" sz="1350" dirty="0" err="1">
+                <a:rPr lang="de-DE" sz="1350">
                   <a:solidFill>
                     <a:schemeClr val="bg1"/>
                   </a:solidFill>
                 </a:rPr>
                 <a:t>Templating</a:t>
               </a:r>
-              <a:endParaRPr lang="en-US" sz="1350" dirty="0">
+              <a:endParaRPr lang="en-US" sz="1350">
                 <a:solidFill>
                   <a:schemeClr val="bg1"/>
                 </a:solidFill>
@@ -9441,19 +9447,34 @@
             </a:fontRef>
           </p:style>
           <p:txBody>
-            <a:bodyPr rtlCol="0" anchor="t"/>
+            <a:bodyPr wrap="none" rtlCol="0" anchor="t"/>
             <a:lstStyle/>
             <a:p>
               <a:pPr algn="ctr"/>
               <a:r>
-                <a:rPr lang="de-DE" sz="1350" dirty="0">
+                <a:rPr lang="de-DE" sz="1350">
                   <a:solidFill>
                     <a:schemeClr val="bg1"/>
                   </a:solidFill>
                 </a:rPr>
-                <a:t>Workflow Design</a:t>
+                <a:t>Workflow</a:t>
               </a:r>
-              <a:endParaRPr lang="en-US" sz="1350" dirty="0">
+              <a:br>
+                <a:rPr lang="de-DE" sz="1350">
+                  <a:solidFill>
+                    <a:schemeClr val="bg1"/>
+                  </a:solidFill>
+                </a:rPr>
+              </a:br>
+              <a:r>
+                <a:rPr lang="de-DE" sz="1350">
+                  <a:solidFill>
+                    <a:schemeClr val="bg1"/>
+                  </a:solidFill>
+                </a:rPr>
+                <a:t>Design</a:t>
+              </a:r>
+              <a:endParaRPr lang="en-US" sz="1350">
                 <a:solidFill>
                   <a:schemeClr val="bg1"/>
                 </a:solidFill>
@@ -9484,21 +9505,21 @@
             <a:noFill/>
           </p:spPr>
           <p:txBody>
-            <a:bodyPr wrap="square" rtlCol="0">
+            <a:bodyPr wrap="none" rtlCol="0">
               <a:spAutoFit/>
             </a:bodyPr>
             <a:lstStyle/>
             <a:p>
               <a:pPr algn="ctr"/>
               <a:r>
-                <a:rPr lang="de-DE" sz="900" dirty="0">
+                <a:rPr lang="de-DE" sz="900">
                   <a:solidFill>
                     <a:schemeClr val="bg1"/>
                   </a:solidFill>
                 </a:rPr>
                 <a:t>License</a:t>
               </a:r>
-              <a:endParaRPr lang="en-US" sz="900" dirty="0">
+              <a:endParaRPr lang="en-US" sz="900">
                 <a:solidFill>
                   <a:schemeClr val="bg1"/>
                 </a:solidFill>
@@ -9529,14 +9550,14 @@
             <a:noFill/>
           </p:spPr>
           <p:txBody>
-            <a:bodyPr wrap="square" rtlCol="0">
+            <a:bodyPr wrap="none" rtlCol="0">
               <a:spAutoFit/>
             </a:bodyPr>
             <a:lstStyle/>
             <a:p>
               <a:pPr algn="ctr"/>
               <a:r>
-                <a:rPr lang="de-DE" sz="900" dirty="0">
+                <a:rPr lang="de-DE" sz="900">
                   <a:solidFill>
                     <a:schemeClr val="bg1"/>
                   </a:solidFill>
@@ -9547,14 +9568,14 @@
             <a:p>
               <a:pPr algn="ctr"/>
               <a:r>
-                <a:rPr lang="de-DE" sz="900" dirty="0" err="1">
+                <a:rPr lang="de-DE" sz="900" err="1">
                   <a:solidFill>
                     <a:schemeClr val="bg1"/>
                   </a:solidFill>
                 </a:rPr>
                 <a:t>Product</a:t>
               </a:r>
-              <a:endParaRPr lang="en-US" sz="900" dirty="0">
+              <a:endParaRPr lang="en-US" sz="900">
                 <a:solidFill>
                   <a:schemeClr val="bg1"/>
                 </a:solidFill>
@@ -9576,8 +9597,8 @@
           </p:nvSpPr>
           <p:spPr>
             <a:xfrm>
-              <a:off x="3300573" y="1539137"/>
-              <a:ext cx="843073" cy="230832"/>
+              <a:off x="3284919" y="1539137"/>
+              <a:ext cx="766431" cy="230832"/>
             </a:xfrm>
             <a:prstGeom prst="rect">
               <a:avLst/>
@@ -9585,14 +9606,14 @@
             <a:noFill/>
           </p:spPr>
           <p:txBody>
-            <a:bodyPr wrap="square" rtlCol="0">
+            <a:bodyPr wrap="none" rtlCol="0">
               <a:spAutoFit/>
             </a:bodyPr>
             <a:lstStyle/>
             <a:p>
               <a:pPr algn="ctr"/>
               <a:r>
-                <a:rPr lang="de-DE" sz="900" dirty="0">
+                <a:rPr lang="de-DE" sz="900">
                   <a:solidFill>
                     <a:schemeClr val="bg1"/>
                   </a:solidFill>
@@ -9600,14 +9621,14 @@
                 <a:t>CDS </a:t>
               </a:r>
               <a:r>
-                <a:rPr lang="de-DE" sz="900" dirty="0" err="1">
+                <a:rPr lang="de-DE" sz="900" err="1">
                   <a:solidFill>
                     <a:schemeClr val="bg1"/>
                   </a:solidFill>
                 </a:rPr>
                 <a:t>Blueprint</a:t>
               </a:r>
-              <a:endParaRPr lang="en-US" sz="900" dirty="0">
+              <a:endParaRPr lang="en-US" sz="900">
                 <a:solidFill>
                   <a:schemeClr val="bg1"/>
                 </a:solidFill>
@@ -9629,7 +9650,7 @@
           </p:nvSpPr>
           <p:spPr>
             <a:xfrm>
-              <a:off x="2630740" y="1536546"/>
+              <a:off x="2630740" y="1539137"/>
               <a:ext cx="653813" cy="230832"/>
             </a:xfrm>
             <a:prstGeom prst="rect">
@@ -9638,21 +9659,21 @@
             <a:noFill/>
           </p:spPr>
           <p:txBody>
-            <a:bodyPr wrap="square" rtlCol="0">
+            <a:bodyPr wrap="none" rtlCol="0">
               <a:spAutoFit/>
             </a:bodyPr>
             <a:lstStyle/>
             <a:p>
               <a:pPr algn="ctr"/>
               <a:r>
-                <a:rPr lang="de-DE" sz="900" dirty="0" err="1">
+                <a:rPr lang="de-DE" sz="900" err="1">
                   <a:solidFill>
                     <a:schemeClr val="bg1"/>
                   </a:solidFill>
                 </a:rPr>
                 <a:t>Packaging</a:t>
               </a:r>
-              <a:endParaRPr lang="en-US" sz="900" dirty="0">
+              <a:endParaRPr lang="en-US" sz="900">
                 <a:solidFill>
                   <a:schemeClr val="bg1"/>
                 </a:solidFill>
@@ -9674,8 +9695,8 @@
           </p:nvSpPr>
           <p:spPr>
             <a:xfrm>
-              <a:off x="3949785" y="1536547"/>
-              <a:ext cx="990792" cy="230832"/>
+              <a:off x="4023821" y="1539137"/>
+              <a:ext cx="909223" cy="230832"/>
             </a:xfrm>
             <a:prstGeom prst="rect">
               <a:avLst/>
@@ -9683,21 +9704,21 @@
             <a:noFill/>
           </p:spPr>
           <p:txBody>
-            <a:bodyPr wrap="square" rtlCol="0">
+            <a:bodyPr wrap="none" rtlCol="0">
               <a:spAutoFit/>
             </a:bodyPr>
             <a:lstStyle/>
             <a:p>
               <a:pPr algn="ctr"/>
               <a:r>
-                <a:rPr lang="de-DE" sz="900" dirty="0">
+                <a:rPr lang="de-DE" sz="900">
                   <a:solidFill>
                     <a:schemeClr val="bg1"/>
                   </a:solidFill>
                 </a:rPr>
                 <a:t>Data Dictionary</a:t>
               </a:r>
-              <a:endParaRPr lang="en-US" sz="900" dirty="0">
+              <a:endParaRPr lang="en-US" sz="900">
                 <a:solidFill>
                   <a:schemeClr val="bg1"/>
                 </a:solidFill>
@@ -9719,8 +9740,8 @@
           </p:nvSpPr>
           <p:spPr>
             <a:xfrm>
-              <a:off x="2703232" y="2623604"/>
-              <a:ext cx="1056373" cy="230832"/>
+              <a:off x="2729518" y="2623604"/>
+              <a:ext cx="1003800" cy="230832"/>
             </a:xfrm>
             <a:prstGeom prst="rect">
               <a:avLst/>
@@ -9728,21 +9749,21 @@
             <a:noFill/>
           </p:spPr>
           <p:txBody>
-            <a:bodyPr wrap="square" rtlCol="0">
+            <a:bodyPr wrap="none" rtlCol="0">
               <a:spAutoFit/>
             </a:bodyPr>
             <a:lstStyle/>
             <a:p>
               <a:pPr algn="ctr"/>
               <a:r>
-                <a:rPr lang="de-DE" sz="900" dirty="0">
+                <a:rPr lang="de-DE" sz="900">
                   <a:solidFill>
                     <a:schemeClr val="bg1"/>
                   </a:solidFill>
                 </a:rPr>
                 <a:t>VF/VNF/PNF/CNF</a:t>
               </a:r>
-              <a:endParaRPr lang="en-US" sz="900" dirty="0">
+              <a:endParaRPr lang="en-US" sz="900">
                 <a:solidFill>
                   <a:schemeClr val="bg1"/>
                 </a:solidFill>
@@ -9764,8 +9785,8 @@
           </p:nvSpPr>
           <p:spPr>
             <a:xfrm>
-              <a:off x="7156623" y="4136246"/>
-              <a:ext cx="1501292" cy="230832"/>
+              <a:off x="7223428" y="4136246"/>
+              <a:ext cx="1367682" cy="230832"/>
             </a:xfrm>
             <a:prstGeom prst="rect">
               <a:avLst/>
@@ -9773,21 +9794,21 @@
             <a:noFill/>
           </p:spPr>
           <p:txBody>
-            <a:bodyPr wrap="square" rtlCol="0">
+            <a:bodyPr wrap="none" rtlCol="0">
               <a:spAutoFit/>
             </a:bodyPr>
             <a:lstStyle/>
             <a:p>
               <a:pPr algn="ctr"/>
               <a:r>
-                <a:rPr lang="de-DE" sz="900" dirty="0">
+                <a:rPr lang="de-DE" sz="900">
                   <a:solidFill>
                     <a:schemeClr val="bg1"/>
                   </a:solidFill>
                 </a:rPr>
                 <a:t>Service Assurance Design</a:t>
               </a:r>
-              <a:endParaRPr lang="en-US" sz="900" dirty="0">
+              <a:endParaRPr lang="en-US" sz="900">
                 <a:solidFill>
                   <a:schemeClr val="bg1"/>
                 </a:solidFill>
@@ -9809,8 +9830,8 @@
           </p:nvSpPr>
           <p:spPr>
             <a:xfrm>
-              <a:off x="5574791" y="4214336"/>
-              <a:ext cx="876237" cy="230832"/>
+              <a:off x="5607189" y="4214336"/>
+              <a:ext cx="811441" cy="230832"/>
             </a:xfrm>
             <a:prstGeom prst="rect">
               <a:avLst/>
@@ -9818,21 +9839,21 @@
             <a:noFill/>
           </p:spPr>
           <p:txBody>
-            <a:bodyPr wrap="square" rtlCol="0">
+            <a:bodyPr wrap="none" rtlCol="0">
               <a:spAutoFit/>
             </a:bodyPr>
             <a:lstStyle/>
             <a:p>
               <a:pPr algn="ctr"/>
               <a:r>
-                <a:rPr lang="de-DE" sz="900" dirty="0">
+                <a:rPr lang="de-DE" sz="900">
                   <a:solidFill>
                     <a:schemeClr val="bg1"/>
                   </a:solidFill>
                 </a:rPr>
                 <a:t>SO-Workflow</a:t>
               </a:r>
-              <a:endParaRPr lang="en-US" sz="900" dirty="0">
+              <a:endParaRPr lang="en-US" sz="900">
                 <a:solidFill>
                   <a:schemeClr val="bg1"/>
                 </a:solidFill>
@@ -9854,7 +9875,7 @@
           </p:nvSpPr>
           <p:spPr>
             <a:xfrm>
-              <a:off x="2804942" y="5296054"/>
+              <a:off x="2804942" y="5304952"/>
               <a:ext cx="815707" cy="300082"/>
             </a:xfrm>
             <a:prstGeom prst="rect">
@@ -9863,16 +9884,16 @@
             <a:noFill/>
           </p:spPr>
           <p:txBody>
-            <a:bodyPr wrap="square" rtlCol="0">
+            <a:bodyPr wrap="none" rtlCol="0">
               <a:spAutoFit/>
             </a:bodyPr>
             <a:lstStyle/>
             <a:p>
               <a:r>
-                <a:rPr lang="de-DE" sz="1350" dirty="0"/>
+                <a:rPr lang="de-DE" sz="1350"/>
                 <a:t>Designer</a:t>
               </a:r>
-              <a:endParaRPr lang="en-US" sz="1350" dirty="0"/>
+              <a:endParaRPr lang="en-US" sz="1350"/>
             </a:p>
           </p:txBody>
         </p:sp>
@@ -9914,7 +9935,7 @@
             </a:fontRef>
           </p:style>
           <p:txBody>
-            <a:bodyPr rtlCol="0" anchor="ctr"/>
+            <a:bodyPr wrap="none" rtlCol="0" anchor="ctr"/>
             <a:lstStyle/>
             <a:p>
               <a:pPr algn="ctr"/>
@@ -9960,7 +9981,7 @@
             </a:fontRef>
           </p:style>
           <p:txBody>
-            <a:bodyPr rtlCol="0" anchor="ctr"/>
+            <a:bodyPr wrap="none" rtlCol="0" anchor="ctr"/>
             <a:lstStyle/>
             <a:p>
               <a:pPr algn="ctr"/>
@@ -10006,7 +10027,7 @@
             </a:fontRef>
           </p:style>
           <p:txBody>
-            <a:bodyPr rtlCol="0" anchor="ctr"/>
+            <a:bodyPr wrap="none" rtlCol="0" anchor="ctr"/>
             <a:lstStyle/>
             <a:p>
               <a:pPr algn="ctr"/>
@@ -10052,7 +10073,7 @@
             </a:fontRef>
           </p:style>
           <p:txBody>
-            <a:bodyPr rtlCol="0" anchor="ctr"/>
+            <a:bodyPr wrap="none" rtlCol="0" anchor="ctr"/>
             <a:lstStyle/>
             <a:p>
               <a:pPr algn="ctr"/>
@@ -10106,7 +10127,7 @@
             </a:fontRef>
           </p:style>
           <p:txBody>
-            <a:bodyPr rtlCol="0" anchor="ctr"/>
+            <a:bodyPr wrap="none" rtlCol="0" anchor="ctr"/>
             <a:lstStyle/>
             <a:p>
               <a:pPr algn="ctr"/>
@@ -10160,7 +10181,7 @@
             </a:fontRef>
           </p:style>
           <p:txBody>
-            <a:bodyPr rot="0" spcFirstLastPara="0" vertOverflow="overflow" horzOverflow="overflow" vert="horz" wrap="square" lIns="68580" tIns="34290" rIns="68580" bIns="34290" numCol="1" spcCol="0" rtlCol="0" fromWordArt="0" anchor="ctr" anchorCtr="0" forceAA="0" compatLnSpc="1">
+            <a:bodyPr rot="0" spcFirstLastPara="0" vertOverflow="overflow" horzOverflow="overflow" vert="horz" wrap="none" lIns="68580" tIns="34290" rIns="68580" bIns="34290" numCol="1" spcCol="0" rtlCol="0" fromWordArt="0" anchor="ctr" anchorCtr="0" forceAA="0" compatLnSpc="1">
               <a:prstTxWarp prst="textNoShape">
                 <a:avLst/>
               </a:prstTxWarp>
@@ -10211,7 +10232,7 @@
             </a:fontRef>
           </p:style>
           <p:txBody>
-            <a:bodyPr rtlCol="0" anchor="ctr"/>
+            <a:bodyPr wrap="none" rtlCol="0" anchor="ctr"/>
             <a:lstStyle/>
             <a:p>
               <a:pPr algn="ctr"/>
@@ -10257,7 +10278,7 @@
             </a:fontRef>
           </p:style>
           <p:txBody>
-            <a:bodyPr rtlCol="0" anchor="ctr"/>
+            <a:bodyPr wrap="none" rtlCol="0" anchor="ctr"/>
             <a:lstStyle/>
             <a:p>
               <a:pPr algn="ctr"/>
@@ -10279,7 +10300,7 @@
           </p:nvSpPr>
           <p:spPr>
             <a:xfrm>
-              <a:off x="4713203" y="4486204"/>
+              <a:off x="4652241" y="4486204"/>
               <a:ext cx="122333" cy="381697"/>
             </a:xfrm>
             <a:prstGeom prst="downArrow">
@@ -10303,7 +10324,7 @@
             </a:fontRef>
           </p:style>
           <p:txBody>
-            <a:bodyPr rtlCol="0" anchor="ctr"/>
+            <a:bodyPr wrap="none" rtlCol="0" anchor="ctr"/>
             <a:lstStyle/>
             <a:p>
               <a:pPr algn="ctr"/>
@@ -10325,8 +10346,8 @@
           </p:nvSpPr>
           <p:spPr>
             <a:xfrm>
-              <a:off x="4975585" y="2864674"/>
-              <a:ext cx="525317" cy="230832"/>
+              <a:off x="4988015" y="2864674"/>
+              <a:ext cx="500457" cy="230832"/>
             </a:xfrm>
             <a:prstGeom prst="rect">
               <a:avLst/>
@@ -10334,21 +10355,21 @@
             <a:noFill/>
           </p:spPr>
           <p:txBody>
-            <a:bodyPr wrap="square" rtlCol="0">
+            <a:bodyPr wrap="none" rtlCol="0">
               <a:spAutoFit/>
             </a:bodyPr>
             <a:lstStyle/>
             <a:p>
               <a:pPr algn="ctr"/>
               <a:r>
-                <a:rPr lang="de-DE" sz="900" dirty="0">
+                <a:rPr lang="de-DE" sz="900">
                   <a:solidFill>
                     <a:schemeClr val="bg1"/>
                   </a:solidFill>
                 </a:rPr>
                 <a:t>Design</a:t>
               </a:r>
-              <a:endParaRPr lang="en-US" sz="900" dirty="0">
+              <a:endParaRPr lang="en-US" sz="900">
                 <a:solidFill>
                   <a:schemeClr val="bg1"/>
                 </a:solidFill>
@@ -10370,7 +10391,7 @@
           </p:nvSpPr>
           <p:spPr>
             <a:xfrm>
-              <a:off x="4441395" y="4230993"/>
+              <a:off x="4391517" y="4230993"/>
               <a:ext cx="653195" cy="230832"/>
             </a:xfrm>
             <a:prstGeom prst="rect">
@@ -10379,21 +10400,21 @@
             <a:noFill/>
           </p:spPr>
           <p:txBody>
-            <a:bodyPr wrap="square" rtlCol="0">
+            <a:bodyPr wrap="none" rtlCol="0">
               <a:spAutoFit/>
             </a:bodyPr>
             <a:lstStyle/>
             <a:p>
               <a:pPr algn="ctr"/>
               <a:r>
-                <a:rPr lang="de-DE" sz="900" dirty="0" err="1">
+                <a:rPr lang="de-DE" sz="900" err="1">
                   <a:solidFill>
                     <a:schemeClr val="bg1"/>
                   </a:solidFill>
                 </a:rPr>
                 <a:t>Distribute</a:t>
               </a:r>
-              <a:endParaRPr lang="en-US" sz="900" dirty="0">
+              <a:endParaRPr lang="en-US" sz="900">
                 <a:solidFill>
                   <a:schemeClr val="bg1"/>
                 </a:solidFill>
@@ -10415,8 +10436,8 @@
           </p:nvSpPr>
           <p:spPr>
             <a:xfrm>
-              <a:off x="4285074" y="5270327"/>
-              <a:ext cx="911645" cy="369332"/>
+              <a:off x="4259835" y="5270327"/>
+              <a:ext cx="962123" cy="230832"/>
             </a:xfrm>
             <a:prstGeom prst="rect">
               <a:avLst/>
@@ -10424,21 +10445,21 @@
             <a:noFill/>
           </p:spPr>
           <p:txBody>
-            <a:bodyPr wrap="square" rtlCol="0">
+            <a:bodyPr wrap="none" rtlCol="0">
               <a:spAutoFit/>
             </a:bodyPr>
             <a:lstStyle/>
             <a:p>
               <a:pPr algn="ctr"/>
               <a:r>
-                <a:rPr lang="de-DE" sz="900" dirty="0" err="1"/>
+                <a:rPr lang="de-DE" sz="900" err="1"/>
                 <a:t>Runtime</a:t>
               </a:r>
               <a:r>
-                <a:rPr lang="de-DE" sz="900" dirty="0"/>
+                <a:rPr lang="de-DE" sz="900"/>
                 <a:t> Catalog</a:t>
               </a:r>
-              <a:endParaRPr lang="en-US" sz="900" dirty="0"/>
+              <a:endParaRPr lang="en-US" sz="900"/>
             </a:p>
           </p:txBody>
         </p:sp>
@@ -10487,19 +10508,19 @@
             </a:fontRef>
           </p:style>
           <p:txBody>
-            <a:bodyPr rtlCol="0" anchor="t"/>
+            <a:bodyPr wrap="none" rtlCol="0" anchor="t"/>
             <a:lstStyle/>
             <a:p>
               <a:pPr algn="ctr"/>
               <a:r>
-                <a:rPr lang="de-DE" sz="1350" dirty="0">
+                <a:rPr lang="de-DE" sz="1350">
                   <a:solidFill>
                     <a:schemeClr val="bg1"/>
                   </a:solidFill>
                 </a:rPr>
                 <a:t>Policy Design</a:t>
               </a:r>
-              <a:endParaRPr lang="en-US" sz="1350" dirty="0">
+              <a:endParaRPr lang="en-US" sz="1350">
                 <a:solidFill>
                   <a:schemeClr val="bg1"/>
                 </a:solidFill>
@@ -10552,27 +10573,34 @@
             </a:fontRef>
           </p:style>
           <p:txBody>
-            <a:bodyPr rtlCol="0" anchor="t"/>
+            <a:bodyPr wrap="none" rtlCol="0" anchor="t"/>
             <a:lstStyle/>
             <a:p>
               <a:pPr algn="ctr"/>
               <a:r>
-                <a:rPr lang="de-DE" sz="1350" dirty="0">
+                <a:rPr lang="de-DE" sz="1350">
                   <a:solidFill>
                     <a:schemeClr val="bg1"/>
                   </a:solidFill>
                 </a:rPr>
-                <a:t>VNF LifeCycle Command </a:t>
+                <a:t>VNF LifeCycle Command</a:t>
               </a:r>
+              <a:br>
+                <a:rPr lang="de-DE" sz="1350">
+                  <a:solidFill>
+                    <a:schemeClr val="bg1"/>
+                  </a:solidFill>
+                </a:rPr>
+              </a:br>
               <a:r>
-                <a:rPr lang="de-DE" sz="1350" dirty="0" err="1">
+                <a:rPr lang="de-DE" sz="1350">
                   <a:solidFill>
                     <a:schemeClr val="bg1"/>
                   </a:solidFill>
                 </a:rPr>
                 <a:t>Templating</a:t>
               </a:r>
-              <a:endParaRPr lang="en-US" sz="1350" dirty="0">
+              <a:endParaRPr lang="en-US" sz="1350">
                 <a:solidFill>
                   <a:schemeClr val="bg1"/>
                 </a:solidFill>
@@ -10698,7 +10726,7 @@
             </a:fontRef>
           </p:style>
           <p:txBody>
-            <a:bodyPr rtlCol="0" anchor="ctr"/>
+            <a:bodyPr wrap="none" rtlCol="0" anchor="ctr"/>
             <a:lstStyle/>
             <a:p>
               <a:pPr algn="ctr"/>
@@ -10752,7 +10780,7 @@
             </a:fontRef>
           </p:style>
           <p:txBody>
-            <a:bodyPr rtlCol="0" anchor="ctr"/>
+            <a:bodyPr wrap="none" rtlCol="0" anchor="ctr"/>
             <a:lstStyle/>
             <a:p>
               <a:pPr algn="ctr"/>
@@ -10806,7 +10834,7 @@
             </a:fontRef>
           </p:style>
           <p:txBody>
-            <a:bodyPr rtlCol="0" anchor="ctr"/>
+            <a:bodyPr wrap="none" rtlCol="0" anchor="ctr"/>
             <a:lstStyle/>
             <a:p>
               <a:pPr algn="ctr"/>
@@ -10864,8 +10892,8 @@
           </p:nvSpPr>
           <p:spPr>
             <a:xfrm>
-              <a:off x="5625119" y="1534094"/>
-              <a:ext cx="508244" cy="230832"/>
+              <a:off x="5649050" y="1534094"/>
+              <a:ext cx="460382" cy="230832"/>
             </a:xfrm>
             <a:prstGeom prst="rect">
               <a:avLst/>
@@ -10873,21 +10901,21 @@
             <a:noFill/>
           </p:spPr>
           <p:txBody>
-            <a:bodyPr wrap="square" rtlCol="0">
+            <a:bodyPr wrap="none" rtlCol="0">
               <a:spAutoFit/>
             </a:bodyPr>
             <a:lstStyle/>
             <a:p>
               <a:pPr algn="ctr"/>
               <a:r>
-                <a:rPr lang="de-DE" sz="900" dirty="0">
+                <a:rPr lang="de-DE" sz="900">
                   <a:solidFill>
                     <a:schemeClr val="bg1"/>
                   </a:solidFill>
                 </a:rPr>
                 <a:t>Policy</a:t>
               </a:r>
-              <a:endParaRPr lang="en-US" sz="900" dirty="0">
+              <a:endParaRPr lang="en-US" sz="900">
                 <a:solidFill>
                   <a:schemeClr val="bg1"/>
                 </a:solidFill>
@@ -10909,8 +10937,8 @@
           </p:nvSpPr>
           <p:spPr>
             <a:xfrm>
-              <a:off x="7550740" y="2108188"/>
-              <a:ext cx="666169" cy="230832"/>
+              <a:off x="7533749" y="2115915"/>
+              <a:ext cx="630301" cy="230832"/>
             </a:xfrm>
             <a:prstGeom prst="rect">
               <a:avLst/>
@@ -10918,21 +10946,21 @@
             <a:noFill/>
           </p:spPr>
           <p:txBody>
-            <a:bodyPr wrap="square" rtlCol="0">
+            <a:bodyPr wrap="none" rtlCol="0">
               <a:spAutoFit/>
             </a:bodyPr>
             <a:lstStyle/>
             <a:p>
               <a:pPr algn="ctr"/>
               <a:r>
-                <a:rPr lang="de-DE" sz="900" dirty="0">
+                <a:rPr lang="de-DE" sz="900">
                   <a:solidFill>
                     <a:schemeClr val="bg1"/>
                   </a:solidFill>
                 </a:rPr>
                 <a:t>Template</a:t>
               </a:r>
-              <a:endParaRPr lang="en-US" sz="900" dirty="0">
+              <a:endParaRPr lang="en-US" sz="900">
                 <a:solidFill>
                   <a:schemeClr val="bg1"/>
                 </a:solidFill>
@@ -10954,7 +10982,7 @@
           </p:nvSpPr>
           <p:spPr>
             <a:xfrm>
-              <a:off x="8088125" y="2103207"/>
+              <a:off x="8088125" y="2115915"/>
               <a:ext cx="888067" cy="230832"/>
             </a:xfrm>
             <a:prstGeom prst="rect">
@@ -10963,14 +10991,14 @@
             <a:noFill/>
           </p:spPr>
           <p:txBody>
-            <a:bodyPr wrap="square" rtlCol="0">
+            <a:bodyPr wrap="none" rtlCol="0">
               <a:spAutoFit/>
             </a:bodyPr>
             <a:lstStyle/>
             <a:p>
               <a:pPr algn="ctr"/>
               <a:r>
-                <a:rPr lang="de-DE" sz="900" dirty="0">
+                <a:rPr lang="de-DE" sz="900">
                   <a:solidFill>
                     <a:schemeClr val="bg1"/>
                   </a:solidFill>
@@ -10978,14 +11006,14 @@
                 <a:t>Parameter </a:t>
               </a:r>
               <a:r>
-                <a:rPr lang="de-DE" sz="900" dirty="0" err="1">
+                <a:rPr lang="de-DE" sz="900" err="1">
                   <a:solidFill>
                     <a:schemeClr val="bg1"/>
                   </a:solidFill>
                 </a:rPr>
                 <a:t>Def</a:t>
               </a:r>
-              <a:endParaRPr lang="en-US" sz="900" dirty="0">
+              <a:endParaRPr lang="en-US" sz="900">
                 <a:solidFill>
                   <a:schemeClr val="bg1"/>
                 </a:solidFill>
@@ -11007,8 +11035,8 @@
           </p:nvSpPr>
           <p:spPr>
             <a:xfrm>
-              <a:off x="6908072" y="2115915"/>
-              <a:ext cx="683363" cy="230832"/>
+              <a:off x="6924183" y="2115915"/>
+              <a:ext cx="651140" cy="230832"/>
             </a:xfrm>
             <a:prstGeom prst="rect">
               <a:avLst/>
@@ -11016,21 +11044,21 @@
             <a:noFill/>
           </p:spPr>
           <p:txBody>
-            <a:bodyPr wrap="square" rtlCol="0">
+            <a:bodyPr wrap="none" rtlCol="0">
               <a:spAutoFit/>
             </a:bodyPr>
             <a:lstStyle/>
             <a:p>
               <a:pPr algn="ctr"/>
               <a:r>
-                <a:rPr lang="de-DE" sz="900" dirty="0" err="1">
+                <a:rPr lang="de-DE" sz="900" err="1">
                   <a:solidFill>
                     <a:schemeClr val="bg1"/>
                   </a:solidFill>
                 </a:rPr>
                 <a:t>Packaging</a:t>
               </a:r>
-              <a:endParaRPr lang="en-US" sz="900" dirty="0">
+              <a:endParaRPr lang="en-US" sz="900">
                 <a:solidFill>
                   <a:schemeClr val="bg1"/>
                 </a:solidFill>
@@ -11102,8 +11130,8 @@
           </p:blipFill>
           <p:spPr>
             <a:xfrm>
-              <a:off x="3435434" y="1129912"/>
-              <a:ext cx="514350" cy="514350"/>
+              <a:off x="3448134" y="1177537"/>
+              <a:ext cx="453863" cy="453863"/>
             </a:xfrm>
             <a:prstGeom prst="rect">
               <a:avLst/>
@@ -11650,259 +11678,259 @@
             </a:prstGeom>
           </p:spPr>
         </p:pic>
-      </p:grpSp>
-      <p:sp>
-        <p:nvSpPr>
-          <p:cNvPr id="70" name="Textfeld 69">
-            <a:extLst>
-              <a:ext uri="{FF2B5EF4-FFF2-40B4-BE49-F238E27FC236}">
-                <a16:creationId xmlns:a16="http://schemas.microsoft.com/office/drawing/2014/main" id="{21055504-2CD2-4127-85D4-08FA359FF4DC}"/>
-              </a:ext>
-            </a:extLst>
-          </p:cNvPr>
-          <p:cNvSpPr txBox="1"/>
-          <p:nvPr/>
-        </p:nvSpPr>
-        <p:spPr>
-          <a:xfrm>
-            <a:off x="7107638" y="3419479"/>
-            <a:ext cx="1655622" cy="230832"/>
-          </a:xfrm>
-          <a:prstGeom prst="rect">
-            <a:avLst/>
-          </a:prstGeom>
-          <a:noFill/>
-        </p:spPr>
-        <p:txBody>
-          <a:bodyPr wrap="square" rtlCol="0">
-            <a:spAutoFit/>
-          </a:bodyPr>
-          <a:lstStyle/>
-          <a:p>
-            <a:pPr algn="ctr"/>
-            <a:r>
-              <a:rPr lang="de-DE" sz="900" dirty="0">
+        <p:sp>
+          <p:nvSpPr>
+            <p:cNvPr id="70" name="Textfeld 69">
+              <a:extLst>
+                <a:ext uri="{FF2B5EF4-FFF2-40B4-BE49-F238E27FC236}">
+                  <a16:creationId xmlns:a16="http://schemas.microsoft.com/office/drawing/2014/main" id="{21055504-2CD2-4127-85D4-08FA359FF4DC}"/>
+                </a:ext>
+              </a:extLst>
+            </p:cNvPr>
+            <p:cNvSpPr txBox="1"/>
+            <p:nvPr/>
+          </p:nvSpPr>
+          <p:spPr>
+            <a:xfrm>
+              <a:off x="7107638" y="3419479"/>
+              <a:ext cx="1655622" cy="230832"/>
+            </a:xfrm>
+            <a:prstGeom prst="rect">
+              <a:avLst/>
+            </a:prstGeom>
+            <a:noFill/>
+          </p:spPr>
+          <p:txBody>
+            <a:bodyPr wrap="none" rtlCol="0">
+              <a:spAutoFit/>
+            </a:bodyPr>
+            <a:lstStyle/>
+            <a:p>
+              <a:pPr algn="ctr"/>
+              <a:r>
+                <a:rPr lang="de-DE" sz="900">
+                  <a:solidFill>
+                    <a:schemeClr val="bg1"/>
+                  </a:solidFill>
+                </a:rPr>
+                <a:t>DCAE </a:t>
+              </a:r>
+              <a:r>
+                <a:rPr lang="de-DE" sz="900" err="1">
+                  <a:solidFill>
+                    <a:schemeClr val="bg1"/>
+                  </a:solidFill>
+                </a:rPr>
+                <a:t>mS</a:t>
+              </a:r>
+              <a:r>
+                <a:rPr lang="de-DE" sz="900">
+                  <a:solidFill>
+                    <a:schemeClr val="bg1"/>
+                  </a:solidFill>
+                </a:rPr>
+                <a:t> Onboarding + Design</a:t>
+              </a:r>
+              <a:endParaRPr lang="en-US" sz="900">
                 <a:solidFill>
                   <a:schemeClr val="bg1"/>
                 </a:solidFill>
-              </a:rPr>
-              <a:t>DCAE </a:t>
-            </a:r>
-            <a:r>
-              <a:rPr lang="de-DE" sz="900" dirty="0" err="1">
+              </a:endParaRPr>
+            </a:p>
+          </p:txBody>
+        </p:sp>
+        <p:pic>
+          <p:nvPicPr>
+            <p:cNvPr id="71" name="Grafik 70">
+              <a:extLst>
+                <a:ext uri="{FF2B5EF4-FFF2-40B4-BE49-F238E27FC236}">
+                  <a16:creationId xmlns:a16="http://schemas.microsoft.com/office/drawing/2014/main" id="{812D8CA5-E381-4B6A-B8E9-DA141CAA5561}"/>
+                </a:ext>
+              </a:extLst>
+            </p:cNvPr>
+            <p:cNvPicPr>
+              <a:picLocks noChangeAspect="1"/>
+            </p:cNvPicPr>
+            <p:nvPr/>
+          </p:nvPicPr>
+          <p:blipFill>
+            <a:blip r:embed="rId7">
+              <a:extLst>
+                <a:ext uri="{28A0092B-C50C-407E-A947-70E740481C1C}">
+                  <a14:useLocalDpi xmlns:a14="http://schemas.microsoft.com/office/drawing/2010/main" val="0"/>
+                </a:ext>
+              </a:extLst>
+            </a:blip>
+            <a:stretch>
+              <a:fillRect/>
+            </a:stretch>
+          </p:blipFill>
+          <p:spPr>
+            <a:xfrm>
+              <a:off x="7591435" y="2970532"/>
+              <a:ext cx="514350" cy="514350"/>
+            </a:xfrm>
+            <a:prstGeom prst="rect">
+              <a:avLst/>
+            </a:prstGeom>
+          </p:spPr>
+        </p:pic>
+        <p:sp>
+          <p:nvSpPr>
+            <p:cNvPr id="76" name="Textfeld 75">
+              <a:extLst>
+                <a:ext uri="{FF2B5EF4-FFF2-40B4-BE49-F238E27FC236}">
+                  <a16:creationId xmlns:a16="http://schemas.microsoft.com/office/drawing/2014/main" id="{2A1EFD31-6CD6-424F-95D2-A7F4A0409108}"/>
+                </a:ext>
+              </a:extLst>
+            </p:cNvPr>
+            <p:cNvSpPr txBox="1"/>
+            <p:nvPr/>
+          </p:nvSpPr>
+          <p:spPr>
+            <a:xfrm>
+              <a:off x="7325156" y="5127983"/>
+              <a:ext cx="1242648" cy="230832"/>
+            </a:xfrm>
+            <a:prstGeom prst="rect">
+              <a:avLst/>
+            </a:prstGeom>
+            <a:noFill/>
+          </p:spPr>
+          <p:txBody>
+            <a:bodyPr wrap="none" rtlCol="0">
+              <a:spAutoFit/>
+            </a:bodyPr>
+            <a:lstStyle/>
+            <a:p>
+              <a:pPr algn="ctr"/>
+              <a:r>
+                <a:rPr lang="de-DE" sz="900">
+                  <a:solidFill>
+                    <a:schemeClr val="bg1"/>
+                  </a:solidFill>
+                </a:rPr>
+                <a:t>DCAE </a:t>
+              </a:r>
+              <a:r>
+                <a:rPr lang="de-DE" sz="900" err="1">
+                  <a:solidFill>
+                    <a:schemeClr val="bg1"/>
+                  </a:solidFill>
+                </a:rPr>
+                <a:t>mS</a:t>
+              </a:r>
+              <a:r>
+                <a:rPr lang="de-DE" sz="900">
+                  <a:solidFill>
+                    <a:schemeClr val="bg1"/>
+                  </a:solidFill>
+                </a:rPr>
+                <a:t>  </a:t>
+              </a:r>
+              <a:r>
+                <a:rPr lang="de-DE" sz="900" err="1">
+                  <a:solidFill>
+                    <a:schemeClr val="bg1"/>
+                  </a:solidFill>
+                </a:rPr>
+                <a:t>Deployment</a:t>
+              </a:r>
+              <a:endParaRPr lang="en-US" sz="900">
                 <a:solidFill>
                   <a:schemeClr val="bg1"/>
                 </a:solidFill>
-              </a:rPr>
-              <a:t>mS</a:t>
-            </a:r>
-            <a:r>
-              <a:rPr lang="de-DE" sz="900" dirty="0">
-                <a:solidFill>
-                  <a:schemeClr val="bg1"/>
-                </a:solidFill>
-              </a:rPr>
-              <a:t> Onboarding + Design</a:t>
-            </a:r>
-            <a:endParaRPr lang="en-US" sz="900" dirty="0">
-              <a:solidFill>
-                <a:schemeClr val="bg1"/>
-              </a:solidFill>
-            </a:endParaRPr>
-          </a:p>
-        </p:txBody>
-      </p:sp>
-      <p:pic>
-        <p:nvPicPr>
-          <p:cNvPr id="71" name="Grafik 70">
-            <a:extLst>
-              <a:ext uri="{FF2B5EF4-FFF2-40B4-BE49-F238E27FC236}">
-                <a16:creationId xmlns:a16="http://schemas.microsoft.com/office/drawing/2014/main" id="{812D8CA5-E381-4B6A-B8E9-DA141CAA5561}"/>
-              </a:ext>
-            </a:extLst>
-          </p:cNvPr>
-          <p:cNvPicPr>
-            <a:picLocks noChangeAspect="1"/>
-          </p:cNvPicPr>
-          <p:nvPr/>
-        </p:nvPicPr>
-        <p:blipFill>
-          <a:blip r:embed="rId7">
-            <a:extLst>
-              <a:ext uri="{28A0092B-C50C-407E-A947-70E740481C1C}">
-                <a14:useLocalDpi xmlns:a14="http://schemas.microsoft.com/office/drawing/2010/main" val="0"/>
-              </a:ext>
-            </a:extLst>
-          </a:blip>
-          <a:stretch>
-            <a:fillRect/>
-          </a:stretch>
-        </p:blipFill>
-        <p:spPr>
-          <a:xfrm>
-            <a:off x="7591435" y="2970532"/>
-            <a:ext cx="514350" cy="514350"/>
-          </a:xfrm>
-          <a:prstGeom prst="rect">
-            <a:avLst/>
-          </a:prstGeom>
-        </p:spPr>
-      </p:pic>
-      <p:sp>
-        <p:nvSpPr>
-          <p:cNvPr id="76" name="Textfeld 75">
-            <a:extLst>
-              <a:ext uri="{FF2B5EF4-FFF2-40B4-BE49-F238E27FC236}">
-                <a16:creationId xmlns:a16="http://schemas.microsoft.com/office/drawing/2014/main" id="{2A1EFD31-6CD6-424F-95D2-A7F4A0409108}"/>
-              </a:ext>
-            </a:extLst>
-          </p:cNvPr>
-          <p:cNvSpPr txBox="1"/>
-          <p:nvPr/>
-        </p:nvSpPr>
-        <p:spPr>
-          <a:xfrm>
-            <a:off x="7235045" y="5127983"/>
-            <a:ext cx="1422870" cy="230832"/>
-          </a:xfrm>
-          <a:prstGeom prst="rect">
-            <a:avLst/>
-          </a:prstGeom>
-          <a:noFill/>
-        </p:spPr>
-        <p:txBody>
-          <a:bodyPr wrap="square" rtlCol="0">
-            <a:spAutoFit/>
-          </a:bodyPr>
-          <a:lstStyle/>
-          <a:p>
-            <a:pPr algn="ctr"/>
-            <a:r>
-              <a:rPr lang="de-DE" sz="900" dirty="0">
-                <a:solidFill>
-                  <a:schemeClr val="bg1"/>
-                </a:solidFill>
-              </a:rPr>
-              <a:t>DCAE </a:t>
-            </a:r>
-            <a:r>
-              <a:rPr lang="de-DE" sz="900" dirty="0" err="1">
-                <a:solidFill>
-                  <a:schemeClr val="bg1"/>
-                </a:solidFill>
-              </a:rPr>
-              <a:t>mS</a:t>
-            </a:r>
-            <a:r>
-              <a:rPr lang="de-DE" sz="900" dirty="0">
-                <a:solidFill>
-                  <a:schemeClr val="bg1"/>
-                </a:solidFill>
-              </a:rPr>
-              <a:t>  </a:t>
-            </a:r>
-            <a:r>
-              <a:rPr lang="de-DE" sz="900" dirty="0" err="1">
-                <a:solidFill>
-                  <a:schemeClr val="bg1"/>
-                </a:solidFill>
-              </a:rPr>
-              <a:t>Deployment</a:t>
-            </a:r>
-            <a:endParaRPr lang="en-US" sz="900" dirty="0">
-              <a:solidFill>
-                <a:schemeClr val="bg1"/>
-              </a:solidFill>
-            </a:endParaRPr>
-          </a:p>
-        </p:txBody>
-      </p:sp>
-      <p:pic>
-        <p:nvPicPr>
-          <p:cNvPr id="78" name="Grafik 77">
-            <a:extLst>
-              <a:ext uri="{FF2B5EF4-FFF2-40B4-BE49-F238E27FC236}">
-                <a16:creationId xmlns:a16="http://schemas.microsoft.com/office/drawing/2014/main" id="{32E1AA8B-1AD0-4185-96C2-6FFF0BEE94CD}"/>
-              </a:ext>
-            </a:extLst>
-          </p:cNvPr>
-          <p:cNvPicPr>
-            <a:picLocks noChangeAspect="1"/>
-          </p:cNvPicPr>
-          <p:nvPr/>
-        </p:nvPicPr>
-        <p:blipFill>
-          <a:blip r:embed="rId9">
-            <a:extLst>
-              <a:ext uri="{28A0092B-C50C-407E-A947-70E740481C1C}">
-                <a14:useLocalDpi xmlns:a14="http://schemas.microsoft.com/office/drawing/2010/main" val="0"/>
-              </a:ext>
-            </a:extLst>
-          </a:blip>
-          <a:stretch>
-            <a:fillRect/>
-          </a:stretch>
-        </p:blipFill>
-        <p:spPr>
-          <a:xfrm>
-            <a:off x="7634126" y="4682010"/>
-            <a:ext cx="514350" cy="514350"/>
-          </a:xfrm>
-          <a:prstGeom prst="rect">
-            <a:avLst/>
-          </a:prstGeom>
-        </p:spPr>
-      </p:pic>
-      <p:sp>
-        <p:nvSpPr>
-          <p:cNvPr id="81" name="Pfeil: nach unten 80">
-            <a:extLst>
-              <a:ext uri="{FF2B5EF4-FFF2-40B4-BE49-F238E27FC236}">
-                <a16:creationId xmlns:a16="http://schemas.microsoft.com/office/drawing/2014/main" id="{441F571F-CCB1-4C14-83C1-FFB8914424E0}"/>
-              </a:ext>
-            </a:extLst>
-          </p:cNvPr>
-          <p:cNvSpPr/>
-          <p:nvPr/>
-        </p:nvSpPr>
-        <p:spPr>
-          <a:xfrm rot="5400000">
-            <a:off x="5923782" y="4212071"/>
-            <a:ext cx="97728" cy="1870851"/>
-          </a:xfrm>
-          <a:prstGeom prst="downArrow">
-            <a:avLst/>
-          </a:prstGeom>
-        </p:spPr>
-        <p:style>
-          <a:lnRef idx="2">
-            <a:schemeClr val="accent1">
-              <a:shade val="50000"/>
-            </a:schemeClr>
-          </a:lnRef>
-          <a:fillRef idx="1">
-            <a:schemeClr val="accent1"/>
-          </a:fillRef>
-          <a:effectRef idx="0">
-            <a:schemeClr val="accent1"/>
-          </a:effectRef>
-          <a:fontRef idx="minor">
-            <a:schemeClr val="lt1"/>
-          </a:fontRef>
-        </p:style>
-        <p:txBody>
-          <a:bodyPr rtlCol="0" anchor="ctr"/>
-          <a:lstStyle/>
-          <a:p>
-            <a:pPr algn="ctr"/>
-            <a:endParaRPr lang="en-US" sz="1350"/>
-          </a:p>
-        </p:txBody>
-      </p:sp>
+              </a:endParaRPr>
+            </a:p>
+          </p:txBody>
+        </p:sp>
+        <p:pic>
+          <p:nvPicPr>
+            <p:cNvPr id="78" name="Grafik 77">
+              <a:extLst>
+                <a:ext uri="{FF2B5EF4-FFF2-40B4-BE49-F238E27FC236}">
+                  <a16:creationId xmlns:a16="http://schemas.microsoft.com/office/drawing/2014/main" id="{32E1AA8B-1AD0-4185-96C2-6FFF0BEE94CD}"/>
+                </a:ext>
+              </a:extLst>
+            </p:cNvPr>
+            <p:cNvPicPr>
+              <a:picLocks noChangeAspect="1"/>
+            </p:cNvPicPr>
+            <p:nvPr/>
+          </p:nvPicPr>
+          <p:blipFill>
+            <a:blip r:embed="rId9">
+              <a:extLst>
+                <a:ext uri="{28A0092B-C50C-407E-A947-70E740481C1C}">
+                  <a14:useLocalDpi xmlns:a14="http://schemas.microsoft.com/office/drawing/2010/main" val="0"/>
+                </a:ext>
+              </a:extLst>
+            </a:blip>
+            <a:stretch>
+              <a:fillRect/>
+            </a:stretch>
+          </p:blipFill>
+          <p:spPr>
+            <a:xfrm>
+              <a:off x="7634126" y="4682010"/>
+              <a:ext cx="514350" cy="514350"/>
+            </a:xfrm>
+            <a:prstGeom prst="rect">
+              <a:avLst/>
+            </a:prstGeom>
+          </p:spPr>
+        </p:pic>
+        <p:sp>
+          <p:nvSpPr>
+            <p:cNvPr id="81" name="Pfeil: nach unten 80">
+              <a:extLst>
+                <a:ext uri="{FF2B5EF4-FFF2-40B4-BE49-F238E27FC236}">
+                  <a16:creationId xmlns:a16="http://schemas.microsoft.com/office/drawing/2014/main" id="{441F571F-CCB1-4C14-83C1-FFB8914424E0}"/>
+                </a:ext>
+              </a:extLst>
+            </p:cNvPr>
+            <p:cNvSpPr/>
+            <p:nvPr/>
+          </p:nvSpPr>
+          <p:spPr>
+            <a:xfrm rot="5400000">
+              <a:off x="5923782" y="4212071"/>
+              <a:ext cx="97728" cy="1870851"/>
+            </a:xfrm>
+            <a:prstGeom prst="downArrow">
+              <a:avLst/>
+            </a:prstGeom>
+          </p:spPr>
+          <p:style>
+            <a:lnRef idx="2">
+              <a:schemeClr val="accent1">
+                <a:shade val="50000"/>
+              </a:schemeClr>
+            </a:lnRef>
+            <a:fillRef idx="1">
+              <a:schemeClr val="accent1"/>
+            </a:fillRef>
+            <a:effectRef idx="0">
+              <a:schemeClr val="accent1"/>
+            </a:effectRef>
+            <a:fontRef idx="minor">
+              <a:schemeClr val="lt1"/>
+            </a:fontRef>
+          </p:style>
+          <p:txBody>
+            <a:bodyPr wrap="none" rtlCol="0" anchor="ctr"/>
+            <a:lstStyle/>
+            <a:p>
+              <a:pPr algn="ctr"/>
+              <a:endParaRPr lang="en-US" sz="1350"/>
+            </a:p>
+          </p:txBody>
+        </p:sp>
+      </p:grpSp>
     </p:spTree>
     <p:extLst>
       <p:ext uri="{BB962C8B-B14F-4D97-AF65-F5344CB8AC3E}">
-        <p14:creationId xmlns:p14="http://schemas.microsoft.com/office/powerpoint/2010/main" val="2997902877"/>
+        <p14:creationId xmlns:p14="http://schemas.microsoft.com/office/powerpoint/2010/main" val="2695264906"/>
       </p:ext>
     </p:extLst>
   </p:cSld>
@@ -11986,14 +12014,14 @@
           <a:p>
             <a:pPr algn="ctr"/>
             <a:r>
-              <a:rPr lang="de-DE" sz="900" dirty="0">
+              <a:rPr lang="de-DE" sz="900">
                 <a:solidFill>
                   <a:schemeClr val="tx1"/>
                 </a:solidFill>
               </a:rPr>
               <a:t>Create VF/PNF</a:t>
             </a:r>
-            <a:endParaRPr lang="en-US" sz="900" dirty="0">
+            <a:endParaRPr lang="en-US" sz="900">
               <a:solidFill>
                 <a:schemeClr val="tx1"/>
               </a:solidFill>
@@ -12058,14 +12086,14 @@
           <a:p>
             <a:pPr algn="ctr"/>
             <a:r>
-              <a:rPr lang="de-DE" sz="900" dirty="0">
+              <a:rPr lang="de-DE" sz="900">
                 <a:solidFill>
                   <a:schemeClr val="tx1"/>
                 </a:solidFill>
               </a:rPr>
               <a:t>Update VF/PNF</a:t>
             </a:r>
-            <a:endParaRPr lang="en-US" sz="900" dirty="0">
+            <a:endParaRPr lang="en-US" sz="900">
               <a:solidFill>
                 <a:schemeClr val="tx1"/>
               </a:solidFill>
@@ -12130,7 +12158,7 @@
           <a:p>
             <a:pPr algn="ctr"/>
             <a:r>
-              <a:rPr lang="de-DE" sz="900" dirty="0" err="1">
+              <a:rPr lang="de-DE" sz="900" err="1">
                 <a:solidFill>
                   <a:schemeClr val="tx1"/>
                 </a:solidFill>
@@ -12138,14 +12166,14 @@
               <a:t>Certify</a:t>
             </a:r>
             <a:r>
-              <a:rPr lang="de-DE" sz="900" dirty="0">
+              <a:rPr lang="de-DE" sz="900">
                 <a:solidFill>
                   <a:schemeClr val="tx1"/>
                 </a:solidFill>
               </a:rPr>
               <a:t> VF/PNF</a:t>
             </a:r>
-            <a:endParaRPr lang="en-US" sz="900" dirty="0">
+            <a:endParaRPr lang="en-US" sz="900">
               <a:solidFill>
                 <a:schemeClr val="tx1"/>
               </a:solidFill>
@@ -12210,14 +12238,14 @@
           <a:p>
             <a:pPr algn="ctr"/>
             <a:r>
-              <a:rPr lang="de-DE" sz="900" dirty="0">
+              <a:rPr lang="de-DE" sz="900">
                 <a:solidFill>
                   <a:schemeClr val="tx1"/>
                 </a:solidFill>
               </a:rPr>
               <a:t>Create Service</a:t>
             </a:r>
-            <a:endParaRPr lang="en-US" sz="900" dirty="0">
+            <a:endParaRPr lang="en-US" sz="900">
               <a:solidFill>
                 <a:schemeClr val="tx1"/>
               </a:solidFill>
@@ -12578,18 +12606,18 @@
           <a:lstStyle/>
           <a:p>
             <a:r>
-              <a:rPr lang="de-DE" sz="1050" b="1" dirty="0"/>
+              <a:rPr lang="de-DE" sz="1050" b="1"/>
               <a:t>SDC </a:t>
             </a:r>
             <a:r>
-              <a:rPr lang="de-DE" sz="1050" b="1" dirty="0" err="1"/>
+              <a:rPr lang="de-DE" sz="1050" b="1" err="1"/>
               <a:t>role</a:t>
             </a:r>
             <a:r>
-              <a:rPr lang="de-DE" sz="1050" b="1" dirty="0"/>
+              <a:rPr lang="de-DE" sz="1050" b="1"/>
               <a:t>: Designer</a:t>
             </a:r>
-            <a:endParaRPr lang="en-US" sz="1050" b="1" dirty="0"/>
+            <a:endParaRPr lang="en-US" sz="1050" b="1"/>
           </a:p>
         </p:txBody>
       </p:sp>
@@ -12680,14 +12708,14 @@
           <a:p>
             <a:pPr algn="ctr"/>
             <a:r>
-              <a:rPr lang="de-DE" sz="900" dirty="0">
+              <a:rPr lang="de-DE" sz="900">
                 <a:solidFill>
                   <a:schemeClr val="tx1"/>
                 </a:solidFill>
               </a:rPr>
               <a:t>Create Service</a:t>
             </a:r>
-            <a:endParaRPr lang="en-US" sz="900" dirty="0">
+            <a:endParaRPr lang="en-US" sz="900">
               <a:solidFill>
                 <a:schemeClr val="tx1"/>
               </a:solidFill>
@@ -12752,14 +12780,14 @@
           <a:p>
             <a:pPr algn="ctr"/>
             <a:r>
-              <a:rPr lang="de-DE" sz="900" dirty="0">
+              <a:rPr lang="de-DE" sz="900">
                 <a:solidFill>
                   <a:schemeClr val="tx1"/>
                 </a:solidFill>
               </a:rPr>
               <a:t>Manage Service Properties</a:t>
             </a:r>
-            <a:endParaRPr lang="en-US" sz="900" dirty="0">
+            <a:endParaRPr lang="en-US" sz="900">
               <a:solidFill>
                 <a:schemeClr val="tx1"/>
               </a:solidFill>
@@ -12824,14 +12852,14 @@
           <a:p>
             <a:pPr algn="ctr"/>
             <a:r>
-              <a:rPr lang="de-DE" sz="900" dirty="0">
+              <a:rPr lang="de-DE" sz="900">
                 <a:solidFill>
                   <a:schemeClr val="tx1"/>
                 </a:solidFill>
               </a:rPr>
               <a:t>Update Service</a:t>
             </a:r>
-            <a:endParaRPr lang="en-US" sz="900" dirty="0">
+            <a:endParaRPr lang="en-US" sz="900">
               <a:solidFill>
                 <a:schemeClr val="tx1"/>
               </a:solidFill>
@@ -12896,7 +12924,7 @@
           <a:p>
             <a:pPr algn="ctr"/>
             <a:r>
-              <a:rPr lang="de-DE" sz="900" dirty="0" err="1">
+              <a:rPr lang="de-DE" sz="900" err="1">
                 <a:solidFill>
                   <a:schemeClr val="tx1"/>
                 </a:solidFill>
@@ -12904,14 +12932,14 @@
               <a:t>Distribute</a:t>
             </a:r>
             <a:r>
-              <a:rPr lang="de-DE" sz="900" dirty="0">
+              <a:rPr lang="de-DE" sz="900">
                 <a:solidFill>
                   <a:schemeClr val="tx1"/>
                 </a:solidFill>
               </a:rPr>
               <a:t> Service</a:t>
             </a:r>
-            <a:endParaRPr lang="en-US" sz="900" dirty="0">
+            <a:endParaRPr lang="en-US" sz="900">
               <a:solidFill>
                 <a:schemeClr val="tx1"/>
               </a:solidFill>
@@ -13048,18 +13076,18 @@
           <a:lstStyle/>
           <a:p>
             <a:r>
-              <a:rPr lang="de-DE" sz="1050" b="1" dirty="0"/>
+              <a:rPr lang="de-DE" sz="1050" b="1"/>
               <a:t>SDC </a:t>
             </a:r>
             <a:r>
-              <a:rPr lang="de-DE" sz="1050" b="1" dirty="0" err="1"/>
+              <a:rPr lang="de-DE" sz="1050" b="1" err="1"/>
               <a:t>role</a:t>
             </a:r>
             <a:r>
-              <a:rPr lang="de-DE" sz="1050" b="1" dirty="0"/>
+              <a:rPr lang="de-DE" sz="1050" b="1"/>
               <a:t>: Designer</a:t>
             </a:r>
-            <a:endParaRPr lang="en-US" sz="1050" b="1" dirty="0"/>
+            <a:endParaRPr lang="en-US" sz="1050" b="1"/>
           </a:p>
         </p:txBody>
       </p:sp>
@@ -13176,14 +13204,14 @@
           <a:p>
             <a:pPr algn="ctr"/>
             <a:r>
-              <a:rPr lang="de-DE" sz="900" dirty="0">
+              <a:rPr lang="de-DE" sz="900">
                 <a:solidFill>
                   <a:schemeClr val="tx1"/>
                 </a:solidFill>
               </a:rPr>
               <a:t>Create Management Workflow</a:t>
             </a:r>
-            <a:endParaRPr lang="en-US" sz="900" dirty="0">
+            <a:endParaRPr lang="en-US" sz="900">
               <a:solidFill>
                 <a:schemeClr val="tx1"/>
               </a:solidFill>
@@ -13248,7 +13276,7 @@
           <a:p>
             <a:pPr algn="ctr"/>
             <a:r>
-              <a:rPr lang="de-DE" sz="900" dirty="0">
+              <a:rPr lang="de-DE" sz="900">
                 <a:solidFill>
                   <a:schemeClr val="tx1"/>
                 </a:solidFill>
@@ -13256,14 +13284,14 @@
               <a:t>Create Network  </a:t>
             </a:r>
             <a:r>
-              <a:rPr lang="de-DE" sz="900" dirty="0" err="1">
+              <a:rPr lang="de-DE" sz="900" err="1">
                 <a:solidFill>
                   <a:schemeClr val="tx1"/>
                 </a:solidFill>
               </a:rPr>
               <a:t>Callflow</a:t>
             </a:r>
-            <a:endParaRPr lang="en-US" sz="900" dirty="0">
+            <a:endParaRPr lang="en-US" sz="900">
               <a:solidFill>
                 <a:schemeClr val="tx1"/>
               </a:solidFill>
@@ -13374,7 +13402,7 @@
           <a:p>
             <a:pPr algn="ctr"/>
             <a:r>
-              <a:rPr lang="de-DE" sz="900" dirty="0" err="1">
+              <a:rPr lang="de-DE" sz="900" err="1">
                 <a:solidFill>
                   <a:schemeClr val="tx1"/>
                 </a:solidFill>
@@ -13382,14 +13410,14 @@
               <a:t>Certify</a:t>
             </a:r>
             <a:r>
-              <a:rPr lang="de-DE" sz="900" dirty="0">
+              <a:rPr lang="de-DE" sz="900">
                 <a:solidFill>
                   <a:schemeClr val="tx1"/>
                 </a:solidFill>
               </a:rPr>
               <a:t> Service</a:t>
             </a:r>
-            <a:endParaRPr lang="en-US" sz="900" dirty="0">
+            <a:endParaRPr lang="en-US" sz="900">
               <a:solidFill>
                 <a:schemeClr val="tx1"/>
               </a:solidFill>
@@ -13755,7 +13783,7 @@
           <a:p>
             <a:pPr algn="ctr"/>
             <a:r>
-              <a:rPr lang="de-DE" sz="900" dirty="0" err="1">
+              <a:rPr lang="de-DE" sz="900" err="1">
                 <a:solidFill>
                   <a:schemeClr val="tx1"/>
                 </a:solidFill>
@@ -13763,14 +13791,14 @@
               <a:t>Distribute</a:t>
             </a:r>
             <a:r>
-              <a:rPr lang="de-DE" sz="900" dirty="0">
+              <a:rPr lang="de-DE" sz="900">
                 <a:solidFill>
                   <a:schemeClr val="tx1"/>
                 </a:solidFill>
               </a:rPr>
               <a:t> Service</a:t>
             </a:r>
-            <a:endParaRPr lang="en-US" sz="900" dirty="0">
+            <a:endParaRPr lang="en-US" sz="900">
               <a:solidFill>
                 <a:schemeClr val="tx1"/>
               </a:solidFill>
@@ -13835,14 +13863,14 @@
           <a:p>
             <a:pPr algn="ctr"/>
             <a:r>
-              <a:rPr lang="de-DE" sz="900" dirty="0">
+              <a:rPr lang="de-DE" sz="900">
                 <a:solidFill>
                   <a:schemeClr val="tx1"/>
                 </a:solidFill>
               </a:rPr>
               <a:t>Monitor Distribution</a:t>
             </a:r>
-            <a:endParaRPr lang="en-US" sz="900" dirty="0">
+            <a:endParaRPr lang="en-US" sz="900">
               <a:solidFill>
                 <a:schemeClr val="tx1"/>
               </a:solidFill>
@@ -13978,18 +14006,18 @@
           <a:lstStyle/>
           <a:p>
             <a:r>
-              <a:rPr lang="de-DE" sz="1050" b="1" dirty="0"/>
+              <a:rPr lang="de-DE" sz="1050" b="1"/>
               <a:t>SDC </a:t>
             </a:r>
             <a:r>
-              <a:rPr lang="de-DE" sz="1050" b="1" dirty="0" err="1"/>
+              <a:rPr lang="de-DE" sz="1050" b="1" err="1"/>
               <a:t>role</a:t>
             </a:r>
             <a:r>
-              <a:rPr lang="de-DE" sz="1050" b="1" dirty="0"/>
+              <a:rPr lang="de-DE" sz="1050" b="1"/>
               <a:t>: Designer</a:t>
             </a:r>
-            <a:endParaRPr lang="en-US" sz="1050" b="1" dirty="0"/>
+            <a:endParaRPr lang="en-US" sz="1050" b="1"/>
           </a:p>
         </p:txBody>
       </p:sp>
@@ -14182,7 +14210,7 @@
               <a:defRPr/>
             </a:pPr>
             <a:r>
-              <a:rPr lang="en-US" altLang="zh-CN" sz="1200" b="1" dirty="0">
+              <a:rPr lang="en-US" altLang="zh-CN" sz="1200" b="1">
                 <a:solidFill>
                   <a:schemeClr val="bg1"/>
                 </a:solidFill>
@@ -14196,7 +14224,7 @@
               <a:defRPr/>
             </a:pPr>
             <a:r>
-              <a:rPr lang="en-US" altLang="zh-CN" sz="1200" b="1" dirty="0" err="1">
+              <a:rPr lang="en-US" altLang="zh-CN" sz="1200" b="1" err="1">
                 <a:solidFill>
                   <a:schemeClr val="bg1"/>
                 </a:solidFill>
@@ -14205,7 +14233,7 @@
               <a:t>rgb</a:t>
             </a:r>
             <a:r>
-              <a:rPr lang="en-US" altLang="zh-CN" sz="1200" b="1" dirty="0">
+              <a:rPr lang="en-US" altLang="zh-CN" sz="1200" b="1">
                 <a:solidFill>
                   <a:schemeClr val="bg1"/>
                 </a:solidFill>
@@ -14219,7 +14247,7 @@
               <a:defRPr/>
             </a:pPr>
             <a:r>
-              <a:rPr lang="fr-FR" sz="1200" dirty="0">
+              <a:rPr lang="fr-FR" sz="1200">
                 <a:solidFill>
                   <a:schemeClr val="bg1"/>
                 </a:solidFill>
@@ -14369,7 +14397,7 @@
               <a:defRPr/>
             </a:pPr>
             <a:r>
-              <a:rPr lang="en-US" sz="1200" b="1" dirty="0">
+              <a:rPr lang="en-US" sz="1200" b="1">
                 <a:solidFill>
                   <a:schemeClr val="bg1"/>
                 </a:solidFill>
@@ -14382,7 +14410,7 @@
               <a:defRPr/>
             </a:pPr>
             <a:r>
-              <a:rPr lang="en-US" sz="1200" b="1" dirty="0" err="1">
+              <a:rPr lang="en-US" sz="1200" b="1" err="1">
                 <a:solidFill>
                   <a:schemeClr val="bg1"/>
                 </a:solidFill>
@@ -14390,7 +14418,7 @@
               <a:t>rgb</a:t>
             </a:r>
             <a:r>
-              <a:rPr lang="en-US" sz="1200" b="1" dirty="0">
+              <a:rPr lang="en-US" sz="1200" b="1">
                 <a:solidFill>
                   <a:schemeClr val="bg1"/>
                 </a:solidFill>
@@ -14403,14 +14431,14 @@
               <a:defRPr/>
             </a:pPr>
             <a:r>
-              <a:rPr lang="fr-FR" sz="1200" dirty="0">
+              <a:rPr lang="fr-FR" sz="1200">
                 <a:solidFill>
                   <a:schemeClr val="bg1"/>
                 </a:solidFill>
               </a:rPr>
               <a:t>#009788</a:t>
             </a:r>
-            <a:endParaRPr lang="en-US" sz="1200" b="1" dirty="0">
+            <a:endParaRPr lang="en-US" sz="1200" b="1">
               <a:solidFill>
                 <a:schemeClr val="bg1"/>
               </a:solidFill>
@@ -14558,7 +14586,7 @@
               <a:defRPr/>
             </a:pPr>
             <a:r>
-              <a:rPr lang="en-US" altLang="zh-CN" sz="1200" b="1" dirty="0">
+              <a:rPr lang="en-US" altLang="zh-CN" sz="1200" b="1">
                 <a:solidFill>
                   <a:schemeClr val="bg1"/>
                 </a:solidFill>
@@ -14572,7 +14600,7 @@
               <a:defRPr/>
             </a:pPr>
             <a:r>
-              <a:rPr lang="en-US" altLang="zh-CN" sz="1200" b="1" dirty="0" err="1">
+              <a:rPr lang="en-US" altLang="zh-CN" sz="1200" b="1" err="1">
                 <a:solidFill>
                   <a:schemeClr val="bg1"/>
                 </a:solidFill>
@@ -14581,7 +14609,7 @@
               <a:t>rgb</a:t>
             </a:r>
             <a:r>
-              <a:rPr lang="en-US" altLang="zh-CN" sz="1200" b="1" dirty="0">
+              <a:rPr lang="en-US" altLang="zh-CN" sz="1200" b="1">
                 <a:solidFill>
                   <a:schemeClr val="bg1"/>
                 </a:solidFill>
@@ -14595,14 +14623,14 @@
               <a:defRPr/>
             </a:pPr>
             <a:r>
-              <a:rPr lang="fr-FR" sz="1200" dirty="0">
+              <a:rPr lang="fr-FR" sz="1200">
                 <a:solidFill>
                   <a:schemeClr val="bg1"/>
                 </a:solidFill>
               </a:rPr>
               <a:t>#006f8d</a:t>
             </a:r>
-            <a:endParaRPr lang="en-US" altLang="zh-CN" sz="1200" b="1" dirty="0">
+            <a:endParaRPr lang="en-US" altLang="zh-CN" sz="1200" b="1">
               <a:solidFill>
                 <a:schemeClr val="bg1"/>
               </a:solidFill>
@@ -14886,12 +14914,9 @@
 </file>
 
 <file path=customXml/item1.xml><?xml version="1.0" encoding="utf-8"?>
-<?mso-contentType ?>
-<FormTemplates xmlns="http://schemas.microsoft.com/sharepoint/v3/contenttype/forms">
-  <Display>DocumentLibraryForm</Display>
-  <Edit>DocumentLibraryForm</Edit>
-  <New>DocumentLibraryForm</New>
-</FormTemplates>
+<p:properties xmlns:p="http://schemas.microsoft.com/office/2006/metadata/properties" xmlns:xsi="http://www.w3.org/2001/XMLSchema-instance" xmlns:pc="http://schemas.microsoft.com/office/infopath/2007/PartnerControls">
+  <documentManagement/>
+</p:properties>
 </file>
 
 <file path=customXml/item2.xml><?xml version="1.0" encoding="utf-8"?>
@@ -15098,15 +15123,27 @@
 </file>
 
 <file path=customXml/item3.xml><?xml version="1.0" encoding="utf-8"?>
-<p:properties xmlns:p="http://schemas.microsoft.com/office/2006/metadata/properties" xmlns:xsi="http://www.w3.org/2001/XMLSchema-instance" xmlns:pc="http://schemas.microsoft.com/office/infopath/2007/PartnerControls">
-  <documentManagement/>
-</p:properties>
+<?mso-contentType ?>
+<FormTemplates xmlns="http://schemas.microsoft.com/sharepoint/v3/contenttype/forms">
+  <Display>DocumentLibraryForm</Display>
+  <Edit>DocumentLibraryForm</Edit>
+  <New>DocumentLibraryForm</New>
+</FormTemplates>
 </file>
 
 <file path=customXml/itemProps1.xml><?xml version="1.0" encoding="utf-8"?>
-<ds:datastoreItem xmlns:ds="http://schemas.openxmlformats.org/officeDocument/2006/customXml" ds:itemID="{D5576060-35D7-4F36-83E3-6A8D02E5E420}">
+<ds:datastoreItem xmlns:ds="http://schemas.openxmlformats.org/officeDocument/2006/customXml" ds:itemID="{95E6422D-CDE5-4E40-8B32-6E4DD424FDB1}">
   <ds:schemaRefs>
-    <ds:schemaRef ds:uri="http://schemas.microsoft.com/sharepoint/v3/contenttype/forms"/>
+    <ds:schemaRef ds:uri="http://schemas.openxmlformats.org/package/2006/metadata/core-properties"/>
+    <ds:schemaRef ds:uri="http://schemas.microsoft.com/office/infopath/2007/PartnerControls"/>
+    <ds:schemaRef ds:uri="http://purl.org/dc/elements/1.1/"/>
+    <ds:schemaRef ds:uri="http://purl.org/dc/dcmitype/"/>
+    <ds:schemaRef ds:uri="http://schemas.microsoft.com/office/2006/metadata/properties"/>
+    <ds:schemaRef ds:uri="http://purl.org/dc/terms/"/>
+    <ds:schemaRef ds:uri="http://schemas.microsoft.com/office/2006/documentManagement/types"/>
+    <ds:schemaRef ds:uri="http://www.w3.org/XML/1998/namespace"/>
+    <ds:schemaRef ds:uri="12a1d171-42c9-4543-9ae0-1eb64d0b6128"/>
+    <ds:schemaRef ds:uri="4d828b48-b1c4-4622-aff4-c41f2642b6e4"/>
   </ds:schemaRefs>
 </ds:datastoreItem>
 </file>
@@ -15131,18 +15168,9 @@
 </file>
 
 <file path=customXml/itemProps3.xml><?xml version="1.0" encoding="utf-8"?>
-<ds:datastoreItem xmlns:ds="http://schemas.openxmlformats.org/officeDocument/2006/customXml" ds:itemID="{95E6422D-CDE5-4E40-8B32-6E4DD424FDB1}">
+<ds:datastoreItem xmlns:ds="http://schemas.openxmlformats.org/officeDocument/2006/customXml" ds:itemID="{D5576060-35D7-4F36-83E3-6A8D02E5E420}">
   <ds:schemaRefs>
-    <ds:schemaRef ds:uri="http://purl.org/dc/elements/1.1/"/>
-    <ds:schemaRef ds:uri="http://schemas.microsoft.com/office/2006/metadata/properties"/>
-    <ds:schemaRef ds:uri="http://schemas.microsoft.com/office/2006/documentManagement/types"/>
-    <ds:schemaRef ds:uri="4d828b48-b1c4-4622-aff4-c41f2642b6e4"/>
-    <ds:schemaRef ds:uri="http://purl.org/dc/terms/"/>
-    <ds:schemaRef ds:uri="http://schemas.openxmlformats.org/package/2006/metadata/core-properties"/>
-    <ds:schemaRef ds:uri="http://purl.org/dc/dcmitype/"/>
-    <ds:schemaRef ds:uri="12a1d171-42c9-4543-9ae0-1eb64d0b6128"/>
-    <ds:schemaRef ds:uri="http://schemas.microsoft.com/office/infopath/2007/PartnerControls"/>
-    <ds:schemaRef ds:uri="http://www.w3.org/XML/1998/namespace"/>
+    <ds:schemaRef ds:uri="http://schemas.microsoft.com/sharepoint/v3/contenttype/forms"/>
   </ds:schemaRefs>
 </ds:datastoreItem>
 </file>
</xml_diff>